<commit_message>
prep for hackathon (#2)
* lint

* start verifies input map

* updates for new repo home

* reorg; removed need for numbering; removed explicit module lists

* wip

* wip

* georeference works; some mild dockerfile fixes

* typo

* add verification

* remove commented out bits

* added geopackage, other misc

* working on point extract

* lint

* updated graph

* merge fix

* first pass stack creator

* wip

* typo

* err from prev commit

* incorrect dependence

* better paths

* wip

* wip

* build fix

* perf fix

* polygon fixes

* geopkg start

* wip

* updtaed dependences

* better log output

* missing package

* cleanups

* wip

* updates

* wip

* updates
</commit_message>
<xml_diff>
--- a/docs/overview.pptx
+++ b/docs/overview.pptx
@@ -210,7 +210,7 @@
           <a:p>
             <a:fld id="{A9FFB0D8-BEE1-E441-993F-073C1206777B}" type="datetimeFigureOut">
               <a:rPr lang="en-US" smtClean="0"/>
-              <a:t>2/5/24</a:t>
+              <a:t>2/10/24</a:t>
             </a:fld>
             <a:endParaRPr lang="en-US" dirty="0"/>
           </a:p>
@@ -542,6 +542,90 @@
           <a:p>
             <a:fld id="{6CD34286-103F-9E47-AFC6-34F73E6CF5EC}" type="slidenum">
               <a:rPr lang="en-US" smtClean="0"/>
+              <a:t>2</a:t>
+            </a:fld>
+            <a:endParaRPr lang="en-US" dirty="0"/>
+          </a:p>
+        </p:txBody>
+      </p:sp>
+    </p:spTree>
+    <p:extLst>
+      <p:ext uri="{BB962C8B-B14F-4D97-AF65-F5344CB8AC3E}">
+        <p14:creationId xmlns:p14="http://schemas.microsoft.com/office/powerpoint/2010/main" val="7584444"/>
+      </p:ext>
+    </p:extLst>
+  </p:cSld>
+  <p:clrMapOvr>
+    <a:masterClrMapping/>
+  </p:clrMapOvr>
+</p:notes>
+</file>
+
+<file path=ppt/notesSlides/notesSlide2.xml><?xml version="1.0" encoding="utf-8"?>
+<p:notes xmlns:a="http://schemas.openxmlformats.org/drawingml/2006/main" xmlns:r="http://schemas.openxmlformats.org/officeDocument/2006/relationships" xmlns:p="http://schemas.openxmlformats.org/presentationml/2006/main">
+  <p:cSld>
+    <p:spTree>
+      <p:nvGrpSpPr>
+        <p:cNvPr id="1" name=""/>
+        <p:cNvGrpSpPr/>
+        <p:nvPr/>
+      </p:nvGrpSpPr>
+      <p:grpSpPr>
+        <a:xfrm>
+          <a:off x="0" y="0"/>
+          <a:ext cx="0" cy="0"/>
+          <a:chOff x="0" y="0"/>
+          <a:chExt cx="0" cy="0"/>
+        </a:xfrm>
+      </p:grpSpPr>
+      <p:sp>
+        <p:nvSpPr>
+          <p:cNvPr id="2" name="Slide Image Placeholder 1"/>
+          <p:cNvSpPr>
+            <a:spLocks noGrp="1" noRot="1" noChangeAspect="1"/>
+          </p:cNvSpPr>
+          <p:nvPr>
+            <p:ph type="sldImg"/>
+          </p:nvPr>
+        </p:nvSpPr>
+        <p:spPr/>
+      </p:sp>
+      <p:sp>
+        <p:nvSpPr>
+          <p:cNvPr id="3" name="Notes Placeholder 2"/>
+          <p:cNvSpPr>
+            <a:spLocks noGrp="1"/>
+          </p:cNvSpPr>
+          <p:nvPr>
+            <p:ph type="body" idx="1"/>
+          </p:nvPr>
+        </p:nvSpPr>
+        <p:spPr/>
+        <p:txBody>
+          <a:bodyPr/>
+          <a:lstStyle/>
+          <a:p>
+            <a:endParaRPr lang="en-US" dirty="0"/>
+          </a:p>
+        </p:txBody>
+      </p:sp>
+      <p:sp>
+        <p:nvSpPr>
+          <p:cNvPr id="4" name="Slide Number Placeholder 3"/>
+          <p:cNvSpPr>
+            <a:spLocks noGrp="1"/>
+          </p:cNvSpPr>
+          <p:nvPr>
+            <p:ph type="sldNum" sz="quarter" idx="5"/>
+          </p:nvPr>
+        </p:nvSpPr>
+        <p:spPr/>
+        <p:txBody>
+          <a:bodyPr/>
+          <a:lstStyle/>
+          <a:p>
+            <a:fld id="{6CD34286-103F-9E47-AFC6-34F73E6CF5EC}" type="slidenum">
+              <a:rPr lang="en-US" smtClean="0"/>
               <a:t>6</a:t>
             </a:fld>
             <a:endParaRPr lang="en-US" dirty="0"/>
@@ -708,7 +792,7 @@
           <a:p>
             <a:fld id="{E65B9B70-A04C-6947-A62D-89703208E261}" type="datetime1">
               <a:rPr lang="en-US" smtClean="0"/>
-              <a:t>2/5/24</a:t>
+              <a:t>2/10/24</a:t>
             </a:fld>
             <a:endParaRPr lang="en-US" dirty="0"/>
           </a:p>
@@ -906,7 +990,7 @@
           <a:p>
             <a:fld id="{F4E40C43-FBBA-1747-A088-4D896BE26C2E}" type="datetime1">
               <a:rPr lang="en-US" smtClean="0"/>
-              <a:t>2/5/24</a:t>
+              <a:t>2/10/24</a:t>
             </a:fld>
             <a:endParaRPr lang="en-US" dirty="0"/>
           </a:p>
@@ -1114,7 +1198,7 @@
           <a:p>
             <a:fld id="{D9AD9CED-6AA3-9640-BB17-376FC0752193}" type="datetime1">
               <a:rPr lang="en-US" smtClean="0"/>
-              <a:t>2/5/24</a:t>
+              <a:t>2/10/24</a:t>
             </a:fld>
             <a:endParaRPr lang="en-US" dirty="0"/>
           </a:p>
@@ -1312,7 +1396,7 @@
           <a:p>
             <a:fld id="{67C62BD5-A810-D446-AEEA-6EA5DA66F7C5}" type="datetime1">
               <a:rPr lang="en-US" smtClean="0"/>
-              <a:t>2/5/24</a:t>
+              <a:t>2/10/24</a:t>
             </a:fld>
             <a:endParaRPr lang="en-US" dirty="0"/>
           </a:p>
@@ -1587,7 +1671,7 @@
           <a:p>
             <a:fld id="{57001136-4BB2-A341-88D9-FB518730363E}" type="datetime1">
               <a:rPr lang="en-US" smtClean="0"/>
-              <a:t>2/5/24</a:t>
+              <a:t>2/10/24</a:t>
             </a:fld>
             <a:endParaRPr lang="en-US" dirty="0"/>
           </a:p>
@@ -1852,7 +1936,7 @@
           <a:p>
             <a:fld id="{D1748CDE-4324-1045-A49E-BF7602B573B5}" type="datetime1">
               <a:rPr lang="en-US" smtClean="0"/>
-              <a:t>2/5/24</a:t>
+              <a:t>2/10/24</a:t>
             </a:fld>
             <a:endParaRPr lang="en-US" dirty="0"/>
           </a:p>
@@ -2264,7 +2348,7 @@
           <a:p>
             <a:fld id="{2F85ACE2-1720-F542-825B-0CA3A18264E8}" type="datetime1">
               <a:rPr lang="en-US" smtClean="0"/>
-              <a:t>2/5/24</a:t>
+              <a:t>2/10/24</a:t>
             </a:fld>
             <a:endParaRPr lang="en-US" dirty="0"/>
           </a:p>
@@ -2405,7 +2489,7 @@
           <a:p>
             <a:fld id="{36D9C0BD-9315-FB46-9614-C015909AAA87}" type="datetime1">
               <a:rPr lang="en-US" smtClean="0"/>
-              <a:t>2/5/24</a:t>
+              <a:t>2/10/24</a:t>
             </a:fld>
             <a:endParaRPr lang="en-US" dirty="0"/>
           </a:p>
@@ -2518,7 +2602,7 @@
           <a:p>
             <a:fld id="{D633906E-A217-3A46-BD2A-C104A9466F59}" type="datetime1">
               <a:rPr lang="en-US" smtClean="0"/>
-              <a:t>2/5/24</a:t>
+              <a:t>2/10/24</a:t>
             </a:fld>
             <a:endParaRPr lang="en-US" dirty="0"/>
           </a:p>
@@ -2829,7 +2913,7 @@
           <a:p>
             <a:fld id="{9637180C-3397-924B-97CE-6DF943BBC4E5}" type="datetime1">
               <a:rPr lang="en-US" smtClean="0"/>
-              <a:t>2/5/24</a:t>
+              <a:t>2/10/24</a:t>
             </a:fld>
             <a:endParaRPr lang="en-US" dirty="0"/>
           </a:p>
@@ -3117,7 +3201,7 @@
           <a:p>
             <a:fld id="{0F17F01D-15DE-0448-8A25-D642B47D3EE5}" type="datetime1">
               <a:rPr lang="en-US" smtClean="0"/>
-              <a:t>2/5/24</a:t>
+              <a:t>2/10/24</a:t>
             </a:fld>
             <a:endParaRPr lang="en-US" dirty="0"/>
           </a:p>
@@ -3358,7 +3442,7 @@
           <a:p>
             <a:fld id="{21D39580-25DC-9F49-8D47-C104B4FAE15A}" type="datetime1">
               <a:rPr lang="en-US" smtClean="0"/>
-              <a:t>2/5/24</a:t>
+              <a:t>2/10/24</a:t>
             </a:fld>
             <a:endParaRPr lang="en-US" dirty="0"/>
           </a:p>
@@ -3859,7 +3943,7 @@
           <a:p>
             <a:r>
               <a:rPr lang="en-US" dirty="0"/>
-              <a:t>5 Feb 2024</a:t>
+              <a:t>8 Feb 2024</a:t>
             </a:r>
           </a:p>
         </p:txBody>
@@ -3939,14 +4023,14 @@
             <p:ph idx="1"/>
             <p:extLst>
               <p:ext uri="{D42A27DB-BD31-4B8C-83A1-F6EECF244321}">
-                <p14:modId xmlns:p14="http://schemas.microsoft.com/office/powerpoint/2010/main" val="1200528026"/>
+                <p14:modId xmlns:p14="http://schemas.microsoft.com/office/powerpoint/2010/main" val="3062138318"/>
               </p:ext>
             </p:extLst>
           </p:nvPr>
         </p:nvGraphicFramePr>
         <p:xfrm>
-          <a:off x="356937" y="1094004"/>
-          <a:ext cx="11434010" cy="5262348"/>
+          <a:off x="1686564" y="1236790"/>
+          <a:ext cx="4058946" cy="5119560"/>
         </p:xfrm>
         <a:graphic>
           <a:graphicData uri="http://schemas.openxmlformats.org/drawingml/2006/table">
@@ -3955,84 +4039,401 @@
                 <a:tableStyleId>{5C22544A-7EE6-4342-B048-85BDC9FD1C3A}</a:tableStyleId>
               </a:tblPr>
               <a:tblGrid>
-                <a:gridCol w="1143401">
+                <a:gridCol w="2029473">
                   <a:extLst>
                     <a:ext uri="{9D8B030D-6E8A-4147-A177-3AD203B41FA5}">
                       <a16:colId xmlns:a16="http://schemas.microsoft.com/office/drawing/2014/main" val="488397594"/>
                     </a:ext>
                   </a:extLst>
                 </a:gridCol>
-                <a:gridCol w="1143401">
+                <a:gridCol w="2029473">
                   <a:extLst>
                     <a:ext uri="{9D8B030D-6E8A-4147-A177-3AD203B41FA5}">
                       <a16:colId xmlns:a16="http://schemas.microsoft.com/office/drawing/2014/main" val="2448984771"/>
                     </a:ext>
                   </a:extLst>
                 </a:gridCol>
-                <a:gridCol w="1143401">
-                  <a:extLst>
-                    <a:ext uri="{9D8B030D-6E8A-4147-A177-3AD203B41FA5}">
-                      <a16:colId xmlns:a16="http://schemas.microsoft.com/office/drawing/2014/main" val="1567925485"/>
-                    </a:ext>
-                  </a:extLst>
-                </a:gridCol>
-                <a:gridCol w="1143401">
-                  <a:extLst>
-                    <a:ext uri="{9D8B030D-6E8A-4147-A177-3AD203B41FA5}">
-                      <a16:colId xmlns:a16="http://schemas.microsoft.com/office/drawing/2014/main" val="2910773074"/>
-                    </a:ext>
-                  </a:extLst>
-                </a:gridCol>
-                <a:gridCol w="1143401">
-                  <a:extLst>
-                    <a:ext uri="{9D8B030D-6E8A-4147-A177-3AD203B41FA5}">
-                      <a16:colId xmlns:a16="http://schemas.microsoft.com/office/drawing/2014/main" val="2424915857"/>
-                    </a:ext>
-                  </a:extLst>
-                </a:gridCol>
-                <a:gridCol w="1143401">
-                  <a:extLst>
-                    <a:ext uri="{9D8B030D-6E8A-4147-A177-3AD203B41FA5}">
-                      <a16:colId xmlns:a16="http://schemas.microsoft.com/office/drawing/2014/main" val="878025370"/>
-                    </a:ext>
-                  </a:extLst>
-                </a:gridCol>
-                <a:gridCol w="1143401">
-                  <a:extLst>
-                    <a:ext uri="{9D8B030D-6E8A-4147-A177-3AD203B41FA5}">
-                      <a16:colId xmlns:a16="http://schemas.microsoft.com/office/drawing/2014/main" val="2457387389"/>
-                    </a:ext>
-                  </a:extLst>
-                </a:gridCol>
-                <a:gridCol w="1143401">
-                  <a:extLst>
-                    <a:ext uri="{9D8B030D-6E8A-4147-A177-3AD203B41FA5}">
-                      <a16:colId xmlns:a16="http://schemas.microsoft.com/office/drawing/2014/main" val="1969120429"/>
-                    </a:ext>
-                  </a:extLst>
-                </a:gridCol>
-                <a:gridCol w="1143401">
-                  <a:extLst>
-                    <a:ext uri="{9D8B030D-6E8A-4147-A177-3AD203B41FA5}">
-                      <a16:colId xmlns:a16="http://schemas.microsoft.com/office/drawing/2014/main" val="3712415815"/>
-                    </a:ext>
-                  </a:extLst>
-                </a:gridCol>
-                <a:gridCol w="1143401">
-                  <a:extLst>
-                    <a:ext uri="{9D8B030D-6E8A-4147-A177-3AD203B41FA5}">
-                      <a16:colId xmlns:a16="http://schemas.microsoft.com/office/drawing/2014/main" val="1471547768"/>
-                    </a:ext>
-                  </a:extLst>
-                </a:gridCol>
               </a:tblGrid>
-              <a:tr h="557962">
+              <a:tr h="530835">
                 <a:tc>
                   <a:txBody>
                     <a:bodyPr/>
                     <a:lstStyle/>
                     <a:p>
-                      <a:endParaRPr lang="en-US" sz="1400" b="0" dirty="0">
+                      <a:r>
+                        <a:rPr lang="en-US" sz="1400" dirty="0">
+                          <a:solidFill>
+                            <a:schemeClr val="bg1"/>
+                          </a:solidFill>
+                        </a:rPr>
+                        <a:t>Legend segment</a:t>
+                      </a:r>
+                    </a:p>
+                  </a:txBody>
+                  <a:tcPr>
+                    <a:solidFill>
+                      <a:schemeClr val="accent1"/>
+                    </a:solidFill>
+                  </a:tcPr>
+                </a:tc>
+                <a:tc>
+                  <a:txBody>
+                    <a:bodyPr/>
+                    <a:lstStyle/>
+                    <a:p>
+                      <a:r>
+                        <a:rPr lang="en-US" sz="1400" dirty="0"/>
+                        <a:t>41 sec</a:t>
+                      </a:r>
+                    </a:p>
+                  </a:txBody>
+                  <a:tcPr/>
+                </a:tc>
+                <a:extLst>
+                  <a:ext uri="{0D108BD9-81ED-4DB2-BD59-A6C34878D82A}">
+                    <a16:rowId xmlns:a16="http://schemas.microsoft.com/office/drawing/2014/main" val="4238374521"/>
+                  </a:ext>
+                </a:extLst>
+              </a:tr>
+              <a:tr h="530835">
+                <a:tc>
+                  <a:txBody>
+                    <a:bodyPr/>
+                    <a:lstStyle/>
+                    <a:p>
+                      <a:r>
+                        <a:rPr lang="en-US" sz="1400" dirty="0">
+                          <a:solidFill>
+                            <a:schemeClr val="bg1"/>
+                          </a:solidFill>
+                        </a:rPr>
+                        <a:t>Map crop</a:t>
+                      </a:r>
+                    </a:p>
+                  </a:txBody>
+                  <a:tcPr>
+                    <a:solidFill>
+                      <a:schemeClr val="accent1"/>
+                    </a:solidFill>
+                  </a:tcPr>
+                </a:tc>
+                <a:tc>
+                  <a:txBody>
+                    <a:bodyPr/>
+                    <a:lstStyle/>
+                    <a:p>
+                      <a:r>
+                        <a:rPr lang="en-US" sz="1400" dirty="0"/>
+                        <a:t>10 sec</a:t>
+                      </a:r>
+                    </a:p>
+                  </a:txBody>
+                  <a:tcPr/>
+                </a:tc>
+                <a:extLst>
+                  <a:ext uri="{0D108BD9-81ED-4DB2-BD59-A6C34878D82A}">
+                    <a16:rowId xmlns:a16="http://schemas.microsoft.com/office/drawing/2014/main" val="2880323233"/>
+                  </a:ext>
+                </a:extLst>
+              </a:tr>
+              <a:tr h="530835">
+                <a:tc>
+                  <a:txBody>
+                    <a:bodyPr/>
+                    <a:lstStyle/>
+                    <a:p>
+                      <a:r>
+                        <a:rPr lang="en-US" sz="1400" dirty="0">
+                          <a:solidFill>
+                            <a:schemeClr val="bg1"/>
+                          </a:solidFill>
+                        </a:rPr>
+                        <a:t>Text spotting</a:t>
+                      </a:r>
+                    </a:p>
+                  </a:txBody>
+                  <a:tcPr>
+                    <a:solidFill>
+                      <a:schemeClr val="accent1"/>
+                    </a:solidFill>
+                  </a:tcPr>
+                </a:tc>
+                <a:tc>
+                  <a:txBody>
+                    <a:bodyPr/>
+                    <a:lstStyle/>
+                    <a:p>
+                      <a:r>
+                        <a:rPr lang="en-US" sz="1400" dirty="0"/>
+                        <a:t>101 sec</a:t>
+                      </a:r>
+                    </a:p>
+                  </a:txBody>
+                  <a:tcPr/>
+                </a:tc>
+                <a:extLst>
+                  <a:ext uri="{0D108BD9-81ED-4DB2-BD59-A6C34878D82A}">
+                    <a16:rowId xmlns:a16="http://schemas.microsoft.com/office/drawing/2014/main" val="3782917247"/>
+                  </a:ext>
+                </a:extLst>
+              </a:tr>
+              <a:tr h="492968">
+                <a:tc>
+                  <a:txBody>
+                    <a:bodyPr/>
+                    <a:lstStyle/>
+                    <a:p>
+                      <a:r>
+                        <a:rPr lang="en-US" sz="1400" dirty="0">
+                          <a:solidFill>
+                            <a:schemeClr val="bg1"/>
+                          </a:solidFill>
+                        </a:rPr>
+                        <a:t>Legend item segment</a:t>
+                      </a:r>
+                    </a:p>
+                  </a:txBody>
+                  <a:tcPr>
+                    <a:solidFill>
+                      <a:schemeClr val="accent1"/>
+                    </a:solidFill>
+                  </a:tcPr>
+                </a:tc>
+                <a:tc>
+                  <a:txBody>
+                    <a:bodyPr/>
+                    <a:lstStyle/>
+                    <a:p>
+                      <a:r>
+                        <a:rPr lang="en-US" sz="1400" dirty="0"/>
+                        <a:t>21 min</a:t>
+                      </a:r>
+                    </a:p>
+                  </a:txBody>
+                  <a:tcPr/>
+                </a:tc>
+                <a:extLst>
+                  <a:ext uri="{0D108BD9-81ED-4DB2-BD59-A6C34878D82A}">
+                    <a16:rowId xmlns:a16="http://schemas.microsoft.com/office/drawing/2014/main" val="2780537865"/>
+                  </a:ext>
+                </a:extLst>
+              </a:tr>
+              <a:tr h="530835">
+                <a:tc>
+                  <a:txBody>
+                    <a:bodyPr/>
+                    <a:lstStyle/>
+                    <a:p>
+                      <a:r>
+                        <a:rPr lang="en-US" sz="1400" dirty="0">
+                          <a:solidFill>
+                            <a:schemeClr val="bg1"/>
+                          </a:solidFill>
+                        </a:rPr>
+                        <a:t>Legend item description</a:t>
+                      </a:r>
+                    </a:p>
+                  </a:txBody>
+                  <a:tcPr>
+                    <a:solidFill>
+                      <a:schemeClr val="accent1"/>
+                    </a:solidFill>
+                  </a:tcPr>
+                </a:tc>
+                <a:tc>
+                  <a:txBody>
+                    <a:bodyPr/>
+                    <a:lstStyle/>
+                    <a:p>
+                      <a:r>
+                        <a:rPr lang="en-US" sz="1400" dirty="0"/>
+                        <a:t>7 min</a:t>
+                      </a:r>
+                    </a:p>
+                  </a:txBody>
+                  <a:tcPr/>
+                </a:tc>
+                <a:extLst>
+                  <a:ext uri="{0D108BD9-81ED-4DB2-BD59-A6C34878D82A}">
+                    <a16:rowId xmlns:a16="http://schemas.microsoft.com/office/drawing/2014/main" val="2159367563"/>
+                  </a:ext>
+                </a:extLst>
+              </a:tr>
+              <a:tr h="379912">
+                <a:tc>
+                  <a:txBody>
+                    <a:bodyPr/>
+                    <a:lstStyle/>
+                    <a:p>
+                      <a:r>
+                        <a:rPr lang="en-US" sz="1400" dirty="0">
+                          <a:solidFill>
+                            <a:schemeClr val="bg1"/>
+                          </a:solidFill>
+                        </a:rPr>
+                        <a:t>Line extract</a:t>
+                      </a:r>
+                    </a:p>
+                  </a:txBody>
+                  <a:tcPr>
+                    <a:solidFill>
+                      <a:schemeClr val="accent1"/>
+                    </a:solidFill>
+                  </a:tcPr>
+                </a:tc>
+                <a:tc>
+                  <a:txBody>
+                    <a:bodyPr/>
+                    <a:lstStyle/>
+                    <a:p>
+                      <a:endParaRPr lang="en-US" sz="1400" dirty="0"/>
+                    </a:p>
+                  </a:txBody>
+                  <a:tcPr/>
+                </a:tc>
+                <a:extLst>
+                  <a:ext uri="{0D108BD9-81ED-4DB2-BD59-A6C34878D82A}">
+                    <a16:rowId xmlns:a16="http://schemas.microsoft.com/office/drawing/2014/main" val="396977324"/>
+                  </a:ext>
+                </a:extLst>
+              </a:tr>
+              <a:tr h="530835">
+                <a:tc>
+                  <a:txBody>
+                    <a:bodyPr/>
+                    <a:lstStyle/>
+                    <a:p>
+                      <a:r>
+                        <a:rPr lang="en-US" sz="1400" dirty="0">
+                          <a:solidFill>
+                            <a:schemeClr val="bg1"/>
+                          </a:solidFill>
+                        </a:rPr>
+                        <a:t>Polygon extract</a:t>
+                      </a:r>
+                    </a:p>
+                  </a:txBody>
+                  <a:tcPr>
+                    <a:solidFill>
+                      <a:schemeClr val="accent1"/>
+                    </a:solidFill>
+                  </a:tcPr>
+                </a:tc>
+                <a:tc>
+                  <a:txBody>
+                    <a:bodyPr/>
+                    <a:lstStyle/>
+                    <a:p>
+                      <a:r>
+                        <a:rPr lang="en-US" sz="1400" dirty="0"/>
+                        <a:t>3.5 hours</a:t>
+                      </a:r>
+                    </a:p>
+                  </a:txBody>
+                  <a:tcPr/>
+                </a:tc>
+                <a:extLst>
+                  <a:ext uri="{0D108BD9-81ED-4DB2-BD59-A6C34878D82A}">
+                    <a16:rowId xmlns:a16="http://schemas.microsoft.com/office/drawing/2014/main" val="1460583926"/>
+                  </a:ext>
+                </a:extLst>
+              </a:tr>
+              <a:tr h="530835">
+                <a:tc>
+                  <a:txBody>
+                    <a:bodyPr/>
+                    <a:lstStyle/>
+                    <a:p>
+                      <a:r>
+                        <a:rPr lang="en-US" sz="1400" dirty="0">
+                          <a:solidFill>
+                            <a:schemeClr val="bg1"/>
+                          </a:solidFill>
+                        </a:rPr>
+                        <a:t>Point extract</a:t>
+                      </a:r>
+                    </a:p>
+                  </a:txBody>
+                  <a:tcPr>
+                    <a:solidFill>
+                      <a:schemeClr val="accent1"/>
+                    </a:solidFill>
+                  </a:tcPr>
+                </a:tc>
+                <a:tc>
+                  <a:txBody>
+                    <a:bodyPr/>
+                    <a:lstStyle/>
+                    <a:p>
+                      <a:endParaRPr lang="en-US" sz="1400" dirty="0"/>
+                    </a:p>
+                  </a:txBody>
+                  <a:tcPr/>
+                </a:tc>
+                <a:extLst>
+                  <a:ext uri="{0D108BD9-81ED-4DB2-BD59-A6C34878D82A}">
+                    <a16:rowId xmlns:a16="http://schemas.microsoft.com/office/drawing/2014/main" val="3150589495"/>
+                  </a:ext>
+                </a:extLst>
+              </a:tr>
+              <a:tr h="530835">
+                <a:tc>
+                  <a:txBody>
+                    <a:bodyPr/>
+                    <a:lstStyle/>
+                    <a:p>
+                      <a:r>
+                        <a:rPr lang="en-US" sz="1400" dirty="0">
+                          <a:solidFill>
+                            <a:schemeClr val="bg1"/>
+                          </a:solidFill>
+                        </a:rPr>
+                        <a:t>Georeference</a:t>
+                      </a:r>
+                    </a:p>
+                  </a:txBody>
+                  <a:tcPr>
+                    <a:solidFill>
+                      <a:schemeClr val="accent1"/>
+                    </a:solidFill>
+                  </a:tcPr>
+                </a:tc>
+                <a:tc>
+                  <a:txBody>
+                    <a:bodyPr/>
+                    <a:lstStyle/>
+                    <a:p>
+                      <a:r>
+                        <a:rPr lang="en-US" sz="1400" dirty="0"/>
+                        <a:t>(79 sec)</a:t>
+                      </a:r>
+                    </a:p>
+                  </a:txBody>
+                  <a:tcPr/>
+                </a:tc>
+                <a:extLst>
+                  <a:ext uri="{0D108BD9-81ED-4DB2-BD59-A6C34878D82A}">
+                    <a16:rowId xmlns:a16="http://schemas.microsoft.com/office/drawing/2014/main" val="3539792285"/>
+                  </a:ext>
+                </a:extLst>
+              </a:tr>
+              <a:tr h="530835">
+                <a:tc>
+                  <a:txBody>
+                    <a:bodyPr/>
+                    <a:lstStyle/>
+                    <a:p>
+                      <a:r>
+                        <a:rPr lang="en-US" sz="1400" dirty="0">
+                          <a:solidFill>
+                            <a:schemeClr val="bg1"/>
+                          </a:solidFill>
+                        </a:rPr>
+                        <a:t>Geopackage</a:t>
+                      </a:r>
+                    </a:p>
+                    <a:p>
+                      <a:endParaRPr lang="en-US" sz="1400" dirty="0">
                         <a:solidFill>
                           <a:schemeClr val="bg1"/>
                         </a:solidFill>
@@ -4050,234 +4451,6 @@
                     <a:bodyPr/>
                     <a:lstStyle/>
                     <a:p>
-                      <a:r>
-                        <a:rPr lang="en-US" sz="1400" b="0" dirty="0"/>
-                        <a:t>elapsed time</a:t>
-                      </a:r>
-                    </a:p>
-                  </a:txBody>
-                  <a:tcPr/>
-                </a:tc>
-                <a:tc>
-                  <a:txBody>
-                    <a:bodyPr/>
-                    <a:lstStyle/>
-                    <a:p>
-                      <a:r>
-                        <a:rPr lang="en-US" sz="1400" b="0" dirty="0"/>
-                        <a:t>avg cpu %</a:t>
-                      </a:r>
-                    </a:p>
-                  </a:txBody>
-                  <a:tcPr/>
-                </a:tc>
-                <a:tc>
-                  <a:txBody>
-                    <a:bodyPr/>
-                    <a:lstStyle/>
-                    <a:p>
-                      <a:r>
-                        <a:rPr lang="en-US" sz="1400" b="0" dirty="0"/>
-                        <a:t>peak cpu %</a:t>
-                      </a:r>
-                    </a:p>
-                  </a:txBody>
-                  <a:tcPr/>
-                </a:tc>
-                <a:tc>
-                  <a:txBody>
-                    <a:bodyPr/>
-                    <a:lstStyle/>
-                    <a:p>
-                      <a:r>
-                        <a:rPr lang="en-US" sz="1400" b="0" dirty="0"/>
-                        <a:t>avg mem (GB)</a:t>
-                      </a:r>
-                    </a:p>
-                  </a:txBody>
-                  <a:tcPr/>
-                </a:tc>
-                <a:tc>
-                  <a:txBody>
-                    <a:bodyPr/>
-                    <a:lstStyle/>
-                    <a:p>
-                      <a:r>
-                        <a:rPr lang="en-US" sz="1400" b="0" dirty="0"/>
-                        <a:t>peak mem (GB)</a:t>
-                      </a:r>
-                    </a:p>
-                  </a:txBody>
-                  <a:tcPr/>
-                </a:tc>
-                <a:tc>
-                  <a:txBody>
-                    <a:bodyPr/>
-                    <a:lstStyle/>
-                    <a:p>
-                      <a:r>
-                        <a:rPr lang="en-US" sz="1400" b="0" dirty="0"/>
-                        <a:t>avg gpu %</a:t>
-                      </a:r>
-                    </a:p>
-                  </a:txBody>
-                  <a:tcPr/>
-                </a:tc>
-                <a:tc>
-                  <a:txBody>
-                    <a:bodyPr/>
-                    <a:lstStyle/>
-                    <a:p>
-                      <a:r>
-                        <a:rPr lang="en-US" sz="1400" b="0" dirty="0"/>
-                        <a:t>peak gpu %</a:t>
-                      </a:r>
-                    </a:p>
-                  </a:txBody>
-                  <a:tcPr/>
-                </a:tc>
-                <a:tc>
-                  <a:txBody>
-                    <a:bodyPr/>
-                    <a:lstStyle/>
-                    <a:p>
-                      <a:r>
-                        <a:rPr lang="en-US" sz="1400" b="0" dirty="0"/>
-                        <a:t>avg gpu mem (GB)</a:t>
-                      </a:r>
-                    </a:p>
-                  </a:txBody>
-                  <a:tcPr/>
-                </a:tc>
-                <a:tc>
-                  <a:txBody>
-                    <a:bodyPr/>
-                    <a:lstStyle/>
-                    <a:p>
-                      <a:r>
-                        <a:rPr lang="en-US" sz="1400" b="0" dirty="0"/>
-                        <a:t>peak gpu mem (GB)</a:t>
-                      </a:r>
-                    </a:p>
-                  </a:txBody>
-                  <a:tcPr/>
-                </a:tc>
-                <a:extLst>
-                  <a:ext uri="{0D108BD9-81ED-4DB2-BD59-A6C34878D82A}">
-                    <a16:rowId xmlns:a16="http://schemas.microsoft.com/office/drawing/2014/main" val="2533410153"/>
-                  </a:ext>
-                </a:extLst>
-              </a:tr>
-              <a:tr h="557962">
-                <a:tc>
-                  <a:txBody>
-                    <a:bodyPr/>
-                    <a:lstStyle/>
-                    <a:p>
-                      <a:r>
-                        <a:rPr lang="en-US" sz="1400" dirty="0">
-                          <a:solidFill>
-                            <a:schemeClr val="bg1"/>
-                          </a:solidFill>
-                        </a:rPr>
-                        <a:t>legend segment</a:t>
-                      </a:r>
-                    </a:p>
-                  </a:txBody>
-                  <a:tcPr>
-                    <a:solidFill>
-                      <a:schemeClr val="accent1"/>
-                    </a:solidFill>
-                  </a:tcPr>
-                </a:tc>
-                <a:tc>
-                  <a:txBody>
-                    <a:bodyPr/>
-                    <a:lstStyle/>
-                    <a:p>
-                      <a:r>
-                        <a:rPr lang="en-US" sz="1400" dirty="0"/>
-                        <a:t>34 sec</a:t>
-                      </a:r>
-                    </a:p>
-                  </a:txBody>
-                  <a:tcPr/>
-                </a:tc>
-                <a:tc>
-                  <a:txBody>
-                    <a:bodyPr/>
-                    <a:lstStyle/>
-                    <a:p>
-                      <a:endParaRPr lang="en-US" sz="1400" dirty="0"/>
-                    </a:p>
-                  </a:txBody>
-                  <a:tcPr/>
-                </a:tc>
-                <a:tc>
-                  <a:txBody>
-                    <a:bodyPr/>
-                    <a:lstStyle/>
-                    <a:p>
-                      <a:endParaRPr lang="en-US" sz="1400" dirty="0"/>
-                    </a:p>
-                  </a:txBody>
-                  <a:tcPr/>
-                </a:tc>
-                <a:tc>
-                  <a:txBody>
-                    <a:bodyPr/>
-                    <a:lstStyle/>
-                    <a:p>
-                      <a:endParaRPr lang="en-US" sz="1400" dirty="0"/>
-                    </a:p>
-                  </a:txBody>
-                  <a:tcPr/>
-                </a:tc>
-                <a:tc>
-                  <a:txBody>
-                    <a:bodyPr/>
-                    <a:lstStyle/>
-                    <a:p>
-                      <a:endParaRPr lang="en-US" sz="1400" dirty="0"/>
-                    </a:p>
-                  </a:txBody>
-                  <a:tcPr/>
-                </a:tc>
-                <a:tc>
-                  <a:txBody>
-                    <a:bodyPr/>
-                    <a:lstStyle/>
-                    <a:p>
-                      <a:endParaRPr lang="en-US" sz="1400" dirty="0"/>
-                    </a:p>
-                  </a:txBody>
-                  <a:tcPr/>
-                </a:tc>
-                <a:tc>
-                  <a:txBody>
-                    <a:bodyPr/>
-                    <a:lstStyle/>
-                    <a:p>
-                      <a:endParaRPr lang="en-US" sz="1400" dirty="0"/>
-                    </a:p>
-                  </a:txBody>
-                  <a:tcPr/>
-                </a:tc>
-                <a:tc>
-                  <a:txBody>
-                    <a:bodyPr/>
-                    <a:lstStyle/>
-                    <a:p>
-                      <a:endParaRPr lang="en-US" sz="1400" dirty="0"/>
-                    </a:p>
-                  </a:txBody>
-                  <a:tcPr/>
-                </a:tc>
-                <a:tc>
-                  <a:txBody>
-                    <a:bodyPr/>
-                    <a:lstStyle/>
-                    <a:p>
                       <a:endParaRPr lang="en-US" sz="1400" dirty="0"/>
                     </a:p>
                   </a:txBody>
@@ -4285,975 +4458,7 @@
                 </a:tc>
                 <a:extLst>
                   <a:ext uri="{0D108BD9-81ED-4DB2-BD59-A6C34878D82A}">
-                    <a16:rowId xmlns:a16="http://schemas.microsoft.com/office/drawing/2014/main" val="4238374521"/>
-                  </a:ext>
-                </a:extLst>
-              </a:tr>
-              <a:tr h="557962">
-                <a:tc>
-                  <a:txBody>
-                    <a:bodyPr/>
-                    <a:lstStyle/>
-                    <a:p>
-                      <a:r>
-                        <a:rPr lang="en-US" sz="1400" dirty="0">
-                          <a:solidFill>
-                            <a:schemeClr val="bg1"/>
-                          </a:solidFill>
-                        </a:rPr>
-                        <a:t>legend item segment</a:t>
-                      </a:r>
-                    </a:p>
-                  </a:txBody>
-                  <a:tcPr>
-                    <a:solidFill>
-                      <a:schemeClr val="accent1"/>
-                    </a:solidFill>
-                  </a:tcPr>
-                </a:tc>
-                <a:tc>
-                  <a:txBody>
-                    <a:bodyPr/>
-                    <a:lstStyle/>
-                    <a:p>
-                      <a:r>
-                        <a:rPr lang="en-US" sz="1400" dirty="0"/>
-                        <a:t>96 min</a:t>
-                      </a:r>
-                    </a:p>
-                  </a:txBody>
-                  <a:tcPr/>
-                </a:tc>
-                <a:tc>
-                  <a:txBody>
-                    <a:bodyPr/>
-                    <a:lstStyle/>
-                    <a:p>
-                      <a:endParaRPr lang="en-US" sz="1400" dirty="0"/>
-                    </a:p>
-                  </a:txBody>
-                  <a:tcPr/>
-                </a:tc>
-                <a:tc>
-                  <a:txBody>
-                    <a:bodyPr/>
-                    <a:lstStyle/>
-                    <a:p>
-                      <a:endParaRPr lang="en-US" sz="1400" dirty="0"/>
-                    </a:p>
-                  </a:txBody>
-                  <a:tcPr/>
-                </a:tc>
-                <a:tc>
-                  <a:txBody>
-                    <a:bodyPr/>
-                    <a:lstStyle/>
-                    <a:p>
-                      <a:endParaRPr lang="en-US" sz="1400" dirty="0"/>
-                    </a:p>
-                  </a:txBody>
-                  <a:tcPr/>
-                </a:tc>
-                <a:tc>
-                  <a:txBody>
-                    <a:bodyPr/>
-                    <a:lstStyle/>
-                    <a:p>
-                      <a:endParaRPr lang="en-US" sz="1400" dirty="0"/>
-                    </a:p>
-                  </a:txBody>
-                  <a:tcPr/>
-                </a:tc>
-                <a:tc>
-                  <a:txBody>
-                    <a:bodyPr/>
-                    <a:lstStyle/>
-                    <a:p>
-                      <a:endParaRPr lang="en-US" sz="1400" dirty="0"/>
-                    </a:p>
-                  </a:txBody>
-                  <a:tcPr/>
-                </a:tc>
-                <a:tc>
-                  <a:txBody>
-                    <a:bodyPr/>
-                    <a:lstStyle/>
-                    <a:p>
-                      <a:endParaRPr lang="en-US" sz="1400" dirty="0"/>
-                    </a:p>
-                  </a:txBody>
-                  <a:tcPr/>
-                </a:tc>
-                <a:tc>
-                  <a:txBody>
-                    <a:bodyPr/>
-                    <a:lstStyle/>
-                    <a:p>
-                      <a:endParaRPr lang="en-US" sz="1400" dirty="0"/>
-                    </a:p>
-                  </a:txBody>
-                  <a:tcPr/>
-                </a:tc>
-                <a:tc>
-                  <a:txBody>
-                    <a:bodyPr/>
-                    <a:lstStyle/>
-                    <a:p>
-                      <a:endParaRPr lang="en-US" sz="1400" dirty="0"/>
-                    </a:p>
-                  </a:txBody>
-                  <a:tcPr/>
-                </a:tc>
-                <a:extLst>
-                  <a:ext uri="{0D108BD9-81ED-4DB2-BD59-A6C34878D82A}">
-                    <a16:rowId xmlns:a16="http://schemas.microsoft.com/office/drawing/2014/main" val="2880323233"/>
-                  </a:ext>
-                </a:extLst>
-              </a:tr>
-              <a:tr h="557962">
-                <a:tc>
-                  <a:txBody>
-                    <a:bodyPr/>
-                    <a:lstStyle/>
-                    <a:p>
-                      <a:r>
-                        <a:rPr lang="en-US" sz="1400" dirty="0">
-                          <a:solidFill>
-                            <a:schemeClr val="bg1"/>
-                          </a:solidFill>
-                        </a:rPr>
-                        <a:t>legend item description</a:t>
-                      </a:r>
-                    </a:p>
-                  </a:txBody>
-                  <a:tcPr>
-                    <a:solidFill>
-                      <a:schemeClr val="accent1"/>
-                    </a:solidFill>
-                  </a:tcPr>
-                </a:tc>
-                <a:tc>
-                  <a:txBody>
-                    <a:bodyPr/>
-                    <a:lstStyle/>
-                    <a:p>
-                      <a:r>
-                        <a:rPr lang="en-US" sz="1400" dirty="0"/>
-                        <a:t>6 min</a:t>
-                      </a:r>
-                    </a:p>
-                  </a:txBody>
-                  <a:tcPr/>
-                </a:tc>
-                <a:tc>
-                  <a:txBody>
-                    <a:bodyPr/>
-                    <a:lstStyle/>
-                    <a:p>
-                      <a:endParaRPr lang="en-US" sz="1400" dirty="0"/>
-                    </a:p>
-                  </a:txBody>
-                  <a:tcPr/>
-                </a:tc>
-                <a:tc>
-                  <a:txBody>
-                    <a:bodyPr/>
-                    <a:lstStyle/>
-                    <a:p>
-                      <a:endParaRPr lang="en-US" sz="1400" dirty="0"/>
-                    </a:p>
-                  </a:txBody>
-                  <a:tcPr/>
-                </a:tc>
-                <a:tc>
-                  <a:txBody>
-                    <a:bodyPr/>
-                    <a:lstStyle/>
-                    <a:p>
-                      <a:endParaRPr lang="en-US" sz="1400" dirty="0"/>
-                    </a:p>
-                  </a:txBody>
-                  <a:tcPr/>
-                </a:tc>
-                <a:tc>
-                  <a:txBody>
-                    <a:bodyPr/>
-                    <a:lstStyle/>
-                    <a:p>
-                      <a:endParaRPr lang="en-US" sz="1400" dirty="0"/>
-                    </a:p>
-                  </a:txBody>
-                  <a:tcPr/>
-                </a:tc>
-                <a:tc>
-                  <a:txBody>
-                    <a:bodyPr/>
-                    <a:lstStyle/>
-                    <a:p>
-                      <a:endParaRPr lang="en-US" sz="1400" dirty="0"/>
-                    </a:p>
-                  </a:txBody>
-                  <a:tcPr/>
-                </a:tc>
-                <a:tc>
-                  <a:txBody>
-                    <a:bodyPr/>
-                    <a:lstStyle/>
-                    <a:p>
-                      <a:endParaRPr lang="en-US" sz="1400" dirty="0"/>
-                    </a:p>
-                  </a:txBody>
-                  <a:tcPr/>
-                </a:tc>
-                <a:tc>
-                  <a:txBody>
-                    <a:bodyPr/>
-                    <a:lstStyle/>
-                    <a:p>
-                      <a:endParaRPr lang="en-US" sz="1400" dirty="0"/>
-                    </a:p>
-                  </a:txBody>
-                  <a:tcPr/>
-                </a:tc>
-                <a:tc>
-                  <a:txBody>
-                    <a:bodyPr/>
-                    <a:lstStyle/>
-                    <a:p>
-                      <a:endParaRPr lang="en-US" sz="1400" dirty="0"/>
-                    </a:p>
-                  </a:txBody>
-                  <a:tcPr/>
-                </a:tc>
-                <a:extLst>
-                  <a:ext uri="{0D108BD9-81ED-4DB2-BD59-A6C34878D82A}">
-                    <a16:rowId xmlns:a16="http://schemas.microsoft.com/office/drawing/2014/main" val="3782917247"/>
-                  </a:ext>
-                </a:extLst>
-              </a:tr>
-              <a:tr h="399326">
-                <a:tc>
-                  <a:txBody>
-                    <a:bodyPr/>
-                    <a:lstStyle/>
-                    <a:p>
-                      <a:r>
-                        <a:rPr lang="en-US" sz="1400" dirty="0">
-                          <a:solidFill>
-                            <a:schemeClr val="bg1"/>
-                          </a:solidFill>
-                        </a:rPr>
-                        <a:t>map crop</a:t>
-                      </a:r>
-                    </a:p>
-                  </a:txBody>
-                  <a:tcPr>
-                    <a:solidFill>
-                      <a:schemeClr val="accent1"/>
-                    </a:solidFill>
-                  </a:tcPr>
-                </a:tc>
-                <a:tc>
-                  <a:txBody>
-                    <a:bodyPr/>
-                    <a:lstStyle/>
-                    <a:p>
-                      <a:r>
-                        <a:rPr lang="en-US" sz="1400" dirty="0"/>
-                        <a:t>11 sec</a:t>
-                      </a:r>
-                    </a:p>
-                  </a:txBody>
-                  <a:tcPr/>
-                </a:tc>
-                <a:tc>
-                  <a:txBody>
-                    <a:bodyPr/>
-                    <a:lstStyle/>
-                    <a:p>
-                      <a:endParaRPr lang="en-US" sz="1400" dirty="0"/>
-                    </a:p>
-                  </a:txBody>
-                  <a:tcPr/>
-                </a:tc>
-                <a:tc>
-                  <a:txBody>
-                    <a:bodyPr/>
-                    <a:lstStyle/>
-                    <a:p>
-                      <a:endParaRPr lang="en-US" sz="1400" dirty="0"/>
-                    </a:p>
-                  </a:txBody>
-                  <a:tcPr/>
-                </a:tc>
-                <a:tc>
-                  <a:txBody>
-                    <a:bodyPr/>
-                    <a:lstStyle/>
-                    <a:p>
-                      <a:endParaRPr lang="en-US" sz="1400" dirty="0"/>
-                    </a:p>
-                  </a:txBody>
-                  <a:tcPr/>
-                </a:tc>
-                <a:tc>
-                  <a:txBody>
-                    <a:bodyPr/>
-                    <a:lstStyle/>
-                    <a:p>
-                      <a:endParaRPr lang="en-US" sz="1400" dirty="0"/>
-                    </a:p>
-                  </a:txBody>
-                  <a:tcPr/>
-                </a:tc>
-                <a:tc>
-                  <a:txBody>
-                    <a:bodyPr/>
-                    <a:lstStyle/>
-                    <a:p>
-                      <a:endParaRPr lang="en-US" sz="1400" dirty="0"/>
-                    </a:p>
-                  </a:txBody>
-                  <a:tcPr/>
-                </a:tc>
-                <a:tc>
-                  <a:txBody>
-                    <a:bodyPr/>
-                    <a:lstStyle/>
-                    <a:p>
-                      <a:endParaRPr lang="en-US" sz="1400" dirty="0"/>
-                    </a:p>
-                  </a:txBody>
-                  <a:tcPr/>
-                </a:tc>
-                <a:tc>
-                  <a:txBody>
-                    <a:bodyPr/>
-                    <a:lstStyle/>
-                    <a:p>
-                      <a:endParaRPr lang="en-US" sz="1400" dirty="0"/>
-                    </a:p>
-                  </a:txBody>
-                  <a:tcPr/>
-                </a:tc>
-                <a:tc>
-                  <a:txBody>
-                    <a:bodyPr/>
-                    <a:lstStyle/>
-                    <a:p>
-                      <a:endParaRPr lang="en-US" sz="1400" dirty="0"/>
-                    </a:p>
-                  </a:txBody>
-                  <a:tcPr/>
-                </a:tc>
-                <a:extLst>
-                  <a:ext uri="{0D108BD9-81ED-4DB2-BD59-A6C34878D82A}">
-                    <a16:rowId xmlns:a16="http://schemas.microsoft.com/office/drawing/2014/main" val="2780537865"/>
-                  </a:ext>
-                </a:extLst>
-              </a:tr>
-              <a:tr h="557962">
-                <a:tc>
-                  <a:txBody>
-                    <a:bodyPr/>
-                    <a:lstStyle/>
-                    <a:p>
-                      <a:r>
-                        <a:rPr lang="en-US" sz="1400" dirty="0">
-                          <a:solidFill>
-                            <a:schemeClr val="bg1"/>
-                          </a:solidFill>
-                        </a:rPr>
-                        <a:t>text spotting</a:t>
-                      </a:r>
-                    </a:p>
-                  </a:txBody>
-                  <a:tcPr>
-                    <a:solidFill>
-                      <a:schemeClr val="accent1"/>
-                    </a:solidFill>
-                  </a:tcPr>
-                </a:tc>
-                <a:tc>
-                  <a:txBody>
-                    <a:bodyPr/>
-                    <a:lstStyle/>
-                    <a:p>
-                      <a:r>
-                        <a:rPr lang="en-US" sz="1400" dirty="0"/>
-                        <a:t>255 sec</a:t>
-                      </a:r>
-                    </a:p>
-                  </a:txBody>
-                  <a:tcPr/>
-                </a:tc>
-                <a:tc>
-                  <a:txBody>
-                    <a:bodyPr/>
-                    <a:lstStyle/>
-                    <a:p>
-                      <a:endParaRPr lang="en-US" sz="1400" dirty="0"/>
-                    </a:p>
-                  </a:txBody>
-                  <a:tcPr/>
-                </a:tc>
-                <a:tc>
-                  <a:txBody>
-                    <a:bodyPr/>
-                    <a:lstStyle/>
-                    <a:p>
-                      <a:endParaRPr lang="en-US" sz="1400" dirty="0"/>
-                    </a:p>
-                  </a:txBody>
-                  <a:tcPr/>
-                </a:tc>
-                <a:tc>
-                  <a:txBody>
-                    <a:bodyPr/>
-                    <a:lstStyle/>
-                    <a:p>
-                      <a:endParaRPr lang="en-US" sz="1400" dirty="0"/>
-                    </a:p>
-                  </a:txBody>
-                  <a:tcPr/>
-                </a:tc>
-                <a:tc>
-                  <a:txBody>
-                    <a:bodyPr/>
-                    <a:lstStyle/>
-                    <a:p>
-                      <a:endParaRPr lang="en-US" sz="1400" dirty="0"/>
-                    </a:p>
-                  </a:txBody>
-                  <a:tcPr/>
-                </a:tc>
-                <a:tc>
-                  <a:txBody>
-                    <a:bodyPr/>
-                    <a:lstStyle/>
-                    <a:p>
-                      <a:endParaRPr lang="en-US" sz="1400" dirty="0"/>
-                    </a:p>
-                  </a:txBody>
-                  <a:tcPr/>
-                </a:tc>
-                <a:tc>
-                  <a:txBody>
-                    <a:bodyPr/>
-                    <a:lstStyle/>
-                    <a:p>
-                      <a:endParaRPr lang="en-US" sz="1400" dirty="0"/>
-                    </a:p>
-                  </a:txBody>
-                  <a:tcPr/>
-                </a:tc>
-                <a:tc>
-                  <a:txBody>
-                    <a:bodyPr/>
-                    <a:lstStyle/>
-                    <a:p>
-                      <a:endParaRPr lang="en-US" sz="1400" dirty="0"/>
-                    </a:p>
-                  </a:txBody>
-                  <a:tcPr/>
-                </a:tc>
-                <a:tc>
-                  <a:txBody>
-                    <a:bodyPr/>
-                    <a:lstStyle/>
-                    <a:p>
-                      <a:endParaRPr lang="en-US" sz="1400" dirty="0"/>
-                    </a:p>
-                  </a:txBody>
-                  <a:tcPr/>
-                </a:tc>
-                <a:extLst>
-                  <a:ext uri="{0D108BD9-81ED-4DB2-BD59-A6C34878D82A}">
-                    <a16:rowId xmlns:a16="http://schemas.microsoft.com/office/drawing/2014/main" val="2159367563"/>
-                  </a:ext>
-                </a:extLst>
-              </a:tr>
-              <a:tr h="399326">
-                <a:tc>
-                  <a:txBody>
-                    <a:bodyPr/>
-                    <a:lstStyle/>
-                    <a:p>
-                      <a:r>
-                        <a:rPr lang="en-US" sz="1400" dirty="0">
-                          <a:solidFill>
-                            <a:schemeClr val="bg1"/>
-                          </a:solidFill>
-                        </a:rPr>
-                        <a:t>line extract</a:t>
-                      </a:r>
-                    </a:p>
-                  </a:txBody>
-                  <a:tcPr>
-                    <a:solidFill>
-                      <a:schemeClr val="accent1"/>
-                    </a:solidFill>
-                  </a:tcPr>
-                </a:tc>
-                <a:tc>
-                  <a:txBody>
-                    <a:bodyPr/>
-                    <a:lstStyle/>
-                    <a:p>
-                      <a:r>
-                        <a:rPr lang="en-US" sz="1400" dirty="0"/>
-                        <a:t>…</a:t>
-                      </a:r>
-                    </a:p>
-                  </a:txBody>
-                  <a:tcPr/>
-                </a:tc>
-                <a:tc>
-                  <a:txBody>
-                    <a:bodyPr/>
-                    <a:lstStyle/>
-                    <a:p>
-                      <a:endParaRPr lang="en-US" sz="1400" dirty="0"/>
-                    </a:p>
-                  </a:txBody>
-                  <a:tcPr/>
-                </a:tc>
-                <a:tc>
-                  <a:txBody>
-                    <a:bodyPr/>
-                    <a:lstStyle/>
-                    <a:p>
-                      <a:endParaRPr lang="en-US" sz="1400" dirty="0"/>
-                    </a:p>
-                  </a:txBody>
-                  <a:tcPr/>
-                </a:tc>
-                <a:tc>
-                  <a:txBody>
-                    <a:bodyPr/>
-                    <a:lstStyle/>
-                    <a:p>
-                      <a:endParaRPr lang="en-US" sz="1400" dirty="0"/>
-                    </a:p>
-                  </a:txBody>
-                  <a:tcPr/>
-                </a:tc>
-                <a:tc>
-                  <a:txBody>
-                    <a:bodyPr/>
-                    <a:lstStyle/>
-                    <a:p>
-                      <a:endParaRPr lang="en-US" sz="1400" dirty="0"/>
-                    </a:p>
-                  </a:txBody>
-                  <a:tcPr/>
-                </a:tc>
-                <a:tc>
-                  <a:txBody>
-                    <a:bodyPr/>
-                    <a:lstStyle/>
-                    <a:p>
-                      <a:endParaRPr lang="en-US" sz="1400" dirty="0"/>
-                    </a:p>
-                  </a:txBody>
-                  <a:tcPr/>
-                </a:tc>
-                <a:tc>
-                  <a:txBody>
-                    <a:bodyPr/>
-                    <a:lstStyle/>
-                    <a:p>
-                      <a:endParaRPr lang="en-US" sz="1400" dirty="0"/>
-                    </a:p>
-                  </a:txBody>
-                  <a:tcPr/>
-                </a:tc>
-                <a:tc>
-                  <a:txBody>
-                    <a:bodyPr/>
-                    <a:lstStyle/>
-                    <a:p>
-                      <a:endParaRPr lang="en-US" sz="1400" dirty="0"/>
-                    </a:p>
-                  </a:txBody>
-                  <a:tcPr/>
-                </a:tc>
-                <a:tc>
-                  <a:txBody>
-                    <a:bodyPr/>
-                    <a:lstStyle/>
-                    <a:p>
-                      <a:endParaRPr lang="en-US" sz="1400" dirty="0"/>
-                    </a:p>
-                  </a:txBody>
-                  <a:tcPr/>
-                </a:tc>
-                <a:extLst>
-                  <a:ext uri="{0D108BD9-81ED-4DB2-BD59-A6C34878D82A}">
-                    <a16:rowId xmlns:a16="http://schemas.microsoft.com/office/drawing/2014/main" val="396977324"/>
-                  </a:ext>
-                </a:extLst>
-              </a:tr>
-              <a:tr h="557962">
-                <a:tc>
-                  <a:txBody>
-                    <a:bodyPr/>
-                    <a:lstStyle/>
-                    <a:p>
-                      <a:r>
-                        <a:rPr lang="en-US" sz="1400" dirty="0">
-                          <a:solidFill>
-                            <a:schemeClr val="bg1"/>
-                          </a:solidFill>
-                        </a:rPr>
-                        <a:t>polygon extract</a:t>
-                      </a:r>
-                    </a:p>
-                  </a:txBody>
-                  <a:tcPr>
-                    <a:solidFill>
-                      <a:schemeClr val="accent1"/>
-                    </a:solidFill>
-                  </a:tcPr>
-                </a:tc>
-                <a:tc>
-                  <a:txBody>
-                    <a:bodyPr/>
-                    <a:lstStyle/>
-                    <a:p>
-                      <a:r>
-                        <a:rPr lang="en-US" sz="1400" dirty="0"/>
-                        <a:t>…</a:t>
-                      </a:r>
-                    </a:p>
-                  </a:txBody>
-                  <a:tcPr/>
-                </a:tc>
-                <a:tc>
-                  <a:txBody>
-                    <a:bodyPr/>
-                    <a:lstStyle/>
-                    <a:p>
-                      <a:endParaRPr lang="en-US" sz="1400" dirty="0"/>
-                    </a:p>
-                  </a:txBody>
-                  <a:tcPr/>
-                </a:tc>
-                <a:tc>
-                  <a:txBody>
-                    <a:bodyPr/>
-                    <a:lstStyle/>
-                    <a:p>
-                      <a:endParaRPr lang="en-US" sz="1400" dirty="0"/>
-                    </a:p>
-                  </a:txBody>
-                  <a:tcPr/>
-                </a:tc>
-                <a:tc>
-                  <a:txBody>
-                    <a:bodyPr/>
-                    <a:lstStyle/>
-                    <a:p>
-                      <a:endParaRPr lang="en-US" sz="1400" dirty="0"/>
-                    </a:p>
-                  </a:txBody>
-                  <a:tcPr/>
-                </a:tc>
-                <a:tc>
-                  <a:txBody>
-                    <a:bodyPr/>
-                    <a:lstStyle/>
-                    <a:p>
-                      <a:endParaRPr lang="en-US" sz="1400" dirty="0"/>
-                    </a:p>
-                  </a:txBody>
-                  <a:tcPr/>
-                </a:tc>
-                <a:tc>
-                  <a:txBody>
-                    <a:bodyPr/>
-                    <a:lstStyle/>
-                    <a:p>
-                      <a:endParaRPr lang="en-US" sz="1400" dirty="0"/>
-                    </a:p>
-                  </a:txBody>
-                  <a:tcPr/>
-                </a:tc>
-                <a:tc>
-                  <a:txBody>
-                    <a:bodyPr/>
-                    <a:lstStyle/>
-                    <a:p>
-                      <a:endParaRPr lang="en-US" sz="1400" dirty="0"/>
-                    </a:p>
-                  </a:txBody>
-                  <a:tcPr/>
-                </a:tc>
-                <a:tc>
-                  <a:txBody>
-                    <a:bodyPr/>
-                    <a:lstStyle/>
-                    <a:p>
-                      <a:endParaRPr lang="en-US" sz="1400" dirty="0"/>
-                    </a:p>
-                  </a:txBody>
-                  <a:tcPr/>
-                </a:tc>
-                <a:tc>
-                  <a:txBody>
-                    <a:bodyPr/>
-                    <a:lstStyle/>
-                    <a:p>
-                      <a:endParaRPr lang="en-US" sz="1400" dirty="0"/>
-                    </a:p>
-                  </a:txBody>
-                  <a:tcPr/>
-                </a:tc>
-                <a:extLst>
-                  <a:ext uri="{0D108BD9-81ED-4DB2-BD59-A6C34878D82A}">
-                    <a16:rowId xmlns:a16="http://schemas.microsoft.com/office/drawing/2014/main" val="1460583926"/>
-                  </a:ext>
-                </a:extLst>
-              </a:tr>
-              <a:tr h="557962">
-                <a:tc>
-                  <a:txBody>
-                    <a:bodyPr/>
-                    <a:lstStyle/>
-                    <a:p>
-                      <a:r>
-                        <a:rPr lang="en-US" sz="1400" dirty="0">
-                          <a:solidFill>
-                            <a:schemeClr val="bg1"/>
-                          </a:solidFill>
-                        </a:rPr>
-                        <a:t>point extract</a:t>
-                      </a:r>
-                    </a:p>
-                  </a:txBody>
-                  <a:tcPr>
-                    <a:solidFill>
-                      <a:schemeClr val="accent1"/>
-                    </a:solidFill>
-                  </a:tcPr>
-                </a:tc>
-                <a:tc>
-                  <a:txBody>
-                    <a:bodyPr/>
-                    <a:lstStyle/>
-                    <a:p>
-                      <a:r>
-                        <a:rPr lang="en-US" sz="1400" dirty="0"/>
-                        <a:t>…</a:t>
-                      </a:r>
-                    </a:p>
-                  </a:txBody>
-                  <a:tcPr/>
-                </a:tc>
-                <a:tc>
-                  <a:txBody>
-                    <a:bodyPr/>
-                    <a:lstStyle/>
-                    <a:p>
-                      <a:endParaRPr lang="en-US" sz="1400" dirty="0"/>
-                    </a:p>
-                  </a:txBody>
-                  <a:tcPr/>
-                </a:tc>
-                <a:tc>
-                  <a:txBody>
-                    <a:bodyPr/>
-                    <a:lstStyle/>
-                    <a:p>
-                      <a:endParaRPr lang="en-US" sz="1400" dirty="0"/>
-                    </a:p>
-                  </a:txBody>
-                  <a:tcPr/>
-                </a:tc>
-                <a:tc>
-                  <a:txBody>
-                    <a:bodyPr/>
-                    <a:lstStyle/>
-                    <a:p>
-                      <a:endParaRPr lang="en-US" sz="1400" dirty="0"/>
-                    </a:p>
-                  </a:txBody>
-                  <a:tcPr/>
-                </a:tc>
-                <a:tc>
-                  <a:txBody>
-                    <a:bodyPr/>
-                    <a:lstStyle/>
-                    <a:p>
-                      <a:endParaRPr lang="en-US" sz="1400" dirty="0"/>
-                    </a:p>
-                  </a:txBody>
-                  <a:tcPr/>
-                </a:tc>
-                <a:tc>
-                  <a:txBody>
-                    <a:bodyPr/>
-                    <a:lstStyle/>
-                    <a:p>
-                      <a:endParaRPr lang="en-US" sz="1400" dirty="0"/>
-                    </a:p>
-                  </a:txBody>
-                  <a:tcPr/>
-                </a:tc>
-                <a:tc>
-                  <a:txBody>
-                    <a:bodyPr/>
-                    <a:lstStyle/>
-                    <a:p>
-                      <a:endParaRPr lang="en-US" sz="1400" dirty="0"/>
-                    </a:p>
-                  </a:txBody>
-                  <a:tcPr/>
-                </a:tc>
-                <a:tc>
-                  <a:txBody>
-                    <a:bodyPr/>
-                    <a:lstStyle/>
-                    <a:p>
-                      <a:endParaRPr lang="en-US" sz="1400" dirty="0"/>
-                    </a:p>
-                  </a:txBody>
-                  <a:tcPr/>
-                </a:tc>
-                <a:tc>
-                  <a:txBody>
-                    <a:bodyPr/>
-                    <a:lstStyle/>
-                    <a:p>
-                      <a:endParaRPr lang="en-US" sz="1400" dirty="0"/>
-                    </a:p>
-                  </a:txBody>
-                  <a:tcPr/>
-                </a:tc>
-                <a:extLst>
-                  <a:ext uri="{0D108BD9-81ED-4DB2-BD59-A6C34878D82A}">
-                    <a16:rowId xmlns:a16="http://schemas.microsoft.com/office/drawing/2014/main" val="3150589495"/>
-                  </a:ext>
-                </a:extLst>
-              </a:tr>
-              <a:tr h="557962">
-                <a:tc>
-                  <a:txBody>
-                    <a:bodyPr/>
-                    <a:lstStyle/>
-                    <a:p>
-                      <a:r>
-                        <a:rPr lang="en-US" sz="1400" dirty="0">
-                          <a:solidFill>
-                            <a:schemeClr val="bg1"/>
-                          </a:solidFill>
-                        </a:rPr>
-                        <a:t>georeference</a:t>
-                      </a:r>
-                    </a:p>
-                  </a:txBody>
-                  <a:tcPr>
-                    <a:solidFill>
-                      <a:schemeClr val="accent1"/>
-                    </a:solidFill>
-                  </a:tcPr>
-                </a:tc>
-                <a:tc>
-                  <a:txBody>
-                    <a:bodyPr/>
-                    <a:lstStyle/>
-                    <a:p>
-                      <a:r>
-                        <a:rPr lang="en-US" sz="1400" dirty="0"/>
-                        <a:t>…</a:t>
-                      </a:r>
-                    </a:p>
-                  </a:txBody>
-                  <a:tcPr/>
-                </a:tc>
-                <a:tc>
-                  <a:txBody>
-                    <a:bodyPr/>
-                    <a:lstStyle/>
-                    <a:p>
-                      <a:endParaRPr lang="en-US" sz="1400" dirty="0"/>
-                    </a:p>
-                  </a:txBody>
-                  <a:tcPr/>
-                </a:tc>
-                <a:tc>
-                  <a:txBody>
-                    <a:bodyPr/>
-                    <a:lstStyle/>
-                    <a:p>
-                      <a:endParaRPr lang="en-US" sz="1400" dirty="0"/>
-                    </a:p>
-                  </a:txBody>
-                  <a:tcPr/>
-                </a:tc>
-                <a:tc>
-                  <a:txBody>
-                    <a:bodyPr/>
-                    <a:lstStyle/>
-                    <a:p>
-                      <a:endParaRPr lang="en-US" sz="1400" dirty="0"/>
-                    </a:p>
-                  </a:txBody>
-                  <a:tcPr/>
-                </a:tc>
-                <a:tc>
-                  <a:txBody>
-                    <a:bodyPr/>
-                    <a:lstStyle/>
-                    <a:p>
-                      <a:endParaRPr lang="en-US" sz="1400" dirty="0"/>
-                    </a:p>
-                  </a:txBody>
-                  <a:tcPr/>
-                </a:tc>
-                <a:tc>
-                  <a:txBody>
-                    <a:bodyPr/>
-                    <a:lstStyle/>
-                    <a:p>
-                      <a:endParaRPr lang="en-US" sz="1400" dirty="0"/>
-                    </a:p>
-                  </a:txBody>
-                  <a:tcPr/>
-                </a:tc>
-                <a:tc>
-                  <a:txBody>
-                    <a:bodyPr/>
-                    <a:lstStyle/>
-                    <a:p>
-                      <a:endParaRPr lang="en-US" sz="1400" dirty="0"/>
-                    </a:p>
-                  </a:txBody>
-                  <a:tcPr/>
-                </a:tc>
-                <a:tc>
-                  <a:txBody>
-                    <a:bodyPr/>
-                    <a:lstStyle/>
-                    <a:p>
-                      <a:endParaRPr lang="en-US" sz="1400" dirty="0"/>
-                    </a:p>
-                  </a:txBody>
-                  <a:tcPr/>
-                </a:tc>
-                <a:tc>
-                  <a:txBody>
-                    <a:bodyPr/>
-                    <a:lstStyle/>
-                    <a:p>
-                      <a:endParaRPr lang="en-US" sz="1400" dirty="0"/>
-                    </a:p>
-                  </a:txBody>
-                  <a:tcPr/>
-                </a:tc>
-                <a:extLst>
-                  <a:ext uri="{0D108BD9-81ED-4DB2-BD59-A6C34878D82A}">
-                    <a16:rowId xmlns:a16="http://schemas.microsoft.com/office/drawing/2014/main" val="3539792285"/>
+                    <a16:rowId xmlns:a16="http://schemas.microsoft.com/office/drawing/2014/main" val="1325418145"/>
                   </a:ext>
                 </a:extLst>
               </a:tr>
@@ -5310,8 +4515,8 @@
         </p:nvSpPr>
         <p:spPr>
           <a:xfrm>
-            <a:off x="356937" y="121700"/>
-            <a:ext cx="2349939" cy="646331"/>
+            <a:off x="7311794" y="2505670"/>
+            <a:ext cx="3516039" cy="923330"/>
           </a:xfrm>
           <a:prstGeom prst="rect">
             <a:avLst/>
@@ -5319,20 +4524,14 @@
           <a:noFill/>
         </p:spPr>
         <p:txBody>
-          <a:bodyPr wrap="none" rtlCol="0">
+          <a:bodyPr wrap="square" rtlCol="0">
             <a:spAutoFit/>
           </a:bodyPr>
           <a:lstStyle/>
           <a:p>
             <a:r>
               <a:rPr lang="en-US" i="1" dirty="0"/>
-              <a:t>p2.xlarge, 4 core, 64GB</a:t>
-            </a:r>
-          </a:p>
-          <a:p>
-            <a:r>
-              <a:rPr lang="en-US" i="1" dirty="0"/>
-              <a:t>WY_CO_Peach</a:t>
+              <a:t>Unofficial runs on a p3.8xlarge EC2 instance (32 vCPU, 244 GB RAM, 4 GPUs), using map WY_CO_Peach</a:t>
             </a:r>
           </a:p>
         </p:txBody>
@@ -5458,7 +4657,7 @@
         <p:spPr/>
         <p:txBody>
           <a:bodyPr>
-            <a:normAutofit fontScale="92500" lnSpcReduction="20000"/>
+            <a:normAutofit/>
           </a:bodyPr>
           <a:lstStyle/>
           <a:p>
@@ -5481,14 +4680,14 @@
           <a:p>
             <a:r>
               <a:rPr lang="en-US" dirty="0"/>
-              <a:t>Polygon Extract</a:t>
+              <a:t>Point Extract</a:t>
             </a:r>
           </a:p>
           <a:p>
             <a:pPr lvl="1"/>
             <a:r>
               <a:rPr lang="en-US" dirty="0"/>
-              <a:t>Hangs after 25 mins – suspect out of memory</a:t>
+              <a:t>Runs, but does not produce output</a:t>
             </a:r>
           </a:p>
           <a:p>
@@ -5497,38 +4696,15 @@
           </a:p>
           <a:p>
             <a:r>
-              <a:rPr lang="en-US" dirty="0"/>
-              <a:t>Point Extract</a:t>
+              <a:rPr lang="en-US" i="1" dirty="0"/>
+              <a:t>Geopackage</a:t>
             </a:r>
           </a:p>
           <a:p>
             <a:pPr lvl="1"/>
             <a:r>
-              <a:rPr lang="en-US" dirty="0"/>
-              <a:t>Need to implement docker</a:t>
-            </a:r>
-          </a:p>
-          <a:p>
-            <a:pPr lvl="1"/>
-            <a:r>
-              <a:rPr lang="en-US" dirty="0"/>
-              <a:t>Need to get proper command-line switches</a:t>
-            </a:r>
-          </a:p>
-          <a:p>
-            <a:endParaRPr lang="en-US" dirty="0"/>
-          </a:p>
-          <a:p>
-            <a:r>
-              <a:rPr lang="en-US" dirty="0"/>
-              <a:t>Georeference</a:t>
-            </a:r>
-          </a:p>
-          <a:p>
-            <a:pPr lvl="1"/>
-            <a:r>
-              <a:rPr lang="en-US" dirty="0"/>
-              <a:t>Need to implement docker</a:t>
+              <a:rPr lang="en-US" i="1" dirty="0"/>
+              <a:t>Need to verify output once line and point extractions are working</a:t>
             </a:r>
           </a:p>
         </p:txBody>
@@ -6075,8 +5251,8 @@
         </p:nvSpPr>
         <p:spPr>
           <a:xfrm>
-            <a:off x="11058102" y="4883148"/>
-            <a:ext cx="997178" cy="545228"/>
+            <a:off x="9367945" y="4100830"/>
+            <a:ext cx="703871" cy="487738"/>
           </a:xfrm>
           <a:prstGeom prst="roundRect">
             <a:avLst/>
@@ -6085,7 +5261,7 @@
             <a:srgbClr val="FFFF00"/>
           </a:solidFill>
           <a:ln>
-            <a:tailEnd type="triangle" w="lg" len="lg"/>
+            <a:tailEnd type="triangle" w="lg" len="med"/>
           </a:ln>
         </p:spPr>
         <p:style>
@@ -6134,8 +5310,8 @@
         </p:nvSpPr>
         <p:spPr>
           <a:xfrm>
-            <a:off x="2963881" y="1037547"/>
-            <a:ext cx="1024170" cy="487740"/>
+            <a:off x="5592824" y="664651"/>
+            <a:ext cx="786056" cy="487740"/>
           </a:xfrm>
           <a:prstGeom prst="roundRect">
             <a:avLst/>
@@ -6144,7 +5320,7 @@
             <a:srgbClr val="92D050"/>
           </a:solidFill>
           <a:ln>
-            <a:tailEnd type="triangle" w="lg" len="lg"/>
+            <a:tailEnd type="triangle" w="lg" len="med"/>
           </a:ln>
         </p:spPr>
         <p:style>
@@ -6193,8 +5369,8 @@
         </p:nvSpPr>
         <p:spPr>
           <a:xfrm>
-            <a:off x="6752169" y="2156689"/>
-            <a:ext cx="1105985" cy="540481"/>
+            <a:off x="5590800" y="2106756"/>
+            <a:ext cx="1098436" cy="488200"/>
           </a:xfrm>
           <a:prstGeom prst="roundRect">
             <a:avLst/>
@@ -6203,7 +5379,7 @@
             <a:srgbClr val="92D050"/>
           </a:solidFill>
           <a:ln>
-            <a:tailEnd type="triangle" w="lg" len="lg"/>
+            <a:tailEnd type="triangle" w="lg" len="med"/>
           </a:ln>
         </p:spPr>
         <p:style>
@@ -6252,8 +5428,8 @@
         </p:nvSpPr>
         <p:spPr>
           <a:xfrm>
-            <a:off x="8752095" y="1974661"/>
-            <a:ext cx="1218084" cy="608139"/>
+            <a:off x="7407743" y="1740765"/>
+            <a:ext cx="1012814" cy="487740"/>
           </a:xfrm>
           <a:prstGeom prst="roundRect">
             <a:avLst/>
@@ -6262,7 +5438,7 @@
             <a:srgbClr val="92D050"/>
           </a:solidFill>
           <a:ln>
-            <a:tailEnd type="triangle" w="lg" len="lg"/>
+            <a:tailEnd type="triangle" w="lg" len="med"/>
           </a:ln>
         </p:spPr>
         <p:style>
@@ -6311,8 +5487,8 @@
         </p:nvSpPr>
         <p:spPr>
           <a:xfrm>
-            <a:off x="5108492" y="2745636"/>
-            <a:ext cx="963889" cy="487169"/>
+            <a:off x="4134314" y="2637021"/>
+            <a:ext cx="737979" cy="478020"/>
           </a:xfrm>
           <a:prstGeom prst="roundRect">
             <a:avLst/>
@@ -6321,7 +5497,7 @@
             <a:srgbClr val="92D050"/>
           </a:solidFill>
           <a:ln>
-            <a:tailEnd type="triangle" w="lg" len="lg"/>
+            <a:tailEnd type="triangle" w="lg" len="med"/>
           </a:ln>
         </p:spPr>
         <p:style>
@@ -6370,8 +5546,8 @@
         </p:nvSpPr>
         <p:spPr>
           <a:xfrm>
-            <a:off x="3341019" y="3092482"/>
-            <a:ext cx="737979" cy="449297"/>
+            <a:off x="2772264" y="2647699"/>
+            <a:ext cx="547621" cy="487740"/>
           </a:xfrm>
           <a:prstGeom prst="roundRect">
             <a:avLst/>
@@ -6380,7 +5556,7 @@
             <a:srgbClr val="92D050"/>
           </a:solidFill>
           <a:ln>
-            <a:tailEnd type="triangle" w="lg" len="lg"/>
+            <a:tailEnd type="triangle" w="lg" len="med"/>
           </a:ln>
         </p:spPr>
         <p:style>
@@ -6429,8 +5605,8 @@
         </p:nvSpPr>
         <p:spPr>
           <a:xfrm>
-            <a:off x="11058102" y="3864377"/>
-            <a:ext cx="908384" cy="554784"/>
+            <a:off x="9647858" y="3361387"/>
+            <a:ext cx="703871" cy="487739"/>
           </a:xfrm>
           <a:prstGeom prst="roundRect">
             <a:avLst/>
@@ -6439,7 +5615,7 @@
             <a:srgbClr val="FF0000"/>
           </a:solidFill>
           <a:ln>
-            <a:tailEnd type="triangle" w="lg" len="lg"/>
+            <a:tailEnd type="triangle" w="lg" len="med"/>
           </a:ln>
         </p:spPr>
         <p:style>
@@ -6488,17 +5664,17 @@
         </p:nvSpPr>
         <p:spPr>
           <a:xfrm>
-            <a:off x="8982404" y="269781"/>
-            <a:ext cx="886425" cy="523220"/>
+            <a:off x="8915039" y="4900863"/>
+            <a:ext cx="787428" cy="480871"/>
           </a:xfrm>
           <a:prstGeom prst="roundRect">
             <a:avLst/>
           </a:prstGeom>
           <a:solidFill>
-            <a:srgbClr val="FFFF00"/>
+            <a:srgbClr val="92D050"/>
           </a:solidFill>
           <a:ln>
-            <a:tailEnd type="triangle" w="lg" len="lg"/>
+            <a:tailEnd type="triangle" w="lg" len="med"/>
           </a:ln>
         </p:spPr>
         <p:style>
@@ -6551,17 +5727,17 @@
         </p:nvCxnSpPr>
         <p:spPr>
           <a:xfrm>
-            <a:off x="3988051" y="1281417"/>
-            <a:ext cx="4764044" cy="997314"/>
-          </a:xfrm>
-          <a:prstGeom prst="straightConnector1">
+            <a:off x="6378880" y="908521"/>
+            <a:ext cx="1028863" cy="1076114"/>
+          </a:xfrm>
+          <a:prstGeom prst="curvedConnector3">
             <a:avLst/>
           </a:prstGeom>
           <a:ln w="12700">
             <a:solidFill>
               <a:schemeClr val="tx1"/>
             </a:solidFill>
-            <a:tailEnd type="triangle" w="lg" len="lg"/>
+            <a:tailEnd type="triangle" w="lg" len="med"/>
           </a:ln>
         </p:spPr>
         <p:style>
@@ -6597,8 +5773,8 @@
         </p:nvCxnSpPr>
         <p:spPr>
           <a:xfrm flipV="1">
-            <a:off x="4078998" y="2989221"/>
-            <a:ext cx="1029494" cy="327910"/>
+            <a:off x="3319885" y="2876031"/>
+            <a:ext cx="814429" cy="15538"/>
           </a:xfrm>
           <a:prstGeom prst="straightConnector1">
             <a:avLst/>
@@ -6607,7 +5783,7 @@
             <a:solidFill>
               <a:schemeClr val="tx1"/>
             </a:solidFill>
-            <a:tailEnd type="triangle" w="lg" len="lg"/>
+            <a:tailEnd type="triangle" w="lg" len="med"/>
           </a:ln>
         </p:spPr>
         <p:style>
@@ -6643,17 +5819,17 @@
         </p:nvCxnSpPr>
         <p:spPr>
           <a:xfrm flipV="1">
-            <a:off x="6072381" y="2426930"/>
-            <a:ext cx="679788" cy="562291"/>
-          </a:xfrm>
-          <a:prstGeom prst="straightConnector1">
+            <a:off x="4872293" y="2350856"/>
+            <a:ext cx="718507" cy="525175"/>
+          </a:xfrm>
+          <a:prstGeom prst="curvedConnector3">
             <a:avLst/>
           </a:prstGeom>
           <a:ln w="12700">
             <a:solidFill>
               <a:schemeClr val="tx1"/>
             </a:solidFill>
-            <a:tailEnd type="triangle" w="lg" len="lg"/>
+            <a:tailEnd type="triangle" w="lg" len="med"/>
           </a:ln>
         </p:spPr>
         <p:style>
@@ -6688,18 +5864,20 @@
           <p:nvPr/>
         </p:nvCxnSpPr>
         <p:spPr>
-          <a:xfrm flipV="1">
-            <a:off x="7858154" y="531391"/>
-            <a:ext cx="1124250" cy="1895539"/>
-          </a:xfrm>
-          <a:prstGeom prst="straightConnector1">
-            <a:avLst/>
+          <a:xfrm>
+            <a:off x="6689236" y="2350856"/>
+            <a:ext cx="2225803" cy="2790443"/>
+          </a:xfrm>
+          <a:prstGeom prst="curvedConnector3">
+            <a:avLst>
+              <a:gd name="adj1" fmla="val 50000"/>
+            </a:avLst>
           </a:prstGeom>
           <a:ln w="12700">
             <a:solidFill>
               <a:schemeClr val="tx1"/>
             </a:solidFill>
-            <a:tailEnd type="triangle" w="lg" len="lg"/>
+            <a:tailEnd type="triangle" w="lg" len="med"/>
           </a:ln>
         </p:spPr>
         <p:style>
@@ -6735,17 +5913,19 @@
         </p:nvCxnSpPr>
         <p:spPr>
           <a:xfrm>
-            <a:off x="9970179" y="2278731"/>
-            <a:ext cx="1087923" cy="1863038"/>
-          </a:xfrm>
-          <a:prstGeom prst="straightConnector1">
-            <a:avLst/>
+            <a:off x="8420557" y="1984635"/>
+            <a:ext cx="1227301" cy="1620622"/>
+          </a:xfrm>
+          <a:prstGeom prst="curvedConnector3">
+            <a:avLst>
+              <a:gd name="adj1" fmla="val 50000"/>
+            </a:avLst>
           </a:prstGeom>
           <a:ln w="12700">
             <a:solidFill>
               <a:schemeClr val="tx1"/>
             </a:solidFill>
-            <a:tailEnd type="triangle" w="lg" len="lg"/>
+            <a:tailEnd type="triangle" w="lg" len="med"/>
           </a:ln>
         </p:spPr>
         <p:style>
@@ -6781,17 +5961,19 @@
         </p:nvCxnSpPr>
         <p:spPr>
           <a:xfrm>
-            <a:off x="4078998" y="3317131"/>
-            <a:ext cx="6979104" cy="824638"/>
-          </a:xfrm>
-          <a:prstGeom prst="straightConnector1">
-            <a:avLst/>
+            <a:off x="3319885" y="2891569"/>
+            <a:ext cx="6327973" cy="713688"/>
+          </a:xfrm>
+          <a:prstGeom prst="curvedConnector3">
+            <a:avLst>
+              <a:gd name="adj1" fmla="val 9469"/>
+            </a:avLst>
           </a:prstGeom>
           <a:ln w="12700">
             <a:solidFill>
               <a:schemeClr val="tx1"/>
             </a:solidFill>
-            <a:tailEnd type="triangle" w="lg" len="lg"/>
+            <a:tailEnd type="triangle" w="lg" len="med"/>
           </a:ln>
         </p:spPr>
         <p:style>
@@ -6827,17 +6009,17 @@
         </p:nvCxnSpPr>
         <p:spPr>
           <a:xfrm flipV="1">
-            <a:off x="7858154" y="2278731"/>
-            <a:ext cx="893941" cy="148199"/>
-          </a:xfrm>
-          <a:prstGeom prst="straightConnector1">
+            <a:off x="6689236" y="1984635"/>
+            <a:ext cx="718507" cy="366221"/>
+          </a:xfrm>
+          <a:prstGeom prst="curvedConnector3">
             <a:avLst/>
           </a:prstGeom>
           <a:ln w="12700">
             <a:solidFill>
               <a:schemeClr val="tx1"/>
             </a:solidFill>
-            <a:tailEnd type="triangle" w="lg" len="lg"/>
+            <a:tailEnd type="triangle" w="lg" len="med"/>
           </a:ln>
         </p:spPr>
         <p:style>
@@ -6873,17 +6055,19 @@
         </p:nvCxnSpPr>
         <p:spPr>
           <a:xfrm>
-            <a:off x="4078998" y="3317131"/>
-            <a:ext cx="6979104" cy="1838631"/>
-          </a:xfrm>
-          <a:prstGeom prst="straightConnector1">
-            <a:avLst/>
+            <a:off x="3319885" y="2891569"/>
+            <a:ext cx="6048060" cy="1453130"/>
+          </a:xfrm>
+          <a:prstGeom prst="curvedConnector3">
+            <a:avLst>
+              <a:gd name="adj1" fmla="val 6119"/>
+            </a:avLst>
           </a:prstGeom>
           <a:ln w="12700">
             <a:solidFill>
               <a:schemeClr val="tx1"/>
             </a:solidFill>
-            <a:tailEnd type="triangle" w="lg" len="lg"/>
+            <a:tailEnd type="triangle" w="lg" len="med"/>
           </a:ln>
         </p:spPr>
         <p:style>
@@ -6919,17 +6103,19 @@
         </p:nvCxnSpPr>
         <p:spPr>
           <a:xfrm flipV="1">
-            <a:off x="1278091" y="1281417"/>
-            <a:ext cx="1685790" cy="2065393"/>
-          </a:xfrm>
-          <a:prstGeom prst="straightConnector1">
-            <a:avLst/>
+            <a:off x="1402418" y="908521"/>
+            <a:ext cx="4190406" cy="1973202"/>
+          </a:xfrm>
+          <a:prstGeom prst="curvedConnector3">
+            <a:avLst>
+              <a:gd name="adj1" fmla="val 18898"/>
+            </a:avLst>
           </a:prstGeom>
           <a:ln w="12700">
             <a:solidFill>
               <a:schemeClr val="tx1"/>
             </a:solidFill>
-            <a:tailEnd type="triangle" w="lg" len="lg"/>
+            <a:tailEnd type="triangle" w="lg" len="med"/>
           </a:ln>
         </p:spPr>
         <p:style>
@@ -6964,9 +6150,9 @@
           <p:nvPr/>
         </p:nvCxnSpPr>
         <p:spPr>
-          <a:xfrm flipV="1">
-            <a:off x="1278091" y="3317131"/>
-            <a:ext cx="2062928" cy="29679"/>
+          <a:xfrm>
+            <a:off x="1402418" y="2881723"/>
+            <a:ext cx="1369846" cy="9846"/>
           </a:xfrm>
           <a:prstGeom prst="straightConnector1">
             <a:avLst/>
@@ -6975,7 +6161,460 @@
             <a:solidFill>
               <a:schemeClr val="tx1"/>
             </a:solidFill>
-            <a:tailEnd type="triangle" w="lg" len="lg"/>
+            <a:tailEnd type="triangle" w="lg" len="med"/>
+          </a:ln>
+        </p:spPr>
+        <p:style>
+          <a:lnRef idx="1">
+            <a:schemeClr val="accent1"/>
+          </a:lnRef>
+          <a:fillRef idx="0">
+            <a:schemeClr val="accent1"/>
+          </a:fillRef>
+          <a:effectRef idx="0">
+            <a:schemeClr val="accent1"/>
+          </a:effectRef>
+          <a:fontRef idx="minor">
+            <a:schemeClr val="tx1"/>
+          </a:fontRef>
+        </p:style>
+      </p:cxnSp>
+      <p:sp>
+        <p:nvSpPr>
+          <p:cNvPr id="80" name="Slide Number Placeholder 79">
+            <a:extLst>
+              <a:ext uri="{FF2B5EF4-FFF2-40B4-BE49-F238E27FC236}">
+                <a16:creationId xmlns:a16="http://schemas.microsoft.com/office/drawing/2014/main" id="{C0FAEB89-98B5-CE76-DE59-E1D21298273E}"/>
+              </a:ext>
+            </a:extLst>
+          </p:cNvPr>
+          <p:cNvSpPr>
+            <a:spLocks noGrp="1"/>
+          </p:cNvSpPr>
+          <p:nvPr>
+            <p:ph type="sldNum" sz="quarter" idx="12"/>
+          </p:nvPr>
+        </p:nvSpPr>
+        <p:spPr/>
+        <p:txBody>
+          <a:bodyPr/>
+          <a:lstStyle/>
+          <a:p>
+            <a:fld id="{B15EECDE-63F5-1E4D-8144-009D616F0C2C}" type="slidenum">
+              <a:rPr lang="en-US" smtClean="0"/>
+              <a:t>2</a:t>
+            </a:fld>
+            <a:endParaRPr lang="en-US" dirty="0"/>
+          </a:p>
+        </p:txBody>
+      </p:sp>
+      <p:cxnSp>
+        <p:nvCxnSpPr>
+          <p:cNvPr id="28" name="Straight Arrow Connector 27">
+            <a:extLst>
+              <a:ext uri="{FF2B5EF4-FFF2-40B4-BE49-F238E27FC236}">
+                <a16:creationId xmlns:a16="http://schemas.microsoft.com/office/drawing/2014/main" id="{7860AFC4-316E-1718-6507-E85D3128A0FF}"/>
+              </a:ext>
+            </a:extLst>
+          </p:cNvPr>
+          <p:cNvCxnSpPr>
+            <a:cxnSpLocks/>
+            <a:stCxn id="7" idx="3"/>
+            <a:endCxn id="4" idx="1"/>
+          </p:cNvCxnSpPr>
+          <p:nvPr/>
+        </p:nvCxnSpPr>
+        <p:spPr>
+          <a:xfrm>
+            <a:off x="8420557" y="1984635"/>
+            <a:ext cx="947388" cy="2360064"/>
+          </a:xfrm>
+          <a:prstGeom prst="curvedConnector3">
+            <a:avLst>
+              <a:gd name="adj1" fmla="val 50000"/>
+            </a:avLst>
+          </a:prstGeom>
+          <a:ln w="12700">
+            <a:solidFill>
+              <a:schemeClr val="tx1"/>
+            </a:solidFill>
+            <a:tailEnd type="triangle" w="lg" len="med"/>
+          </a:ln>
+        </p:spPr>
+        <p:style>
+          <a:lnRef idx="1">
+            <a:schemeClr val="accent1"/>
+          </a:lnRef>
+          <a:fillRef idx="0">
+            <a:schemeClr val="accent1"/>
+          </a:fillRef>
+          <a:effectRef idx="0">
+            <a:schemeClr val="accent1"/>
+          </a:effectRef>
+          <a:fontRef idx="minor">
+            <a:schemeClr val="tx1"/>
+          </a:fontRef>
+        </p:style>
+      </p:cxnSp>
+      <p:sp>
+        <p:nvSpPr>
+          <p:cNvPr id="52" name="Rounded Rectangle 51">
+            <a:extLst>
+              <a:ext uri="{FF2B5EF4-FFF2-40B4-BE49-F238E27FC236}">
+                <a16:creationId xmlns:a16="http://schemas.microsoft.com/office/drawing/2014/main" id="{B7D92A1F-C946-C637-E4AA-79FD695B3740}"/>
+              </a:ext>
+            </a:extLst>
+          </p:cNvPr>
+          <p:cNvSpPr/>
+          <p:nvPr/>
+        </p:nvSpPr>
+        <p:spPr>
+          <a:xfrm>
+            <a:off x="6483871" y="5804363"/>
+            <a:ext cx="1226674" cy="487740"/>
+          </a:xfrm>
+          <a:prstGeom prst="roundRect">
+            <a:avLst/>
+          </a:prstGeom>
+          <a:solidFill>
+            <a:srgbClr val="92D050"/>
+          </a:solidFill>
+          <a:ln>
+            <a:tailEnd type="triangle" w="lg" len="med"/>
+          </a:ln>
+        </p:spPr>
+        <p:style>
+          <a:lnRef idx="2">
+            <a:schemeClr val="accent1">
+              <a:shade val="15000"/>
+            </a:schemeClr>
+          </a:lnRef>
+          <a:fillRef idx="1">
+            <a:schemeClr val="accent1"/>
+          </a:fillRef>
+          <a:effectRef idx="0">
+            <a:schemeClr val="accent1"/>
+          </a:effectRef>
+          <a:fontRef idx="minor">
+            <a:schemeClr val="lt1"/>
+          </a:fontRef>
+        </p:style>
+        <p:txBody>
+          <a:bodyPr rtlCol="0" anchor="ctr"/>
+          <a:lstStyle/>
+          <a:p>
+            <a:pPr algn="ctr"/>
+            <a:r>
+              <a:rPr lang="en-US" sz="1200" dirty="0">
+                <a:solidFill>
+                  <a:schemeClr val="tx1"/>
+                </a:solidFill>
+              </a:rPr>
+              <a:t>georeference</a:t>
+            </a:r>
+          </a:p>
+        </p:txBody>
+      </p:sp>
+      <p:cxnSp>
+        <p:nvCxnSpPr>
+          <p:cNvPr id="57" name="Straight Arrow Connector 56">
+            <a:extLst>
+              <a:ext uri="{FF2B5EF4-FFF2-40B4-BE49-F238E27FC236}">
+                <a16:creationId xmlns:a16="http://schemas.microsoft.com/office/drawing/2014/main" id="{2BBF1B4F-F7DB-20B0-3956-CE6DBB418EF4}"/>
+              </a:ext>
+            </a:extLst>
+          </p:cNvPr>
+          <p:cNvCxnSpPr>
+            <a:cxnSpLocks/>
+            <a:stCxn id="348" idx="3"/>
+            <a:endCxn id="52" idx="1"/>
+          </p:cNvCxnSpPr>
+          <p:nvPr/>
+        </p:nvCxnSpPr>
+        <p:spPr>
+          <a:xfrm>
+            <a:off x="1402418" y="2881723"/>
+            <a:ext cx="5081453" cy="3166510"/>
+          </a:xfrm>
+          <a:prstGeom prst="curvedConnector3">
+            <a:avLst>
+              <a:gd name="adj1" fmla="val 12913"/>
+            </a:avLst>
+          </a:prstGeom>
+          <a:ln w="12700">
+            <a:solidFill>
+              <a:schemeClr val="tx1"/>
+            </a:solidFill>
+            <a:tailEnd type="triangle" w="lg" len="med"/>
+          </a:ln>
+        </p:spPr>
+        <p:style>
+          <a:lnRef idx="1">
+            <a:schemeClr val="accent1"/>
+          </a:lnRef>
+          <a:fillRef idx="0">
+            <a:schemeClr val="accent1"/>
+          </a:fillRef>
+          <a:effectRef idx="0">
+            <a:schemeClr val="accent1"/>
+          </a:effectRef>
+          <a:fontRef idx="minor">
+            <a:schemeClr val="tx1"/>
+          </a:fontRef>
+        </p:style>
+      </p:cxnSp>
+      <p:sp>
+        <p:nvSpPr>
+          <p:cNvPr id="347" name="Rectangle 346">
+            <a:extLst>
+              <a:ext uri="{FF2B5EF4-FFF2-40B4-BE49-F238E27FC236}">
+                <a16:creationId xmlns:a16="http://schemas.microsoft.com/office/drawing/2014/main" id="{7B9464FA-7F77-83B2-9E0D-D5B595A4CA50}"/>
+              </a:ext>
+            </a:extLst>
+          </p:cNvPr>
+          <p:cNvSpPr/>
+          <p:nvPr/>
+        </p:nvSpPr>
+        <p:spPr>
+          <a:xfrm>
+            <a:off x="659147" y="1781965"/>
+            <a:ext cx="944670" cy="279014"/>
+          </a:xfrm>
+          <a:prstGeom prst="rect">
+            <a:avLst/>
+          </a:prstGeom>
+          <a:solidFill>
+            <a:schemeClr val="bg1">
+              <a:lumMod val="50000"/>
+            </a:schemeClr>
+          </a:solidFill>
+          <a:ln>
+            <a:tailEnd w="lg" len="med"/>
+          </a:ln>
+        </p:spPr>
+        <p:style>
+          <a:lnRef idx="2">
+            <a:schemeClr val="accent1">
+              <a:shade val="15000"/>
+            </a:schemeClr>
+          </a:lnRef>
+          <a:fillRef idx="1">
+            <a:schemeClr val="accent1"/>
+          </a:fillRef>
+          <a:effectRef idx="0">
+            <a:schemeClr val="accent1"/>
+          </a:effectRef>
+          <a:fontRef idx="minor">
+            <a:schemeClr val="lt1"/>
+          </a:fontRef>
+        </p:style>
+        <p:txBody>
+          <a:bodyPr rtlCol="0" anchor="ctr"/>
+          <a:lstStyle/>
+          <a:p>
+            <a:pPr algn="ctr"/>
+            <a:r>
+              <a:rPr lang="en-US" sz="1200" dirty="0"/>
+              <a:t>map.tif</a:t>
+            </a:r>
+          </a:p>
+        </p:txBody>
+      </p:sp>
+      <p:sp>
+        <p:nvSpPr>
+          <p:cNvPr id="348" name="Rounded Rectangle 347">
+            <a:extLst>
+              <a:ext uri="{FF2B5EF4-FFF2-40B4-BE49-F238E27FC236}">
+                <a16:creationId xmlns:a16="http://schemas.microsoft.com/office/drawing/2014/main" id="{F90FFEF7-5D12-B16B-B13B-F20CA5BE66A6}"/>
+              </a:ext>
+            </a:extLst>
+          </p:cNvPr>
+          <p:cNvSpPr/>
+          <p:nvPr/>
+        </p:nvSpPr>
+        <p:spPr>
+          <a:xfrm>
+            <a:off x="854798" y="2638685"/>
+            <a:ext cx="547620" cy="486076"/>
+          </a:xfrm>
+          <a:prstGeom prst="roundRect">
+            <a:avLst/>
+          </a:prstGeom>
+          <a:solidFill>
+            <a:srgbClr val="92D050"/>
+          </a:solidFill>
+          <a:ln>
+            <a:tailEnd type="triangle" w="lg" len="med"/>
+          </a:ln>
+        </p:spPr>
+        <p:style>
+          <a:lnRef idx="2">
+            <a:schemeClr val="accent1">
+              <a:shade val="15000"/>
+            </a:schemeClr>
+          </a:lnRef>
+          <a:fillRef idx="1">
+            <a:schemeClr val="accent1"/>
+          </a:fillRef>
+          <a:effectRef idx="0">
+            <a:schemeClr val="accent1"/>
+          </a:effectRef>
+          <a:fontRef idx="minor">
+            <a:schemeClr val="lt1"/>
+          </a:fontRef>
+        </p:style>
+        <p:txBody>
+          <a:bodyPr rtlCol="0" anchor="ctr"/>
+          <a:lstStyle/>
+          <a:p>
+            <a:pPr algn="ctr"/>
+            <a:r>
+              <a:rPr lang="en-US" sz="1200" dirty="0">
+                <a:solidFill>
+                  <a:schemeClr val="tx1"/>
+                </a:solidFill>
+              </a:rPr>
+              <a:t>start</a:t>
+            </a:r>
+          </a:p>
+        </p:txBody>
+      </p:sp>
+      <p:cxnSp>
+        <p:nvCxnSpPr>
+          <p:cNvPr id="354" name="Straight Arrow Connector 353">
+            <a:extLst>
+              <a:ext uri="{FF2B5EF4-FFF2-40B4-BE49-F238E27FC236}">
+                <a16:creationId xmlns:a16="http://schemas.microsoft.com/office/drawing/2014/main" id="{9BFCCBE1-D1F5-5F7F-CC7E-02BF47F2A052}"/>
+              </a:ext>
+            </a:extLst>
+          </p:cNvPr>
+          <p:cNvCxnSpPr>
+            <a:cxnSpLocks/>
+            <a:stCxn id="347" idx="2"/>
+            <a:endCxn id="348" idx="0"/>
+          </p:cNvCxnSpPr>
+          <p:nvPr/>
+        </p:nvCxnSpPr>
+        <p:spPr>
+          <a:xfrm flipH="1">
+            <a:off x="1128608" y="2060979"/>
+            <a:ext cx="2874" cy="577706"/>
+          </a:xfrm>
+          <a:prstGeom prst="straightConnector1">
+            <a:avLst/>
+          </a:prstGeom>
+          <a:ln w="12700">
+            <a:solidFill>
+              <a:schemeClr val="tx1"/>
+            </a:solidFill>
+            <a:tailEnd type="triangle" w="lg" len="med"/>
+          </a:ln>
+        </p:spPr>
+        <p:style>
+          <a:lnRef idx="1">
+            <a:schemeClr val="accent1"/>
+          </a:lnRef>
+          <a:fillRef idx="0">
+            <a:schemeClr val="accent1"/>
+          </a:fillRef>
+          <a:effectRef idx="0">
+            <a:schemeClr val="accent1"/>
+          </a:effectRef>
+          <a:fontRef idx="minor">
+            <a:schemeClr val="tx1"/>
+          </a:fontRef>
+        </p:style>
+      </p:cxnSp>
+      <p:sp>
+        <p:nvSpPr>
+          <p:cNvPr id="293" name="Rounded Rectangle 292">
+            <a:extLst>
+              <a:ext uri="{FF2B5EF4-FFF2-40B4-BE49-F238E27FC236}">
+                <a16:creationId xmlns:a16="http://schemas.microsoft.com/office/drawing/2014/main" id="{F4C22F42-5D0E-6110-F1FD-99E01927B8B8}"/>
+              </a:ext>
+            </a:extLst>
+          </p:cNvPr>
+          <p:cNvSpPr/>
+          <p:nvPr/>
+        </p:nvSpPr>
+        <p:spPr>
+          <a:xfrm>
+            <a:off x="10926758" y="4315582"/>
+            <a:ext cx="997178" cy="487739"/>
+          </a:xfrm>
+          <a:prstGeom prst="roundRect">
+            <a:avLst/>
+          </a:prstGeom>
+          <a:solidFill>
+            <a:srgbClr val="FFFF00"/>
+          </a:solidFill>
+          <a:ln>
+            <a:tailEnd type="triangle" w="lg" len="med"/>
+          </a:ln>
+        </p:spPr>
+        <p:style>
+          <a:lnRef idx="2">
+            <a:schemeClr val="accent1">
+              <a:shade val="15000"/>
+            </a:schemeClr>
+          </a:lnRef>
+          <a:fillRef idx="1">
+            <a:schemeClr val="accent1"/>
+          </a:fillRef>
+          <a:effectRef idx="0">
+            <a:schemeClr val="accent1"/>
+          </a:effectRef>
+          <a:fontRef idx="minor">
+            <a:schemeClr val="lt1"/>
+          </a:fontRef>
+        </p:style>
+        <p:txBody>
+          <a:bodyPr rtlCol="0" anchor="ctr"/>
+          <a:lstStyle/>
+          <a:p>
+            <a:pPr algn="ctr"/>
+            <a:r>
+              <a:rPr lang="en-US" sz="1200" dirty="0">
+                <a:solidFill>
+                  <a:schemeClr val="tx1"/>
+                </a:solidFill>
+              </a:rPr>
+              <a:t>geopackage</a:t>
+            </a:r>
+          </a:p>
+        </p:txBody>
+      </p:sp>
+      <p:cxnSp>
+        <p:nvCxnSpPr>
+          <p:cNvPr id="294" name="Straight Arrow Connector 27">
+            <a:extLst>
+              <a:ext uri="{FF2B5EF4-FFF2-40B4-BE49-F238E27FC236}">
+                <a16:creationId xmlns:a16="http://schemas.microsoft.com/office/drawing/2014/main" id="{F7F128A6-73CB-F032-27F7-70B180F4E68B}"/>
+              </a:ext>
+            </a:extLst>
+          </p:cNvPr>
+          <p:cNvCxnSpPr>
+            <a:cxnSpLocks/>
+            <a:stCxn id="10" idx="3"/>
+            <a:endCxn id="293" idx="1"/>
+          </p:cNvCxnSpPr>
+          <p:nvPr/>
+        </p:nvCxnSpPr>
+        <p:spPr>
+          <a:xfrm>
+            <a:off x="10351729" y="3605257"/>
+            <a:ext cx="575029" cy="954195"/>
+          </a:xfrm>
+          <a:prstGeom prst="curvedConnector3">
+            <a:avLst>
+              <a:gd name="adj1" fmla="val 50000"/>
+            </a:avLst>
+          </a:prstGeom>
+          <a:ln w="12700">
+            <a:solidFill>
+              <a:schemeClr val="tx1"/>
+            </a:solidFill>
+            <a:tailEnd type="triangle" w="lg" len="med"/>
           </a:ln>
         </p:spPr>
         <p:style>
@@ -6995,213 +6634,35 @@
       </p:cxnSp>
       <p:cxnSp>
         <p:nvCxnSpPr>
-          <p:cNvPr id="63" name="Straight Arrow Connector 62">
-            <a:extLst>
-              <a:ext uri="{FF2B5EF4-FFF2-40B4-BE49-F238E27FC236}">
-                <a16:creationId xmlns:a16="http://schemas.microsoft.com/office/drawing/2014/main" id="{EA7170DD-B203-F28D-76D0-A579735D31E4}"/>
+          <p:cNvPr id="297" name="Straight Arrow Connector 27">
+            <a:extLst>
+              <a:ext uri="{FF2B5EF4-FFF2-40B4-BE49-F238E27FC236}">
+                <a16:creationId xmlns:a16="http://schemas.microsoft.com/office/drawing/2014/main" id="{BC20907A-E58B-B2E1-18AB-CDC0B8A60C40}"/>
               </a:ext>
             </a:extLst>
           </p:cNvPr>
           <p:cNvCxnSpPr>
             <a:cxnSpLocks/>
-            <a:stCxn id="348" idx="3"/>
-            <a:endCxn id="6" idx="1"/>
+            <a:stCxn id="4" idx="3"/>
+            <a:endCxn id="293" idx="1"/>
           </p:cNvCxnSpPr>
           <p:nvPr/>
         </p:nvCxnSpPr>
         <p:spPr>
-          <a:xfrm flipV="1">
-            <a:off x="1278091" y="2426930"/>
-            <a:ext cx="5474078" cy="919880"/>
-          </a:xfrm>
-          <a:prstGeom prst="straightConnector1">
-            <a:avLst/>
+          <a:xfrm>
+            <a:off x="10071816" y="4344699"/>
+            <a:ext cx="854942" cy="214753"/>
+          </a:xfrm>
+          <a:prstGeom prst="curvedConnector3">
+            <a:avLst>
+              <a:gd name="adj1" fmla="val 50000"/>
+            </a:avLst>
           </a:prstGeom>
           <a:ln w="12700">
             <a:solidFill>
               <a:schemeClr val="tx1"/>
             </a:solidFill>
-            <a:tailEnd type="triangle" w="lg" len="lg"/>
-          </a:ln>
-        </p:spPr>
-        <p:style>
-          <a:lnRef idx="1">
-            <a:schemeClr val="accent1"/>
-          </a:lnRef>
-          <a:fillRef idx="0">
-            <a:schemeClr val="accent1"/>
-          </a:fillRef>
-          <a:effectRef idx="0">
-            <a:schemeClr val="accent1"/>
-          </a:effectRef>
-          <a:fontRef idx="minor">
-            <a:schemeClr val="tx1"/>
-          </a:fontRef>
-        </p:style>
-      </p:cxnSp>
-      <p:sp>
-        <p:nvSpPr>
-          <p:cNvPr id="80" name="Slide Number Placeholder 79">
-            <a:extLst>
-              <a:ext uri="{FF2B5EF4-FFF2-40B4-BE49-F238E27FC236}">
-                <a16:creationId xmlns:a16="http://schemas.microsoft.com/office/drawing/2014/main" id="{C0FAEB89-98B5-CE76-DE59-E1D21298273E}"/>
-              </a:ext>
-            </a:extLst>
-          </p:cNvPr>
-          <p:cNvSpPr>
-            <a:spLocks noGrp="1"/>
-          </p:cNvSpPr>
-          <p:nvPr>
-            <p:ph type="sldNum" sz="quarter" idx="12"/>
-          </p:nvPr>
-        </p:nvSpPr>
-        <p:spPr/>
-        <p:txBody>
-          <a:bodyPr/>
-          <a:lstStyle/>
-          <a:p>
-            <a:fld id="{B15EECDE-63F5-1E4D-8144-009D616F0C2C}" type="slidenum">
-              <a:rPr lang="en-US" smtClean="0"/>
-              <a:t>2</a:t>
-            </a:fld>
-            <a:endParaRPr lang="en-US" dirty="0"/>
-          </a:p>
-        </p:txBody>
-      </p:sp>
-      <p:cxnSp>
-        <p:nvCxnSpPr>
-          <p:cNvPr id="28" name="Straight Arrow Connector 27">
-            <a:extLst>
-              <a:ext uri="{FF2B5EF4-FFF2-40B4-BE49-F238E27FC236}">
-                <a16:creationId xmlns:a16="http://schemas.microsoft.com/office/drawing/2014/main" id="{7860AFC4-316E-1718-6507-E85D3128A0FF}"/>
-              </a:ext>
-            </a:extLst>
-          </p:cNvPr>
-          <p:cNvCxnSpPr>
-            <a:cxnSpLocks/>
-            <a:stCxn id="7" idx="3"/>
-            <a:endCxn id="4" idx="1"/>
-          </p:cNvCxnSpPr>
-          <p:nvPr/>
-        </p:nvCxnSpPr>
-        <p:spPr>
-          <a:xfrm>
-            <a:off x="9970179" y="2278731"/>
-            <a:ext cx="1087923" cy="2877031"/>
-          </a:xfrm>
-          <a:prstGeom prst="straightConnector1">
-            <a:avLst/>
-          </a:prstGeom>
-          <a:ln w="12700">
-            <a:solidFill>
-              <a:schemeClr val="tx1"/>
-            </a:solidFill>
-            <a:tailEnd type="triangle" w="lg" len="lg"/>
-          </a:ln>
-        </p:spPr>
-        <p:style>
-          <a:lnRef idx="1">
-            <a:schemeClr val="accent1"/>
-          </a:lnRef>
-          <a:fillRef idx="0">
-            <a:schemeClr val="accent1"/>
-          </a:fillRef>
-          <a:effectRef idx="0">
-            <a:schemeClr val="accent1"/>
-          </a:effectRef>
-          <a:fontRef idx="minor">
-            <a:schemeClr val="tx1"/>
-          </a:fontRef>
-        </p:style>
-      </p:cxnSp>
-      <p:sp>
-        <p:nvSpPr>
-          <p:cNvPr id="52" name="Rounded Rectangle 51">
-            <a:extLst>
-              <a:ext uri="{FF2B5EF4-FFF2-40B4-BE49-F238E27FC236}">
-                <a16:creationId xmlns:a16="http://schemas.microsoft.com/office/drawing/2014/main" id="{B7D92A1F-C946-C637-E4AA-79FD695B3740}"/>
-              </a:ext>
-            </a:extLst>
-          </p:cNvPr>
-          <p:cNvSpPr/>
-          <p:nvPr/>
-        </p:nvSpPr>
-        <p:spPr>
-          <a:xfrm>
-            <a:off x="8643464" y="5576583"/>
-            <a:ext cx="1435346" cy="519062"/>
-          </a:xfrm>
-          <a:prstGeom prst="roundRect">
-            <a:avLst/>
-          </a:prstGeom>
-          <a:solidFill>
-            <a:srgbClr val="FFFF00"/>
-          </a:solidFill>
-          <a:ln>
-            <a:tailEnd type="triangle" w="lg" len="lg"/>
-          </a:ln>
-        </p:spPr>
-        <p:style>
-          <a:lnRef idx="2">
-            <a:schemeClr val="accent1">
-              <a:shade val="15000"/>
-            </a:schemeClr>
-          </a:lnRef>
-          <a:fillRef idx="1">
-            <a:schemeClr val="accent1"/>
-          </a:fillRef>
-          <a:effectRef idx="0">
-            <a:schemeClr val="accent1"/>
-          </a:effectRef>
-          <a:fontRef idx="minor">
-            <a:schemeClr val="lt1"/>
-          </a:fontRef>
-        </p:style>
-        <p:txBody>
-          <a:bodyPr rtlCol="0" anchor="ctr"/>
-          <a:lstStyle/>
-          <a:p>
-            <a:pPr algn="ctr"/>
-            <a:r>
-              <a:rPr lang="en-US" sz="1200" dirty="0">
-                <a:solidFill>
-                  <a:schemeClr val="tx1"/>
-                </a:solidFill>
-              </a:rPr>
-              <a:t>georeferencing</a:t>
-            </a:r>
-          </a:p>
-        </p:txBody>
-      </p:sp>
-      <p:cxnSp>
-        <p:nvCxnSpPr>
-          <p:cNvPr id="57" name="Straight Arrow Connector 56">
-            <a:extLst>
-              <a:ext uri="{FF2B5EF4-FFF2-40B4-BE49-F238E27FC236}">
-                <a16:creationId xmlns:a16="http://schemas.microsoft.com/office/drawing/2014/main" id="{2BBF1B4F-F7DB-20B0-3956-CE6DBB418EF4}"/>
-              </a:ext>
-            </a:extLst>
-          </p:cNvPr>
-          <p:cNvCxnSpPr>
-            <a:cxnSpLocks/>
-            <a:stCxn id="348" idx="3"/>
-            <a:endCxn id="52" idx="1"/>
-          </p:cNvCxnSpPr>
-          <p:nvPr/>
-        </p:nvCxnSpPr>
-        <p:spPr>
-          <a:xfrm>
-            <a:off x="1278091" y="3346810"/>
-            <a:ext cx="7365373" cy="2489304"/>
-          </a:xfrm>
-          <a:prstGeom prst="straightConnector1">
-            <a:avLst/>
-          </a:prstGeom>
-          <a:ln w="12700">
-            <a:solidFill>
-              <a:schemeClr val="tx1"/>
-            </a:solidFill>
-            <a:tailEnd type="triangle" w="lg" len="lg"/>
+            <a:tailEnd type="triangle" w="lg" len="med"/>
           </a:ln>
         </p:spPr>
         <p:style>
@@ -7221,33 +6682,35 @@
       </p:cxnSp>
       <p:cxnSp>
         <p:nvCxnSpPr>
-          <p:cNvPr id="282" name="Straight Arrow Connector 281">
-            <a:extLst>
-              <a:ext uri="{FF2B5EF4-FFF2-40B4-BE49-F238E27FC236}">
-                <a16:creationId xmlns:a16="http://schemas.microsoft.com/office/drawing/2014/main" id="{1B428415-D06C-95C0-730B-F3040F329427}"/>
+          <p:cNvPr id="300" name="Straight Arrow Connector 27">
+            <a:extLst>
+              <a:ext uri="{FF2B5EF4-FFF2-40B4-BE49-F238E27FC236}">
+                <a16:creationId xmlns:a16="http://schemas.microsoft.com/office/drawing/2014/main" id="{3E5DDDB7-9962-3F6B-271D-CB0630BFBBCA}"/>
               </a:ext>
             </a:extLst>
           </p:cNvPr>
           <p:cNvCxnSpPr>
             <a:cxnSpLocks/>
-            <a:stCxn id="348" idx="3"/>
-            <a:endCxn id="11" idx="1"/>
+            <a:stCxn id="11" idx="3"/>
+            <a:endCxn id="293" idx="1"/>
           </p:cNvCxnSpPr>
           <p:nvPr/>
         </p:nvCxnSpPr>
         <p:spPr>
           <a:xfrm flipV="1">
-            <a:off x="1278091" y="531391"/>
-            <a:ext cx="7704313" cy="2815419"/>
-          </a:xfrm>
-          <a:prstGeom prst="straightConnector1">
-            <a:avLst/>
+            <a:off x="9702467" y="4559452"/>
+            <a:ext cx="1224291" cy="581847"/>
+          </a:xfrm>
+          <a:prstGeom prst="curvedConnector3">
+            <a:avLst>
+              <a:gd name="adj1" fmla="val 50000"/>
+            </a:avLst>
           </a:prstGeom>
           <a:ln w="12700">
             <a:solidFill>
               <a:schemeClr val="tx1"/>
             </a:solidFill>
-            <a:tailEnd type="triangle" w="lg" len="lg"/>
+            <a:tailEnd type="triangle" w="lg" len="med"/>
           </a:ln>
         </p:spPr>
         <p:style>
@@ -7267,10 +6730,10 @@
       </p:cxnSp>
       <p:sp>
         <p:nvSpPr>
-          <p:cNvPr id="347" name="Rectangle 346">
-            <a:extLst>
-              <a:ext uri="{FF2B5EF4-FFF2-40B4-BE49-F238E27FC236}">
-                <a16:creationId xmlns:a16="http://schemas.microsoft.com/office/drawing/2014/main" id="{7B9464FA-7F77-83B2-9E0D-D5B595A4CA50}"/>
+          <p:cNvPr id="306" name="Rounded Rectangle 305">
+            <a:extLst>
+              <a:ext uri="{FF2B5EF4-FFF2-40B4-BE49-F238E27FC236}">
+                <a16:creationId xmlns:a16="http://schemas.microsoft.com/office/drawing/2014/main" id="{F48C191B-7EDA-1289-24C2-C52F30DE6AF6}"/>
               </a:ext>
             </a:extLst>
           </p:cNvPr>
@@ -7279,17 +6742,18 @@
         </p:nvSpPr>
         <p:spPr>
           <a:xfrm>
-            <a:off x="333328" y="2265441"/>
-            <a:ext cx="944670" cy="279014"/>
-          </a:xfrm>
-          <a:prstGeom prst="rect">
+            <a:off x="11176052" y="5467300"/>
+            <a:ext cx="498589" cy="487739"/>
+          </a:xfrm>
+          <a:prstGeom prst="roundRect">
             <a:avLst/>
           </a:prstGeom>
           <a:solidFill>
-            <a:schemeClr val="bg1">
-              <a:lumMod val="50000"/>
-            </a:schemeClr>
+            <a:srgbClr val="92D050"/>
           </a:solidFill>
+          <a:ln>
+            <a:tailEnd type="triangle" w="lg" len="med"/>
+          </a:ln>
         </p:spPr>
         <p:style>
           <a:lnRef idx="2">
@@ -7313,100 +6777,191 @@
           <a:p>
             <a:pPr algn="ctr"/>
             <a:r>
-              <a:rPr lang="en-US" sz="1200" dirty="0"/>
-              <a:t>map.tif</a:t>
-            </a:r>
-          </a:p>
-        </p:txBody>
-      </p:sp>
-      <p:sp>
-        <p:nvSpPr>
-          <p:cNvPr id="348" name="Rounded Rectangle 347">
-            <a:extLst>
-              <a:ext uri="{FF2B5EF4-FFF2-40B4-BE49-F238E27FC236}">
-                <a16:creationId xmlns:a16="http://schemas.microsoft.com/office/drawing/2014/main" id="{F90FFEF7-5D12-B16B-B13B-F20CA5BE66A6}"/>
-              </a:ext>
-            </a:extLst>
-          </p:cNvPr>
-          <p:cNvSpPr/>
-          <p:nvPr/>
-        </p:nvSpPr>
-        <p:spPr>
-          <a:xfrm>
-            <a:off x="333421" y="3122161"/>
-            <a:ext cx="944670" cy="449297"/>
-          </a:xfrm>
-          <a:prstGeom prst="roundRect">
-            <a:avLst/>
-          </a:prstGeom>
-          <a:solidFill>
-            <a:srgbClr val="92D050"/>
-          </a:solidFill>
-          <a:ln>
-            <a:tailEnd type="triangle" w="lg" len="lg"/>
-          </a:ln>
-        </p:spPr>
-        <p:style>
-          <a:lnRef idx="2">
-            <a:schemeClr val="accent1">
-              <a:shade val="15000"/>
-            </a:schemeClr>
-          </a:lnRef>
-          <a:fillRef idx="1">
-            <a:schemeClr val="accent1"/>
-          </a:fillRef>
-          <a:effectRef idx="0">
-            <a:schemeClr val="accent1"/>
-          </a:effectRef>
-          <a:fontRef idx="minor">
-            <a:schemeClr val="lt1"/>
-          </a:fontRef>
-        </p:style>
-        <p:txBody>
-          <a:bodyPr rtlCol="0" anchor="ctr"/>
-          <a:lstStyle/>
-          <a:p>
-            <a:pPr algn="ctr"/>
-            <a:r>
               <a:rPr lang="en-US" sz="1200" dirty="0">
                 <a:solidFill>
                   <a:schemeClr val="tx1"/>
                 </a:solidFill>
               </a:rPr>
-              <a:t>start</a:t>
+              <a:t>all</a:t>
             </a:r>
           </a:p>
         </p:txBody>
       </p:sp>
       <p:cxnSp>
         <p:nvCxnSpPr>
-          <p:cNvPr id="354" name="Straight Arrow Connector 353">
-            <a:extLst>
-              <a:ext uri="{FF2B5EF4-FFF2-40B4-BE49-F238E27FC236}">
-                <a16:creationId xmlns:a16="http://schemas.microsoft.com/office/drawing/2014/main" id="{9BFCCBE1-D1F5-5F7F-CC7E-02BF47F2A052}"/>
+          <p:cNvPr id="307" name="Straight Arrow Connector 27">
+            <a:extLst>
+              <a:ext uri="{FF2B5EF4-FFF2-40B4-BE49-F238E27FC236}">
+                <a16:creationId xmlns:a16="http://schemas.microsoft.com/office/drawing/2014/main" id="{030BAC38-32FC-F486-F156-0DC65C960478}"/>
               </a:ext>
             </a:extLst>
           </p:cNvPr>
           <p:cNvCxnSpPr>
             <a:cxnSpLocks/>
-            <a:stCxn id="347" idx="2"/>
-            <a:endCxn id="348" idx="0"/>
+            <a:stCxn id="293" idx="2"/>
+            <a:endCxn id="306" idx="0"/>
           </p:cNvCxnSpPr>
           <p:nvPr/>
         </p:nvCxnSpPr>
         <p:spPr>
-          <a:xfrm>
-            <a:off x="805663" y="2544455"/>
-            <a:ext cx="93" cy="577706"/>
-          </a:xfrm>
-          <a:prstGeom prst="straightConnector1">
-            <a:avLst/>
+          <a:xfrm rot="5400000">
+            <a:off x="11093358" y="5135310"/>
+            <a:ext cx="663979" cy="12700"/>
+          </a:xfrm>
+          <a:prstGeom prst="curvedConnector3">
+            <a:avLst>
+              <a:gd name="adj1" fmla="val 50000"/>
+            </a:avLst>
           </a:prstGeom>
           <a:ln w="12700">
             <a:solidFill>
               <a:schemeClr val="tx1"/>
             </a:solidFill>
-            <a:tailEnd type="triangle" w="lg" len="lg"/>
+            <a:tailEnd type="triangle" w="lg" len="med"/>
+          </a:ln>
+        </p:spPr>
+        <p:style>
+          <a:lnRef idx="1">
+            <a:schemeClr val="accent1"/>
+          </a:lnRef>
+          <a:fillRef idx="0">
+            <a:schemeClr val="accent1"/>
+          </a:fillRef>
+          <a:effectRef idx="0">
+            <a:schemeClr val="accent1"/>
+          </a:effectRef>
+          <a:fontRef idx="minor">
+            <a:schemeClr val="tx1"/>
+          </a:fontRef>
+        </p:style>
+      </p:cxnSp>
+      <p:cxnSp>
+        <p:nvCxnSpPr>
+          <p:cNvPr id="310" name="Straight Arrow Connector 27">
+            <a:extLst>
+              <a:ext uri="{FF2B5EF4-FFF2-40B4-BE49-F238E27FC236}">
+                <a16:creationId xmlns:a16="http://schemas.microsoft.com/office/drawing/2014/main" id="{61D08898-F7B3-80BC-7156-65E6CFC79125}"/>
+              </a:ext>
+            </a:extLst>
+          </p:cNvPr>
+          <p:cNvCxnSpPr>
+            <a:cxnSpLocks/>
+            <a:stCxn id="52" idx="3"/>
+            <a:endCxn id="293" idx="1"/>
+          </p:cNvCxnSpPr>
+          <p:nvPr/>
+        </p:nvCxnSpPr>
+        <p:spPr>
+          <a:xfrm flipV="1">
+            <a:off x="7710545" y="4559452"/>
+            <a:ext cx="3216213" cy="1488781"/>
+          </a:xfrm>
+          <a:prstGeom prst="curvedConnector3">
+            <a:avLst>
+              <a:gd name="adj1" fmla="val 86752"/>
+            </a:avLst>
+          </a:prstGeom>
+          <a:ln w="12700">
+            <a:solidFill>
+              <a:schemeClr val="tx1"/>
+            </a:solidFill>
+            <a:tailEnd type="triangle" w="lg" len="med"/>
+          </a:ln>
+        </p:spPr>
+        <p:style>
+          <a:lnRef idx="1">
+            <a:schemeClr val="accent1"/>
+          </a:lnRef>
+          <a:fillRef idx="0">
+            <a:schemeClr val="accent1"/>
+          </a:fillRef>
+          <a:effectRef idx="0">
+            <a:schemeClr val="accent1"/>
+          </a:effectRef>
+          <a:fontRef idx="minor">
+            <a:schemeClr val="tx1"/>
+          </a:fontRef>
+        </p:style>
+      </p:cxnSp>
+      <p:cxnSp>
+        <p:nvCxnSpPr>
+          <p:cNvPr id="493" name="Straight Arrow Connector 14">
+            <a:extLst>
+              <a:ext uri="{FF2B5EF4-FFF2-40B4-BE49-F238E27FC236}">
+                <a16:creationId xmlns:a16="http://schemas.microsoft.com/office/drawing/2014/main" id="{D5C3E536-3C41-BBE5-3E65-2DD35D40A675}"/>
+              </a:ext>
+            </a:extLst>
+          </p:cNvPr>
+          <p:cNvCxnSpPr>
+            <a:cxnSpLocks/>
+            <a:stCxn id="5" idx="3"/>
+            <a:endCxn id="293" idx="1"/>
+          </p:cNvCxnSpPr>
+          <p:nvPr/>
+        </p:nvCxnSpPr>
+        <p:spPr>
+          <a:xfrm>
+            <a:off x="6378880" y="908521"/>
+            <a:ext cx="4547878" cy="3650931"/>
+          </a:xfrm>
+          <a:prstGeom prst="curvedConnector3">
+            <a:avLst>
+              <a:gd name="adj1" fmla="val 92909"/>
+            </a:avLst>
+          </a:prstGeom>
+          <a:ln w="12700">
+            <a:solidFill>
+              <a:schemeClr val="tx1"/>
+            </a:solidFill>
+            <a:tailEnd type="triangle" w="lg" len="med"/>
+          </a:ln>
+        </p:spPr>
+        <p:style>
+          <a:lnRef idx="1">
+            <a:schemeClr val="accent1"/>
+          </a:lnRef>
+          <a:fillRef idx="0">
+            <a:schemeClr val="accent1"/>
+          </a:fillRef>
+          <a:effectRef idx="0">
+            <a:schemeClr val="accent1"/>
+          </a:effectRef>
+          <a:fontRef idx="minor">
+            <a:schemeClr val="tx1"/>
+          </a:fontRef>
+        </p:style>
+      </p:cxnSp>
+      <p:cxnSp>
+        <p:nvCxnSpPr>
+          <p:cNvPr id="2" name="Straight Arrow Connector 28">
+            <a:extLst>
+              <a:ext uri="{FF2B5EF4-FFF2-40B4-BE49-F238E27FC236}">
+                <a16:creationId xmlns:a16="http://schemas.microsoft.com/office/drawing/2014/main" id="{64ECEE03-5F87-9518-F154-8B189B5F131B}"/>
+              </a:ext>
+            </a:extLst>
+          </p:cNvPr>
+          <p:cNvCxnSpPr>
+            <a:cxnSpLocks/>
+            <a:stCxn id="7" idx="3"/>
+            <a:endCxn id="11" idx="1"/>
+          </p:cNvCxnSpPr>
+          <p:nvPr/>
+        </p:nvCxnSpPr>
+        <p:spPr>
+          <a:xfrm>
+            <a:off x="8420557" y="1984635"/>
+            <a:ext cx="494482" cy="3156664"/>
+          </a:xfrm>
+          <a:prstGeom prst="curvedConnector3">
+            <a:avLst>
+              <a:gd name="adj1" fmla="val 40979"/>
+            </a:avLst>
+          </a:prstGeom>
+          <a:ln w="12700">
+            <a:solidFill>
+              <a:schemeClr val="tx1"/>
+            </a:solidFill>
+            <a:tailEnd type="triangle" w="lg" len="med"/>
           </a:ln>
         </p:spPr>
         <p:style>

</xml_diff>

<commit_message>
Work from the hackathon week (#3)
* changed point cmd line

* typo

* changes from fandel

* line extract work

* line working

* added pydantic for config.yml

* new perf support

* perf stats; line extract as root

* trying full run

* updated

* added

* docker update

* wip: perf collection

* perf stress working

* perf work done

* typo
</commit_message>
<xml_diff>
--- a/docs/overview.pptx
+++ b/docs/overview.pptx
@@ -210,7 +210,7 @@
           <a:p>
             <a:fld id="{A9FFB0D8-BEE1-E441-993F-073C1206777B}" type="datetimeFigureOut">
               <a:rPr lang="en-US" smtClean="0"/>
-              <a:t>2/10/24</a:t>
+              <a:t>2/12/24</a:t>
             </a:fld>
             <a:endParaRPr lang="en-US" dirty="0"/>
           </a:p>
@@ -792,7 +792,7 @@
           <a:p>
             <a:fld id="{E65B9B70-A04C-6947-A62D-89703208E261}" type="datetime1">
               <a:rPr lang="en-US" smtClean="0"/>
-              <a:t>2/10/24</a:t>
+              <a:t>2/12/24</a:t>
             </a:fld>
             <a:endParaRPr lang="en-US" dirty="0"/>
           </a:p>
@@ -990,7 +990,7 @@
           <a:p>
             <a:fld id="{F4E40C43-FBBA-1747-A088-4D896BE26C2E}" type="datetime1">
               <a:rPr lang="en-US" smtClean="0"/>
-              <a:t>2/10/24</a:t>
+              <a:t>2/12/24</a:t>
             </a:fld>
             <a:endParaRPr lang="en-US" dirty="0"/>
           </a:p>
@@ -1198,7 +1198,7 @@
           <a:p>
             <a:fld id="{D9AD9CED-6AA3-9640-BB17-376FC0752193}" type="datetime1">
               <a:rPr lang="en-US" smtClean="0"/>
-              <a:t>2/10/24</a:t>
+              <a:t>2/12/24</a:t>
             </a:fld>
             <a:endParaRPr lang="en-US" dirty="0"/>
           </a:p>
@@ -1396,7 +1396,7 @@
           <a:p>
             <a:fld id="{67C62BD5-A810-D446-AEEA-6EA5DA66F7C5}" type="datetime1">
               <a:rPr lang="en-US" smtClean="0"/>
-              <a:t>2/10/24</a:t>
+              <a:t>2/12/24</a:t>
             </a:fld>
             <a:endParaRPr lang="en-US" dirty="0"/>
           </a:p>
@@ -1671,7 +1671,7 @@
           <a:p>
             <a:fld id="{57001136-4BB2-A341-88D9-FB518730363E}" type="datetime1">
               <a:rPr lang="en-US" smtClean="0"/>
-              <a:t>2/10/24</a:t>
+              <a:t>2/12/24</a:t>
             </a:fld>
             <a:endParaRPr lang="en-US" dirty="0"/>
           </a:p>
@@ -1936,7 +1936,7 @@
           <a:p>
             <a:fld id="{D1748CDE-4324-1045-A49E-BF7602B573B5}" type="datetime1">
               <a:rPr lang="en-US" smtClean="0"/>
-              <a:t>2/10/24</a:t>
+              <a:t>2/12/24</a:t>
             </a:fld>
             <a:endParaRPr lang="en-US" dirty="0"/>
           </a:p>
@@ -2348,7 +2348,7 @@
           <a:p>
             <a:fld id="{2F85ACE2-1720-F542-825B-0CA3A18264E8}" type="datetime1">
               <a:rPr lang="en-US" smtClean="0"/>
-              <a:t>2/10/24</a:t>
+              <a:t>2/12/24</a:t>
             </a:fld>
             <a:endParaRPr lang="en-US" dirty="0"/>
           </a:p>
@@ -2489,7 +2489,7 @@
           <a:p>
             <a:fld id="{36D9C0BD-9315-FB46-9614-C015909AAA87}" type="datetime1">
               <a:rPr lang="en-US" smtClean="0"/>
-              <a:t>2/10/24</a:t>
+              <a:t>2/12/24</a:t>
             </a:fld>
             <a:endParaRPr lang="en-US" dirty="0"/>
           </a:p>
@@ -2602,7 +2602,7 @@
           <a:p>
             <a:fld id="{D633906E-A217-3A46-BD2A-C104A9466F59}" type="datetime1">
               <a:rPr lang="en-US" smtClean="0"/>
-              <a:t>2/10/24</a:t>
+              <a:t>2/12/24</a:t>
             </a:fld>
             <a:endParaRPr lang="en-US" dirty="0"/>
           </a:p>
@@ -2913,7 +2913,7 @@
           <a:p>
             <a:fld id="{9637180C-3397-924B-97CE-6DF943BBC4E5}" type="datetime1">
               <a:rPr lang="en-US" smtClean="0"/>
-              <a:t>2/10/24</a:t>
+              <a:t>2/12/24</a:t>
             </a:fld>
             <a:endParaRPr lang="en-US" dirty="0"/>
           </a:p>
@@ -3201,7 +3201,7 @@
           <a:p>
             <a:fld id="{0F17F01D-15DE-0448-8A25-D642B47D3EE5}" type="datetime1">
               <a:rPr lang="en-US" smtClean="0"/>
-              <a:t>2/10/24</a:t>
+              <a:t>2/12/24</a:t>
             </a:fld>
             <a:endParaRPr lang="en-US" dirty="0"/>
           </a:p>
@@ -3442,7 +3442,7 @@
           <a:p>
             <a:fld id="{21D39580-25DC-9F49-8D47-C104B4FAE15A}" type="datetime1">
               <a:rPr lang="en-US" smtClean="0"/>
-              <a:t>2/10/24</a:t>
+              <a:t>2/12/24</a:t>
             </a:fld>
             <a:endParaRPr lang="en-US" dirty="0"/>
           </a:p>
@@ -3943,7 +3943,7 @@
           <a:p>
             <a:r>
               <a:rPr lang="en-US" dirty="0"/>
-              <a:t>8 Feb 2024</a:t>
+              <a:t>12 Feb 2024</a:t>
             </a:r>
           </a:p>
         </p:txBody>
@@ -4680,31 +4680,14 @@
           <a:p>
             <a:r>
               <a:rPr lang="en-US" dirty="0"/>
-              <a:t>Point Extract</a:t>
+              <a:t>Polygon Extract</a:t>
             </a:r>
           </a:p>
           <a:p>
             <a:pPr lvl="1"/>
             <a:r>
               <a:rPr lang="en-US" dirty="0"/>
-              <a:t>Runs, but does not produce output</a:t>
-            </a:r>
-          </a:p>
-          <a:p>
-            <a:pPr lvl="1"/>
-            <a:endParaRPr lang="en-US" dirty="0"/>
-          </a:p>
-          <a:p>
-            <a:r>
-              <a:rPr lang="en-US" i="1" dirty="0"/>
-              <a:t>Geopackage</a:t>
-            </a:r>
-          </a:p>
-          <a:p>
-            <a:pPr lvl="1"/>
-            <a:r>
-              <a:rPr lang="en-US" i="1" dirty="0"/>
-              <a:t>Need to verify output once line and point extractions are working</a:t>
+              <a:t>Runs, but does not use GPU</a:t>
             </a:r>
           </a:p>
         </p:txBody>

</xml_diff>

<commit_message>
added diagrams for yao-yi
</commit_message>
<xml_diff>
--- a/docs/overview.pptx
+++ b/docs/overview.pptx
@@ -5,24 +5,25 @@
     <p:sldMasterId id="2147483648" r:id="rId1"/>
   </p:sldMasterIdLst>
   <p:notesMasterIdLst>
-    <p:notesMasterId r:id="rId17"/>
+    <p:notesMasterId r:id="rId18"/>
   </p:notesMasterIdLst>
   <p:sldIdLst>
     <p:sldId id="256" r:id="rId2"/>
     <p:sldId id="257" r:id="rId3"/>
     <p:sldId id="279" r:id="rId4"/>
-    <p:sldId id="258" r:id="rId5"/>
-    <p:sldId id="274" r:id="rId6"/>
-    <p:sldId id="270" r:id="rId7"/>
-    <p:sldId id="271" r:id="rId8"/>
-    <p:sldId id="272" r:id="rId9"/>
-    <p:sldId id="273" r:id="rId10"/>
-    <p:sldId id="275" r:id="rId11"/>
-    <p:sldId id="276" r:id="rId12"/>
-    <p:sldId id="277" r:id="rId13"/>
-    <p:sldId id="278" r:id="rId14"/>
-    <p:sldId id="268" r:id="rId15"/>
-    <p:sldId id="265" r:id="rId16"/>
+    <p:sldId id="280" r:id="rId5"/>
+    <p:sldId id="258" r:id="rId6"/>
+    <p:sldId id="274" r:id="rId7"/>
+    <p:sldId id="270" r:id="rId8"/>
+    <p:sldId id="271" r:id="rId9"/>
+    <p:sldId id="272" r:id="rId10"/>
+    <p:sldId id="273" r:id="rId11"/>
+    <p:sldId id="275" r:id="rId12"/>
+    <p:sldId id="276" r:id="rId13"/>
+    <p:sldId id="277" r:id="rId14"/>
+    <p:sldId id="278" r:id="rId15"/>
+    <p:sldId id="268" r:id="rId16"/>
+    <p:sldId id="265" r:id="rId17"/>
   </p:sldIdLst>
   <p:sldSz cx="12192000" cy="6858000"/>
   <p:notesSz cx="6858000" cy="9144000"/>
@@ -211,7 +212,7 @@
           <a:p>
             <a:fld id="{A9FFB0D8-BEE1-E441-993F-073C1206777B}" type="datetimeFigureOut">
               <a:rPr lang="en-US" smtClean="0"/>
-              <a:t>3/25/24</a:t>
+              <a:t>3/26/24</a:t>
             </a:fld>
             <a:endParaRPr lang="en-US" dirty="0"/>
           </a:p>
@@ -627,7 +628,7 @@
           <a:p>
             <a:fld id="{6CD34286-103F-9E47-AFC6-34F73E6CF5EC}" type="slidenum">
               <a:rPr lang="en-US" smtClean="0"/>
-              <a:t>7</a:t>
+              <a:t>8</a:t>
             </a:fld>
             <a:endParaRPr lang="en-US" dirty="0"/>
           </a:p>
@@ -793,7 +794,7 @@
           <a:p>
             <a:fld id="{E65B9B70-A04C-6947-A62D-89703208E261}" type="datetime1">
               <a:rPr lang="en-US" smtClean="0"/>
-              <a:t>3/25/24</a:t>
+              <a:t>3/26/24</a:t>
             </a:fld>
             <a:endParaRPr lang="en-US" dirty="0"/>
           </a:p>
@@ -991,7 +992,7 @@
           <a:p>
             <a:fld id="{F4E40C43-FBBA-1747-A088-4D896BE26C2E}" type="datetime1">
               <a:rPr lang="en-US" smtClean="0"/>
-              <a:t>3/25/24</a:t>
+              <a:t>3/26/24</a:t>
             </a:fld>
             <a:endParaRPr lang="en-US" dirty="0"/>
           </a:p>
@@ -1199,7 +1200,7 @@
           <a:p>
             <a:fld id="{D9AD9CED-6AA3-9640-BB17-376FC0752193}" type="datetime1">
               <a:rPr lang="en-US" smtClean="0"/>
-              <a:t>3/25/24</a:t>
+              <a:t>3/26/24</a:t>
             </a:fld>
             <a:endParaRPr lang="en-US" dirty="0"/>
           </a:p>
@@ -1397,7 +1398,7 @@
           <a:p>
             <a:fld id="{67C62BD5-A810-D446-AEEA-6EA5DA66F7C5}" type="datetime1">
               <a:rPr lang="en-US" smtClean="0"/>
-              <a:t>3/25/24</a:t>
+              <a:t>3/26/24</a:t>
             </a:fld>
             <a:endParaRPr lang="en-US" dirty="0"/>
           </a:p>
@@ -1672,7 +1673,7 @@
           <a:p>
             <a:fld id="{57001136-4BB2-A341-88D9-FB518730363E}" type="datetime1">
               <a:rPr lang="en-US" smtClean="0"/>
-              <a:t>3/25/24</a:t>
+              <a:t>3/26/24</a:t>
             </a:fld>
             <a:endParaRPr lang="en-US" dirty="0"/>
           </a:p>
@@ -1937,7 +1938,7 @@
           <a:p>
             <a:fld id="{D1748CDE-4324-1045-A49E-BF7602B573B5}" type="datetime1">
               <a:rPr lang="en-US" smtClean="0"/>
-              <a:t>3/25/24</a:t>
+              <a:t>3/26/24</a:t>
             </a:fld>
             <a:endParaRPr lang="en-US" dirty="0"/>
           </a:p>
@@ -2349,7 +2350,7 @@
           <a:p>
             <a:fld id="{2F85ACE2-1720-F542-825B-0CA3A18264E8}" type="datetime1">
               <a:rPr lang="en-US" smtClean="0"/>
-              <a:t>3/25/24</a:t>
+              <a:t>3/26/24</a:t>
             </a:fld>
             <a:endParaRPr lang="en-US" dirty="0"/>
           </a:p>
@@ -2490,7 +2491,7 @@
           <a:p>
             <a:fld id="{36D9C0BD-9315-FB46-9614-C015909AAA87}" type="datetime1">
               <a:rPr lang="en-US" smtClean="0"/>
-              <a:t>3/25/24</a:t>
+              <a:t>3/26/24</a:t>
             </a:fld>
             <a:endParaRPr lang="en-US" dirty="0"/>
           </a:p>
@@ -2603,7 +2604,7 @@
           <a:p>
             <a:fld id="{D633906E-A217-3A46-BD2A-C104A9466F59}" type="datetime1">
               <a:rPr lang="en-US" smtClean="0"/>
-              <a:t>3/25/24</a:t>
+              <a:t>3/26/24</a:t>
             </a:fld>
             <a:endParaRPr lang="en-US" dirty="0"/>
           </a:p>
@@ -2914,7 +2915,7 @@
           <a:p>
             <a:fld id="{9637180C-3397-924B-97CE-6DF943BBC4E5}" type="datetime1">
               <a:rPr lang="en-US" smtClean="0"/>
-              <a:t>3/25/24</a:t>
+              <a:t>3/26/24</a:t>
             </a:fld>
             <a:endParaRPr lang="en-US" dirty="0"/>
           </a:p>
@@ -3202,7 +3203,7 @@
           <a:p>
             <a:fld id="{0F17F01D-15DE-0448-8A25-D642B47D3EE5}" type="datetime1">
               <a:rPr lang="en-US" smtClean="0"/>
-              <a:t>3/25/24</a:t>
+              <a:t>3/26/24</a:t>
             </a:fld>
             <a:endParaRPr lang="en-US" dirty="0"/>
           </a:p>
@@ -3443,7 +3444,7 @@
           <a:p>
             <a:fld id="{21D39580-25DC-9F49-8D47-C104B4FAE15A}" type="datetime1">
               <a:rPr lang="en-US" smtClean="0"/>
-              <a:t>3/25/24</a:t>
+              <a:t>3/26/24</a:t>
             </a:fld>
             <a:endParaRPr lang="en-US" dirty="0"/>
           </a:p>
@@ -4013,7 +4014,7 @@
           <p:cNvPr id="2" name="Title 1">
             <a:extLst>
               <a:ext uri="{FF2B5EF4-FFF2-40B4-BE49-F238E27FC236}">
-                <a16:creationId xmlns:a16="http://schemas.microsoft.com/office/drawing/2014/main" id="{9BC62644-7CBA-4EC7-D2BA-D8E184158DD2}"/>
+                <a16:creationId xmlns:a16="http://schemas.microsoft.com/office/drawing/2014/main" id="{CD19370A-8BBD-8AA9-5D8D-D36140357302}"/>
               </a:ext>
             </a:extLst>
           </p:cNvPr>
@@ -4026,7 +4027,7 @@
         </p:nvSpPr>
         <p:spPr>
           <a:xfrm>
-            <a:off x="838200" y="124495"/>
+            <a:off x="838200" y="143741"/>
             <a:ext cx="10515600" cy="1325563"/>
           </a:xfrm>
         </p:spPr>
@@ -4037,8 +4038,394 @@
             <a:pPr algn="r"/>
             <a:r>
               <a:rPr lang="en-US" u="sng" dirty="0"/>
-              <a:t>System View</a:t>
-            </a:r>
+              <a:t>User View: </a:t>
+            </a:r>
+            <a:r>
+              <a:rPr lang="en-US" i="1" u="sng" dirty="0"/>
+              <a:t>the config file</a:t>
+            </a:r>
+          </a:p>
+        </p:txBody>
+      </p:sp>
+      <p:sp>
+        <p:nvSpPr>
+          <p:cNvPr id="3" name="Content Placeholder 2">
+            <a:extLst>
+              <a:ext uri="{FF2B5EF4-FFF2-40B4-BE49-F238E27FC236}">
+                <a16:creationId xmlns:a16="http://schemas.microsoft.com/office/drawing/2014/main" id="{118A8AE9-B028-07D5-4555-EF8AE74753CD}"/>
+              </a:ext>
+            </a:extLst>
+          </p:cNvPr>
+          <p:cNvSpPr>
+            <a:spLocks noGrp="1"/>
+          </p:cNvSpPr>
+          <p:nvPr>
+            <p:ph idx="1"/>
+          </p:nvPr>
+        </p:nvSpPr>
+        <p:spPr>
+          <a:xfrm>
+            <a:off x="838199" y="1825625"/>
+            <a:ext cx="10750617" cy="4667250"/>
+          </a:xfrm>
+        </p:spPr>
+        <p:txBody>
+          <a:bodyPr>
+            <a:noAutofit/>
+          </a:bodyPr>
+          <a:lstStyle/>
+          <a:p>
+            <a:pPr marL="0" indent="0">
+              <a:buNone/>
+            </a:pPr>
+            <a:r>
+              <a:rPr lang="en-US" sz="2400" b="1" dirty="0">
+                <a:latin typeface="Courier New" panose="02070309020205020404" pitchFamily="49" charset="0"/>
+                <a:cs typeface="Courier New" panose="02070309020205020404" pitchFamily="49" charset="0"/>
+              </a:rPr>
+              <a:t>host:</a:t>
+            </a:r>
+            <a:br>
+              <a:rPr lang="en-US" sz="2400" dirty="0">
+                <a:latin typeface="Courier New" panose="02070309020205020404" pitchFamily="49" charset="0"/>
+                <a:cs typeface="Courier New" panose="02070309020205020404" pitchFamily="49" charset="0"/>
+              </a:rPr>
+            </a:br>
+            <a:r>
+              <a:rPr lang="en-US" sz="2000" dirty="0">
+                <a:latin typeface="Courier New" panose="02070309020205020404" pitchFamily="49" charset="0"/>
+                <a:cs typeface="Courier New" panose="02070309020205020404" pitchFamily="49" charset="0"/>
+              </a:rPr>
+              <a:t>    </a:t>
+            </a:r>
+            <a:r>
+              <a:rPr lang="en-US" sz="2000" b="1" dirty="0">
+                <a:latin typeface="Courier New" panose="02070309020205020404" pitchFamily="49" charset="0"/>
+                <a:cs typeface="Courier New" panose="02070309020205020404" pitchFamily="49" charset="0"/>
+              </a:rPr>
+              <a:t>input_dir:   </a:t>
+            </a:r>
+            <a:r>
+              <a:rPr lang="en-US" sz="2000" dirty="0">
+                <a:latin typeface="Courier New" panose="02070309020205020404" pitchFamily="49" charset="0"/>
+                <a:cs typeface="Courier New" panose="02070309020205020404" pitchFamily="49" charset="0"/>
+              </a:rPr>
+              <a:t>/home/mpg/dev/ta1_integration_inputs</a:t>
+            </a:r>
+            <a:br>
+              <a:rPr lang="en-US" sz="2000" dirty="0">
+                <a:latin typeface="Courier New" panose="02070309020205020404" pitchFamily="49" charset="0"/>
+                <a:cs typeface="Courier New" panose="02070309020205020404" pitchFamily="49" charset="0"/>
+              </a:rPr>
+            </a:br>
+            <a:r>
+              <a:rPr lang="en-US" sz="2000" dirty="0">
+                <a:latin typeface="Courier New" panose="02070309020205020404" pitchFamily="49" charset="0"/>
+                <a:cs typeface="Courier New" panose="02070309020205020404" pitchFamily="49" charset="0"/>
+              </a:rPr>
+              <a:t>    </a:t>
+            </a:r>
+            <a:r>
+              <a:rPr lang="en-US" sz="2000" b="1" dirty="0">
+                <a:latin typeface="Courier New" panose="02070309020205020404" pitchFamily="49" charset="0"/>
+                <a:cs typeface="Courier New" panose="02070309020205020404" pitchFamily="49" charset="0"/>
+              </a:rPr>
+              <a:t>output_dir:</a:t>
+            </a:r>
+            <a:r>
+              <a:rPr lang="en-US" sz="2000" dirty="0">
+                <a:latin typeface="Courier New" panose="02070309020205020404" pitchFamily="49" charset="0"/>
+                <a:cs typeface="Courier New" panose="02070309020205020404" pitchFamily="49" charset="0"/>
+              </a:rPr>
+              <a:t>  /home/mpg/dev/ta1-output</a:t>
+            </a:r>
+            <a:br>
+              <a:rPr lang="en-US" sz="2000" dirty="0">
+                <a:latin typeface="Courier New" panose="02070309020205020404" pitchFamily="49" charset="0"/>
+                <a:cs typeface="Courier New" panose="02070309020205020404" pitchFamily="49" charset="0"/>
+              </a:rPr>
+            </a:br>
+            <a:br>
+              <a:rPr lang="en-US" sz="1400" dirty="0">
+                <a:latin typeface="Courier New" panose="02070309020205020404" pitchFamily="49" charset="0"/>
+                <a:cs typeface="Courier New" panose="02070309020205020404" pitchFamily="49" charset="0"/>
+              </a:rPr>
+            </a:br>
+            <a:r>
+              <a:rPr lang="en-US" sz="2400" b="1" dirty="0">
+                <a:latin typeface="Courier New" panose="02070309020205020404" pitchFamily="49" charset="0"/>
+                <a:cs typeface="Courier New" panose="02070309020205020404" pitchFamily="49" charset="0"/>
+              </a:rPr>
+              <a:t>container:</a:t>
+            </a:r>
+            <a:br>
+              <a:rPr lang="en-US" sz="2400" dirty="0">
+                <a:latin typeface="Courier New" panose="02070309020205020404" pitchFamily="49" charset="0"/>
+                <a:cs typeface="Courier New" panose="02070309020205020404" pitchFamily="49" charset="0"/>
+              </a:rPr>
+            </a:br>
+            <a:r>
+              <a:rPr lang="en-US" sz="2000" dirty="0">
+                <a:latin typeface="Courier New" panose="02070309020205020404" pitchFamily="49" charset="0"/>
+                <a:cs typeface="Courier New" panose="02070309020205020404" pitchFamily="49" charset="0"/>
+              </a:rPr>
+              <a:t>    </a:t>
+            </a:r>
+            <a:r>
+              <a:rPr lang="en-US" sz="2000" b="1" dirty="0">
+                <a:latin typeface="Courier New" panose="02070309020205020404" pitchFamily="49" charset="0"/>
+                <a:cs typeface="Courier New" panose="02070309020205020404" pitchFamily="49" charset="0"/>
+              </a:rPr>
+              <a:t>input_dir:   </a:t>
+            </a:r>
+            <a:r>
+              <a:rPr lang="en-US" sz="2000" dirty="0">
+                <a:latin typeface="Courier New" panose="02070309020205020404" pitchFamily="49" charset="0"/>
+                <a:cs typeface="Courier New" panose="02070309020205020404" pitchFamily="49" charset="0"/>
+              </a:rPr>
+              <a:t>/ta1/input</a:t>
+            </a:r>
+            <a:br>
+              <a:rPr lang="en-US" sz="2000" dirty="0">
+                <a:latin typeface="Courier New" panose="02070309020205020404" pitchFamily="49" charset="0"/>
+                <a:cs typeface="Courier New" panose="02070309020205020404" pitchFamily="49" charset="0"/>
+              </a:rPr>
+            </a:br>
+            <a:r>
+              <a:rPr lang="en-US" sz="2000" dirty="0">
+                <a:latin typeface="Courier New" panose="02070309020205020404" pitchFamily="49" charset="0"/>
+                <a:cs typeface="Courier New" panose="02070309020205020404" pitchFamily="49" charset="0"/>
+              </a:rPr>
+              <a:t>    </a:t>
+            </a:r>
+            <a:r>
+              <a:rPr lang="en-US" sz="2000" b="1" dirty="0">
+                <a:latin typeface="Courier New" panose="02070309020205020404" pitchFamily="49" charset="0"/>
+                <a:cs typeface="Courier New" panose="02070309020205020404" pitchFamily="49" charset="0"/>
+              </a:rPr>
+              <a:t>output_dir:</a:t>
+            </a:r>
+            <a:r>
+              <a:rPr lang="en-US" sz="2000" dirty="0">
+                <a:latin typeface="Courier New" panose="02070309020205020404" pitchFamily="49" charset="0"/>
+                <a:cs typeface="Courier New" panose="02070309020205020404" pitchFamily="49" charset="0"/>
+              </a:rPr>
+              <a:t>  /ta1/output</a:t>
+            </a:r>
+            <a:br>
+              <a:rPr lang="en-US" sz="2000" dirty="0">
+                <a:latin typeface="Courier New" panose="02070309020205020404" pitchFamily="49" charset="0"/>
+                <a:cs typeface="Courier New" panose="02070309020205020404" pitchFamily="49" charset="0"/>
+              </a:rPr>
+            </a:br>
+            <a:endParaRPr lang="en-US" sz="1400" dirty="0">
+              <a:latin typeface="Courier New" panose="02070309020205020404" pitchFamily="49" charset="0"/>
+              <a:cs typeface="Courier New" panose="02070309020205020404" pitchFamily="49" charset="0"/>
+            </a:endParaRPr>
+          </a:p>
+          <a:p>
+            <a:pPr marL="0" indent="0">
+              <a:buNone/>
+            </a:pPr>
+            <a:r>
+              <a:rPr lang="en-US" sz="2400" b="1" dirty="0">
+                <a:latin typeface="Courier New" panose="02070309020205020404" pitchFamily="49" charset="0"/>
+                <a:cs typeface="Courier New" panose="02070309020205020404" pitchFamily="49" charset="0"/>
+              </a:rPr>
+              <a:t>modules:</a:t>
+            </a:r>
+            <a:br>
+              <a:rPr lang="en-US" sz="2400" dirty="0">
+                <a:latin typeface="Courier New" panose="02070309020205020404" pitchFamily="49" charset="0"/>
+                <a:cs typeface="Courier New" panose="02070309020205020404" pitchFamily="49" charset="0"/>
+              </a:rPr>
+            </a:br>
+            <a:r>
+              <a:rPr lang="en-US" sz="2000" dirty="0">
+                <a:latin typeface="Courier New" panose="02070309020205020404" pitchFamily="49" charset="0"/>
+                <a:cs typeface="Courier New" panose="02070309020205020404" pitchFamily="49" charset="0"/>
+              </a:rPr>
+              <a:t>    </a:t>
+            </a:r>
+            <a:r>
+              <a:rPr lang="en-US" sz="2000" b="1" dirty="0">
+                <a:latin typeface="Courier New" panose="02070309020205020404" pitchFamily="49" charset="0"/>
+                <a:cs typeface="Courier New" panose="02070309020205020404" pitchFamily="49" charset="0"/>
+              </a:rPr>
+              <a:t>legend_segment:</a:t>
+            </a:r>
+            <a:br>
+              <a:rPr lang="en-US" sz="2000" dirty="0">
+                <a:latin typeface="Courier New" panose="02070309020205020404" pitchFamily="49" charset="0"/>
+                <a:cs typeface="Courier New" panose="02070309020205020404" pitchFamily="49" charset="0"/>
+              </a:rPr>
+            </a:br>
+            <a:r>
+              <a:rPr lang="en-US" sz="2000" dirty="0">
+                <a:latin typeface="Courier New" panose="02070309020205020404" pitchFamily="49" charset="0"/>
+                <a:cs typeface="Courier New" panose="02070309020205020404" pitchFamily="49" charset="0"/>
+              </a:rPr>
+              <a:t>        </a:t>
+            </a:r>
+            <a:r>
+              <a:rPr lang="en-US" sz="2000" b="1" dirty="0">
+                <a:latin typeface="Courier New" panose="02070309020205020404" pitchFamily="49" charset="0"/>
+                <a:cs typeface="Courier New" panose="02070309020205020404" pitchFamily="49" charset="0"/>
+              </a:rPr>
+              <a:t>input:      </a:t>
+            </a:r>
+            <a:r>
+              <a:rPr lang="en-US" sz="2000" b="1" dirty="0">
+                <a:solidFill>
+                  <a:srgbClr val="7030A0"/>
+                </a:solidFill>
+                <a:latin typeface="Courier New" panose="02070309020205020404" pitchFamily="49" charset="0"/>
+                <a:cs typeface="Courier New" panose="02070309020205020404" pitchFamily="49" charset="0"/>
+              </a:rPr>
+              <a:t>$INPUT_DIR</a:t>
+            </a:r>
+            <a:r>
+              <a:rPr lang="en-US" sz="2000" dirty="0">
+                <a:latin typeface="Courier New" panose="02070309020205020404" pitchFamily="49" charset="0"/>
+                <a:cs typeface="Courier New" panose="02070309020205020404" pitchFamily="49" charset="0"/>
+              </a:rPr>
+              <a:t>/maps/</a:t>
+            </a:r>
+            <a:r>
+              <a:rPr lang="en-US" sz="2000" b="1" dirty="0">
+                <a:solidFill>
+                  <a:srgbClr val="7030A0"/>
+                </a:solidFill>
+                <a:latin typeface="Courier New" panose="02070309020205020404" pitchFamily="49" charset="0"/>
+                <a:cs typeface="Courier New" panose="02070309020205020404" pitchFamily="49" charset="0"/>
+              </a:rPr>
+              <a:t>$MAP_NAME</a:t>
+            </a:r>
+            <a:br>
+              <a:rPr lang="en-US" sz="2000" dirty="0">
+                <a:latin typeface="Courier New" panose="02070309020205020404" pitchFamily="49" charset="0"/>
+                <a:cs typeface="Courier New" panose="02070309020205020404" pitchFamily="49" charset="0"/>
+              </a:rPr>
+            </a:br>
+            <a:r>
+              <a:rPr lang="en-US" sz="2000" dirty="0">
+                <a:latin typeface="Courier New" panose="02070309020205020404" pitchFamily="49" charset="0"/>
+                <a:cs typeface="Courier New" panose="02070309020205020404" pitchFamily="49" charset="0"/>
+              </a:rPr>
+              <a:t>        </a:t>
+            </a:r>
+            <a:r>
+              <a:rPr lang="en-US" sz="2000" b="1" dirty="0">
+                <a:latin typeface="Courier New" panose="02070309020205020404" pitchFamily="49" charset="0"/>
+                <a:cs typeface="Courier New" panose="02070309020205020404" pitchFamily="49" charset="0"/>
+              </a:rPr>
+              <a:t>output:     </a:t>
+            </a:r>
+            <a:r>
+              <a:rPr lang="en-US" sz="2000" b="1" dirty="0">
+                <a:solidFill>
+                  <a:srgbClr val="7030A0"/>
+                </a:solidFill>
+                <a:latin typeface="Courier New" panose="02070309020205020404" pitchFamily="49" charset="0"/>
+                <a:cs typeface="Courier New" panose="02070309020205020404" pitchFamily="49" charset="0"/>
+              </a:rPr>
+              <a:t>$OUTPUT_DIR</a:t>
+            </a:r>
+            <a:r>
+              <a:rPr lang="en-US" sz="2000" dirty="0">
+                <a:latin typeface="Courier New" panose="02070309020205020404" pitchFamily="49" charset="0"/>
+                <a:cs typeface="Courier New" panose="02070309020205020404" pitchFamily="49" charset="0"/>
+              </a:rPr>
+              <a:t>/legend_segment</a:t>
+            </a:r>
+            <a:br>
+              <a:rPr lang="en-US" sz="2000" dirty="0">
+                <a:latin typeface="Courier New" panose="02070309020205020404" pitchFamily="49" charset="0"/>
+                <a:cs typeface="Courier New" panose="02070309020205020404" pitchFamily="49" charset="0"/>
+              </a:rPr>
+            </a:br>
+            <a:r>
+              <a:rPr lang="en-US" sz="2000" dirty="0">
+                <a:latin typeface="Courier New" panose="02070309020205020404" pitchFamily="49" charset="0"/>
+                <a:cs typeface="Courier New" panose="02070309020205020404" pitchFamily="49" charset="0"/>
+              </a:rPr>
+              <a:t>	  </a:t>
+            </a:r>
+            <a:r>
+              <a:rPr lang="en-US" sz="2000" b="1" dirty="0">
+                <a:latin typeface="Courier New" panose="02070309020205020404" pitchFamily="49" charset="0"/>
+                <a:cs typeface="Courier New" panose="02070309020205020404" pitchFamily="49" charset="0"/>
+              </a:rPr>
+              <a:t>model:      </a:t>
+            </a:r>
+            <a:r>
+              <a:rPr lang="en-US" sz="2000" b="1" dirty="0">
+                <a:solidFill>
+                  <a:srgbClr val="7030A0"/>
+                </a:solidFill>
+                <a:latin typeface="Courier New" panose="02070309020205020404" pitchFamily="49" charset="0"/>
+                <a:cs typeface="Courier New" panose="02070309020205020404" pitchFamily="49" charset="0"/>
+              </a:rPr>
+              <a:t>$INPUT_DIR</a:t>
+            </a:r>
+            <a:r>
+              <a:rPr lang="en-US" sz="2000" dirty="0">
+                <a:latin typeface="Courier New" panose="02070309020205020404" pitchFamily="49" charset="0"/>
+                <a:cs typeface="Courier New" panose="02070309020205020404" pitchFamily="49" charset="0"/>
+              </a:rPr>
+              <a:t>/legend_segment/layoutlmv3_20230929</a:t>
+            </a:r>
+            <a:br>
+              <a:rPr lang="en-US" sz="2000" dirty="0">
+                <a:latin typeface="Courier New" panose="02070309020205020404" pitchFamily="49" charset="0"/>
+                <a:cs typeface="Courier New" panose="02070309020205020404" pitchFamily="49" charset="0"/>
+              </a:rPr>
+            </a:br>
+            <a:r>
+              <a:rPr lang="en-US" sz="2000" dirty="0">
+                <a:latin typeface="Courier New" panose="02070309020205020404" pitchFamily="49" charset="0"/>
+                <a:cs typeface="Courier New" panose="02070309020205020404" pitchFamily="49" charset="0"/>
+              </a:rPr>
+              <a:t>        </a:t>
+            </a:r>
+            <a:r>
+              <a:rPr lang="en-US" sz="2000" b="1" dirty="0">
+                <a:latin typeface="Courier New" panose="02070309020205020404" pitchFamily="49" charset="0"/>
+                <a:cs typeface="Courier New" panose="02070309020205020404" pitchFamily="49" charset="0"/>
+              </a:rPr>
+              <a:t>threshold:  </a:t>
+            </a:r>
+            <a:r>
+              <a:rPr lang="en-US" sz="2000" dirty="0">
+                <a:latin typeface="Courier New" panose="02070309020205020404" pitchFamily="49" charset="0"/>
+                <a:cs typeface="Courier New" panose="02070309020205020404" pitchFamily="49" charset="0"/>
+              </a:rPr>
+              <a:t>3.14</a:t>
+            </a:r>
+            <a:br>
+              <a:rPr lang="en-US" sz="2000" dirty="0">
+                <a:latin typeface="Courier New" panose="02070309020205020404" pitchFamily="49" charset="0"/>
+                <a:cs typeface="Courier New" panose="02070309020205020404" pitchFamily="49" charset="0"/>
+              </a:rPr>
+            </a:br>
+            <a:r>
+              <a:rPr lang="en-US" sz="2000" dirty="0">
+                <a:latin typeface="Courier New" panose="02070309020205020404" pitchFamily="49" charset="0"/>
+                <a:cs typeface="Courier New" panose="02070309020205020404" pitchFamily="49" charset="0"/>
+              </a:rPr>
+              <a:t>    </a:t>
+            </a:r>
+            <a:r>
+              <a:rPr lang="en-US" sz="2000" b="1" dirty="0">
+                <a:latin typeface="Courier New" panose="02070309020205020404" pitchFamily="49" charset="0"/>
+                <a:cs typeface="Courier New" panose="02070309020205020404" pitchFamily="49" charset="0"/>
+              </a:rPr>
+              <a:t>…</a:t>
+            </a:r>
+            <a:endParaRPr lang="en-US" sz="2000" dirty="0">
+              <a:latin typeface="Courier New" panose="02070309020205020404" pitchFamily="49" charset="0"/>
+              <a:cs typeface="Courier New" panose="02070309020205020404" pitchFamily="49" charset="0"/>
+            </a:endParaRPr>
           </a:p>
         </p:txBody>
       </p:sp>
@@ -4047,7 +4434,7 @@
           <p:cNvPr id="4" name="Slide Number Placeholder 3">
             <a:extLst>
               <a:ext uri="{FF2B5EF4-FFF2-40B4-BE49-F238E27FC236}">
-                <a16:creationId xmlns:a16="http://schemas.microsoft.com/office/drawing/2014/main" id="{25796E30-6C51-2A51-DDF9-DD362507EC92}"/>
+                <a16:creationId xmlns:a16="http://schemas.microsoft.com/office/drawing/2014/main" id="{DF1B2F41-2F01-9227-F0C3-94698CBE58B4}"/>
               </a:ext>
             </a:extLst>
           </p:cNvPr>
@@ -4066,6 +4453,99 @@
             <a:fld id="{B15EECDE-63F5-1E4D-8144-009D616F0C2C}" type="slidenum">
               <a:rPr lang="en-US" smtClean="0"/>
               <a:t>10</a:t>
+            </a:fld>
+            <a:endParaRPr lang="en-US" dirty="0"/>
+          </a:p>
+        </p:txBody>
+      </p:sp>
+    </p:spTree>
+    <p:extLst>
+      <p:ext uri="{BB962C8B-B14F-4D97-AF65-F5344CB8AC3E}">
+        <p14:creationId xmlns:p14="http://schemas.microsoft.com/office/powerpoint/2010/main" val="3228780085"/>
+      </p:ext>
+    </p:extLst>
+  </p:cSld>
+  <p:clrMapOvr>
+    <a:masterClrMapping/>
+  </p:clrMapOvr>
+</p:sld>
+</file>
+
+<file path=ppt/slides/slide11.xml><?xml version="1.0" encoding="utf-8"?>
+<p:sld xmlns:a="http://schemas.openxmlformats.org/drawingml/2006/main" xmlns:r="http://schemas.openxmlformats.org/officeDocument/2006/relationships" xmlns:p="http://schemas.openxmlformats.org/presentationml/2006/main">
+  <p:cSld>
+    <p:spTree>
+      <p:nvGrpSpPr>
+        <p:cNvPr id="1" name=""/>
+        <p:cNvGrpSpPr/>
+        <p:nvPr/>
+      </p:nvGrpSpPr>
+      <p:grpSpPr>
+        <a:xfrm>
+          <a:off x="0" y="0"/>
+          <a:ext cx="0" cy="0"/>
+          <a:chOff x="0" y="0"/>
+          <a:chExt cx="0" cy="0"/>
+        </a:xfrm>
+      </p:grpSpPr>
+      <p:sp>
+        <p:nvSpPr>
+          <p:cNvPr id="2" name="Title 1">
+            <a:extLst>
+              <a:ext uri="{FF2B5EF4-FFF2-40B4-BE49-F238E27FC236}">
+                <a16:creationId xmlns:a16="http://schemas.microsoft.com/office/drawing/2014/main" id="{9BC62644-7CBA-4EC7-D2BA-D8E184158DD2}"/>
+              </a:ext>
+            </a:extLst>
+          </p:cNvPr>
+          <p:cNvSpPr>
+            <a:spLocks noGrp="1"/>
+          </p:cNvSpPr>
+          <p:nvPr>
+            <p:ph type="title"/>
+          </p:nvPr>
+        </p:nvSpPr>
+        <p:spPr>
+          <a:xfrm>
+            <a:off x="838200" y="124495"/>
+            <a:ext cx="10515600" cy="1325563"/>
+          </a:xfrm>
+        </p:spPr>
+        <p:txBody>
+          <a:bodyPr/>
+          <a:lstStyle/>
+          <a:p>
+            <a:pPr algn="r"/>
+            <a:r>
+              <a:rPr lang="en-US" u="sng" dirty="0"/>
+              <a:t>System View</a:t>
+            </a:r>
+          </a:p>
+        </p:txBody>
+      </p:sp>
+      <p:sp>
+        <p:nvSpPr>
+          <p:cNvPr id="4" name="Slide Number Placeholder 3">
+            <a:extLst>
+              <a:ext uri="{FF2B5EF4-FFF2-40B4-BE49-F238E27FC236}">
+                <a16:creationId xmlns:a16="http://schemas.microsoft.com/office/drawing/2014/main" id="{25796E30-6C51-2A51-DDF9-DD362507EC92}"/>
+              </a:ext>
+            </a:extLst>
+          </p:cNvPr>
+          <p:cNvSpPr>
+            <a:spLocks noGrp="1"/>
+          </p:cNvSpPr>
+          <p:nvPr>
+            <p:ph type="sldNum" sz="quarter" idx="12"/>
+          </p:nvPr>
+        </p:nvSpPr>
+        <p:spPr/>
+        <p:txBody>
+          <a:bodyPr/>
+          <a:lstStyle/>
+          <a:p>
+            <a:fld id="{B15EECDE-63F5-1E4D-8144-009D616F0C2C}" type="slidenum">
+              <a:rPr lang="en-US" smtClean="0"/>
+              <a:t>11</a:t>
             </a:fld>
             <a:endParaRPr lang="en-US" dirty="0"/>
           </a:p>
@@ -5270,7 +5750,7 @@
 </p:sld>
 </file>
 
-<file path=ppt/slides/slide11.xml><?xml version="1.0" encoding="utf-8"?>
+<file path=ppt/slides/slide12.xml><?xml version="1.0" encoding="utf-8"?>
 <p:sld xmlns:a="http://schemas.openxmlformats.org/drawingml/2006/main" xmlns:r="http://schemas.openxmlformats.org/officeDocument/2006/relationships" xmlns:p="http://schemas.openxmlformats.org/presentationml/2006/main">
   <p:cSld>
     <p:spTree>
@@ -5775,7 +6255,7 @@
             <a:fld id="{B15EECDE-63F5-1E4D-8144-009D616F0C2C}" type="slidenum">
               <a:rPr lang="en-US" smtClean="0"/>
               <a:pPr/>
-              <a:t>11</a:t>
+              <a:t>12</a:t>
             </a:fld>
             <a:endParaRPr lang="en-US" dirty="0"/>
           </a:p>
@@ -5854,157 +6334,6 @@
     <p:extLst>
       <p:ext uri="{BB962C8B-B14F-4D97-AF65-F5344CB8AC3E}">
         <p14:creationId xmlns:p14="http://schemas.microsoft.com/office/powerpoint/2010/main" val="497190034"/>
-      </p:ext>
-    </p:extLst>
-  </p:cSld>
-  <p:clrMapOvr>
-    <a:masterClrMapping/>
-  </p:clrMapOvr>
-</p:sld>
-</file>
-
-<file path=ppt/slides/slide12.xml><?xml version="1.0" encoding="utf-8"?>
-<p:sld xmlns:a="http://schemas.openxmlformats.org/drawingml/2006/main" xmlns:r="http://schemas.openxmlformats.org/officeDocument/2006/relationships" xmlns:p="http://schemas.openxmlformats.org/presentationml/2006/main">
-  <p:cSld>
-    <p:spTree>
-      <p:nvGrpSpPr>
-        <p:cNvPr id="1" name=""/>
-        <p:cNvGrpSpPr/>
-        <p:nvPr/>
-      </p:nvGrpSpPr>
-      <p:grpSpPr>
-        <a:xfrm>
-          <a:off x="0" y="0"/>
-          <a:ext cx="0" cy="0"/>
-          <a:chOff x="0" y="0"/>
-          <a:chExt cx="0" cy="0"/>
-        </a:xfrm>
-      </p:grpSpPr>
-      <p:sp>
-        <p:nvSpPr>
-          <p:cNvPr id="2" name="Title 1">
-            <a:extLst>
-              <a:ext uri="{FF2B5EF4-FFF2-40B4-BE49-F238E27FC236}">
-                <a16:creationId xmlns:a16="http://schemas.microsoft.com/office/drawing/2014/main" id="{C51982AA-20C6-AA8F-F442-D4935FEF030B}"/>
-              </a:ext>
-            </a:extLst>
-          </p:cNvPr>
-          <p:cNvSpPr>
-            <a:spLocks noGrp="1"/>
-          </p:cNvSpPr>
-          <p:nvPr>
-            <p:ph type="title"/>
-          </p:nvPr>
-        </p:nvSpPr>
-        <p:spPr>
-          <a:xfrm>
-            <a:off x="838200" y="124493"/>
-            <a:ext cx="10515600" cy="1325563"/>
-          </a:xfrm>
-        </p:spPr>
-        <p:txBody>
-          <a:bodyPr/>
-          <a:lstStyle/>
-          <a:p>
-            <a:pPr algn="r"/>
-            <a:r>
-              <a:rPr lang="en-US" u="sng" dirty="0"/>
-              <a:t>Open Issues: </a:t>
-            </a:r>
-            <a:r>
-              <a:rPr lang="en-US" i="1" u="sng" dirty="0"/>
-              <a:t>module execution</a:t>
-            </a:r>
-          </a:p>
-        </p:txBody>
-      </p:sp>
-      <p:sp>
-        <p:nvSpPr>
-          <p:cNvPr id="3" name="Content Placeholder 2">
-            <a:extLst>
-              <a:ext uri="{FF2B5EF4-FFF2-40B4-BE49-F238E27FC236}">
-                <a16:creationId xmlns:a16="http://schemas.microsoft.com/office/drawing/2014/main" id="{2F5C9EE2-FB8C-8D8E-7D4A-0C89DCB85FFA}"/>
-              </a:ext>
-            </a:extLst>
-          </p:cNvPr>
-          <p:cNvSpPr>
-            <a:spLocks noGrp="1"/>
-          </p:cNvSpPr>
-          <p:nvPr>
-            <p:ph idx="1"/>
-          </p:nvPr>
-        </p:nvSpPr>
-        <p:spPr/>
-        <p:txBody>
-          <a:bodyPr>
-            <a:normAutofit/>
-          </a:bodyPr>
-          <a:lstStyle/>
-          <a:p>
-            <a:r>
-              <a:rPr lang="en-US" dirty="0"/>
-              <a:t>Line Extract</a:t>
-            </a:r>
-          </a:p>
-          <a:p>
-            <a:pPr lvl="1"/>
-            <a:r>
-              <a:rPr lang="en-US" dirty="0"/>
-              <a:t>CUDA build problems with third-party project</a:t>
-            </a:r>
-          </a:p>
-          <a:p>
-            <a:pPr lvl="2"/>
-            <a:endParaRPr lang="en-US" dirty="0"/>
-          </a:p>
-          <a:p>
-            <a:r>
-              <a:rPr lang="en-US" dirty="0"/>
-              <a:t>Polygon Extract</a:t>
-            </a:r>
-          </a:p>
-          <a:p>
-            <a:pPr lvl="1"/>
-            <a:r>
-              <a:rPr lang="en-US" dirty="0"/>
-              <a:t>Runs, but does not use GPU</a:t>
-            </a:r>
-          </a:p>
-        </p:txBody>
-      </p:sp>
-      <p:sp>
-        <p:nvSpPr>
-          <p:cNvPr id="4" name="Slide Number Placeholder 3">
-            <a:extLst>
-              <a:ext uri="{FF2B5EF4-FFF2-40B4-BE49-F238E27FC236}">
-                <a16:creationId xmlns:a16="http://schemas.microsoft.com/office/drawing/2014/main" id="{B71BEADD-4F5F-C909-84FB-778D43DC48EA}"/>
-              </a:ext>
-            </a:extLst>
-          </p:cNvPr>
-          <p:cNvSpPr>
-            <a:spLocks noGrp="1"/>
-          </p:cNvSpPr>
-          <p:nvPr>
-            <p:ph type="sldNum" sz="quarter" idx="12"/>
-          </p:nvPr>
-        </p:nvSpPr>
-        <p:spPr/>
-        <p:txBody>
-          <a:bodyPr/>
-          <a:lstStyle/>
-          <a:p>
-            <a:fld id="{B15EECDE-63F5-1E4D-8144-009D616F0C2C}" type="slidenum">
-              <a:rPr lang="en-US" smtClean="0"/>
-              <a:t>12</a:t>
-            </a:fld>
-            <a:endParaRPr lang="en-US" dirty="0"/>
-          </a:p>
-        </p:txBody>
-      </p:sp>
-    </p:spTree>
-    <p:extLst>
-      <p:ext uri="{BB962C8B-B14F-4D97-AF65-F5344CB8AC3E}">
-        <p14:creationId xmlns:p14="http://schemas.microsoft.com/office/powerpoint/2010/main" val="1264356471"/>
       </p:ext>
     </p:extLst>
   </p:cSld>
@@ -6036,7 +6365,7 @@
           <p:cNvPr id="2" name="Title 1">
             <a:extLst>
               <a:ext uri="{FF2B5EF4-FFF2-40B4-BE49-F238E27FC236}">
-                <a16:creationId xmlns:a16="http://schemas.microsoft.com/office/drawing/2014/main" id="{D8EE4762-4929-A1B9-3A6D-0D0571F16E4D}"/>
+                <a16:creationId xmlns:a16="http://schemas.microsoft.com/office/drawing/2014/main" id="{C51982AA-20C6-AA8F-F442-D4935FEF030B}"/>
               </a:ext>
             </a:extLst>
           </p:cNvPr>
@@ -6064,7 +6393,7 @@
             </a:r>
             <a:r>
               <a:rPr lang="en-US" i="1" u="sng" dirty="0"/>
-              <a:t>module implementation</a:t>
+              <a:t>module execution</a:t>
             </a:r>
           </a:p>
         </p:txBody>
@@ -6074,7 +6403,7 @@
           <p:cNvPr id="3" name="Content Placeholder 2">
             <a:extLst>
               <a:ext uri="{FF2B5EF4-FFF2-40B4-BE49-F238E27FC236}">
-                <a16:creationId xmlns:a16="http://schemas.microsoft.com/office/drawing/2014/main" id="{0DAA9B1A-5BB8-612A-0DD8-410DF3280283}"/>
+                <a16:creationId xmlns:a16="http://schemas.microsoft.com/office/drawing/2014/main" id="{2F5C9EE2-FB8C-8D8E-7D4A-0C89DCB85FFA}"/>
               </a:ext>
             </a:extLst>
           </p:cNvPr>
@@ -6088,88 +6417,38 @@
         <p:spPr/>
         <p:txBody>
           <a:bodyPr>
-            <a:normAutofit fontScale="92500" lnSpcReduction="10000"/>
+            <a:normAutofit/>
           </a:bodyPr>
           <a:lstStyle/>
           <a:p>
             <a:r>
               <a:rPr lang="en-US" dirty="0"/>
-              <a:t>Integration system “knows” too much about the underlying tools</a:t>
+              <a:t>Line Extract</a:t>
             </a:r>
           </a:p>
           <a:p>
             <a:pPr lvl="1"/>
             <a:r>
-              <a:rPr lang="en-US" i="1" dirty="0"/>
-              <a:t>command line switches, hard-coded paths, …</a:t>
+              <a:rPr lang="en-US" dirty="0"/>
+              <a:t>CUDA build problems with third-party project</a:t>
+            </a:r>
+          </a:p>
+          <a:p>
+            <a:pPr lvl="2"/>
+            <a:endParaRPr lang="en-US" dirty="0"/>
+          </a:p>
+          <a:p>
+            <a:r>
+              <a:rPr lang="en-US" dirty="0"/>
+              <a:t>Polygon Extract</a:t>
             </a:r>
           </a:p>
           <a:p>
             <a:pPr lvl="1"/>
-            <a:endParaRPr lang="en-US" dirty="0"/>
-          </a:p>
-          <a:p>
             <a:r>
               <a:rPr lang="en-US" dirty="0"/>
-              <a:t>Projects rely on old versions of 3</a:t>
-            </a:r>
-            <a:r>
-              <a:rPr lang="en-US" baseline="30000" dirty="0"/>
-              <a:t>rd</a:t>
-            </a:r>
-            <a:r>
-              <a:rPr lang="en-US" dirty="0"/>
-              <a:t>-party projects</a:t>
-            </a:r>
-          </a:p>
-          <a:p>
-            <a:pPr lvl="1"/>
-            <a:r>
-              <a:rPr lang="en-US" i="1" dirty="0"/>
-              <a:t>CUDA requirements, docker complexity, …</a:t>
-            </a:r>
-          </a:p>
-          <a:p>
-            <a:pPr lvl="1"/>
-            <a:endParaRPr lang="en-US" dirty="0"/>
-          </a:p>
-          <a:p>
-            <a:r>
-              <a:rPr lang="en-US" dirty="0"/>
-              <a:t>Python coding conventions</a:t>
-            </a:r>
-          </a:p>
-          <a:p>
-            <a:pPr lvl="1"/>
-            <a:r>
-              <a:rPr lang="en-US" i="1" dirty="0"/>
-              <a:t>error handling, logging, …</a:t>
-            </a:r>
-          </a:p>
-          <a:p>
-            <a:endParaRPr lang="en-US" dirty="0"/>
-          </a:p>
-          <a:p>
-            <a:pPr marL="0" indent="0">
-              <a:buNone/>
-            </a:pPr>
-            <a:endParaRPr lang="en-US" dirty="0"/>
-          </a:p>
-          <a:p>
-            <a:pPr marL="0" indent="0" algn="r">
-              <a:buNone/>
-            </a:pPr>
-            <a:r>
-              <a:rPr lang="en-US" b="1" dirty="0">
-                <a:solidFill>
-                  <a:schemeClr val="accent4"/>
-                </a:solidFill>
-              </a:rPr>
-              <a:t>Please come talk to me this week: let’s make plans to address!</a:t>
-            </a:r>
-          </a:p>
-          <a:p>
-            <a:endParaRPr lang="en-US" dirty="0"/>
+              <a:t>Runs, but does not use GPU</a:t>
+            </a:r>
           </a:p>
         </p:txBody>
       </p:sp>
@@ -6178,7 +6457,7 @@
           <p:cNvPr id="4" name="Slide Number Placeholder 3">
             <a:extLst>
               <a:ext uri="{FF2B5EF4-FFF2-40B4-BE49-F238E27FC236}">
-                <a16:creationId xmlns:a16="http://schemas.microsoft.com/office/drawing/2014/main" id="{1CA53668-8B0C-8DBA-3EC7-2166E3952742}"/>
+                <a16:creationId xmlns:a16="http://schemas.microsoft.com/office/drawing/2014/main" id="{B71BEADD-4F5F-C909-84FB-778D43DC48EA}"/>
               </a:ext>
             </a:extLst>
           </p:cNvPr>
@@ -6205,7 +6484,7 @@
     </p:spTree>
     <p:extLst>
       <p:ext uri="{BB962C8B-B14F-4D97-AF65-F5344CB8AC3E}">
-        <p14:creationId xmlns:p14="http://schemas.microsoft.com/office/powerpoint/2010/main" val="3487057690"/>
+        <p14:creationId xmlns:p14="http://schemas.microsoft.com/office/powerpoint/2010/main" val="1264356471"/>
       </p:ext>
     </p:extLst>
   </p:cSld>
@@ -6237,7 +6516,7 @@
           <p:cNvPr id="2" name="Title 1">
             <a:extLst>
               <a:ext uri="{FF2B5EF4-FFF2-40B4-BE49-F238E27FC236}">
-                <a16:creationId xmlns:a16="http://schemas.microsoft.com/office/drawing/2014/main" id="{8DB66F32-4372-AC80-CB08-F1A698BB23E5}"/>
+                <a16:creationId xmlns:a16="http://schemas.microsoft.com/office/drawing/2014/main" id="{D8EE4762-4929-A1B9-3A6D-0D0571F16E4D}"/>
               </a:ext>
             </a:extLst>
           </p:cNvPr>
@@ -6250,7 +6529,7 @@
         </p:nvSpPr>
         <p:spPr>
           <a:xfrm>
-            <a:off x="838200" y="114869"/>
+            <a:off x="838200" y="124493"/>
             <a:ext cx="10515600" cy="1325563"/>
           </a:xfrm>
         </p:spPr>
@@ -6261,7 +6540,11 @@
             <a:pPr algn="r"/>
             <a:r>
               <a:rPr lang="en-US" u="sng" dirty="0"/>
-              <a:t>Documentation</a:t>
+              <a:t>Open Issues: </a:t>
+            </a:r>
+            <a:r>
+              <a:rPr lang="en-US" i="1" u="sng" dirty="0"/>
+              <a:t>module implementation</a:t>
             </a:r>
           </a:p>
         </p:txBody>
@@ -6271,7 +6554,7 @@
           <p:cNvPr id="3" name="Content Placeholder 2">
             <a:extLst>
               <a:ext uri="{FF2B5EF4-FFF2-40B4-BE49-F238E27FC236}">
-                <a16:creationId xmlns:a16="http://schemas.microsoft.com/office/drawing/2014/main" id="{15DB82A6-46CD-4453-8A4C-770C08B8E0C2}"/>
+                <a16:creationId xmlns:a16="http://schemas.microsoft.com/office/drawing/2014/main" id="{0DAA9B1A-5BB8-612A-0DD8-410DF3280283}"/>
               </a:ext>
             </a:extLst>
           </p:cNvPr>
@@ -6285,51 +6568,20 @@
         <p:spPr/>
         <p:txBody>
           <a:bodyPr>
-            <a:normAutofit/>
+            <a:normAutofit fontScale="92500" lnSpcReduction="10000"/>
           </a:bodyPr>
           <a:lstStyle/>
           <a:p>
             <a:r>
               <a:rPr lang="en-US" dirty="0"/>
-              <a:t>README for the integration tool</a:t>
+              <a:t>Integration system “knows” too much about the underlying tools</a:t>
             </a:r>
           </a:p>
           <a:p>
             <a:pPr lvl="1"/>
-            <a:endParaRPr lang="en-US" i="1" dirty="0"/>
-          </a:p>
-          <a:p>
-            <a:r>
-              <a:rPr lang="en-US" dirty="0"/>
-              <a:t>Best Practices documents</a:t>
-            </a:r>
-          </a:p>
-          <a:p>
-            <a:pPr lvl="1"/>
-            <a:r>
-              <a:rPr lang="en-US" dirty="0"/>
-              <a:t>Python programming</a:t>
-            </a:r>
-          </a:p>
-          <a:p>
-            <a:pPr lvl="1"/>
-            <a:r>
-              <a:rPr lang="en-US" dirty="0"/>
-              <a:t>Module implementation</a:t>
-            </a:r>
-          </a:p>
-          <a:p>
-            <a:pPr lvl="1"/>
-            <a:r>
-              <a:rPr lang="en-US" dirty="0"/>
-              <a:t>Docker usage</a:t>
-            </a:r>
-          </a:p>
-          <a:p>
-            <a:pPr lvl="1"/>
-            <a:r>
-              <a:rPr lang="en-US" dirty="0"/>
-              <a:t>Robust Code / Top Ten</a:t>
+            <a:r>
+              <a:rPr lang="en-US" i="1" dirty="0"/>
+              <a:t>command line switches, hard-coded paths, …</a:t>
             </a:r>
           </a:p>
           <a:p>
@@ -6339,12 +6591,65 @@
           <a:p>
             <a:r>
               <a:rPr lang="en-US" dirty="0"/>
-              <a:t>Integration tool code docs  </a:t>
-            </a:r>
+              <a:t>Projects rely on old versions of 3</a:t>
+            </a:r>
+            <a:r>
+              <a:rPr lang="en-US" baseline="30000" dirty="0"/>
+              <a:t>rd</a:t>
+            </a:r>
+            <a:r>
+              <a:rPr lang="en-US" dirty="0"/>
+              <a:t>-party projects</a:t>
+            </a:r>
+          </a:p>
+          <a:p>
+            <a:pPr lvl="1"/>
             <a:r>
               <a:rPr lang="en-US" i="1" dirty="0"/>
-              <a:t>(to do)</a:t>
-            </a:r>
+              <a:t>CUDA requirements, docker complexity, …</a:t>
+            </a:r>
+          </a:p>
+          <a:p>
+            <a:pPr lvl="1"/>
+            <a:endParaRPr lang="en-US" dirty="0"/>
+          </a:p>
+          <a:p>
+            <a:r>
+              <a:rPr lang="en-US" dirty="0"/>
+              <a:t>Python coding conventions</a:t>
+            </a:r>
+          </a:p>
+          <a:p>
+            <a:pPr lvl="1"/>
+            <a:r>
+              <a:rPr lang="en-US" i="1" dirty="0"/>
+              <a:t>error handling, logging, …</a:t>
+            </a:r>
+          </a:p>
+          <a:p>
+            <a:endParaRPr lang="en-US" dirty="0"/>
+          </a:p>
+          <a:p>
+            <a:pPr marL="0" indent="0">
+              <a:buNone/>
+            </a:pPr>
+            <a:endParaRPr lang="en-US" dirty="0"/>
+          </a:p>
+          <a:p>
+            <a:pPr marL="0" indent="0" algn="r">
+              <a:buNone/>
+            </a:pPr>
+            <a:r>
+              <a:rPr lang="en-US" b="1" dirty="0">
+                <a:solidFill>
+                  <a:schemeClr val="accent4"/>
+                </a:solidFill>
+              </a:rPr>
+              <a:t>Please come talk to me this week: let’s make plans to address!</a:t>
+            </a:r>
+          </a:p>
+          <a:p>
+            <a:endParaRPr lang="en-US" dirty="0"/>
           </a:p>
         </p:txBody>
       </p:sp>
@@ -6353,7 +6658,7 @@
           <p:cNvPr id="4" name="Slide Number Placeholder 3">
             <a:extLst>
               <a:ext uri="{FF2B5EF4-FFF2-40B4-BE49-F238E27FC236}">
-                <a16:creationId xmlns:a16="http://schemas.microsoft.com/office/drawing/2014/main" id="{B3ED3E4F-DCCD-B140-3CC4-BEDA3E533602}"/>
+                <a16:creationId xmlns:a16="http://schemas.microsoft.com/office/drawing/2014/main" id="{1CA53668-8B0C-8DBA-3EC7-2166E3952742}"/>
               </a:ext>
             </a:extLst>
           </p:cNvPr>
@@ -6380,7 +6685,7 @@
     </p:spTree>
     <p:extLst>
       <p:ext uri="{BB962C8B-B14F-4D97-AF65-F5344CB8AC3E}">
-        <p14:creationId xmlns:p14="http://schemas.microsoft.com/office/powerpoint/2010/main" val="2609123852"/>
+        <p14:creationId xmlns:p14="http://schemas.microsoft.com/office/powerpoint/2010/main" val="3487057690"/>
       </p:ext>
     </p:extLst>
   </p:cSld>
@@ -6409,10 +6714,10 @@
       </p:grpSpPr>
       <p:sp>
         <p:nvSpPr>
-          <p:cNvPr id="5" name="Title 4">
-            <a:extLst>
-              <a:ext uri="{FF2B5EF4-FFF2-40B4-BE49-F238E27FC236}">
-                <a16:creationId xmlns:a16="http://schemas.microsoft.com/office/drawing/2014/main" id="{A76AF2D9-89EF-5D68-C36E-2774C5B84E50}"/>
+          <p:cNvPr id="2" name="Title 1">
+            <a:extLst>
+              <a:ext uri="{FF2B5EF4-FFF2-40B4-BE49-F238E27FC236}">
+                <a16:creationId xmlns:a16="http://schemas.microsoft.com/office/drawing/2014/main" id="{8DB66F32-4372-AC80-CB08-F1A698BB23E5}"/>
               </a:ext>
             </a:extLst>
           </p:cNvPr>
@@ -6425,18 +6730,100 @@
         </p:nvSpPr>
         <p:spPr>
           <a:xfrm>
-            <a:off x="1862889" y="2694439"/>
-            <a:ext cx="8466221" cy="1325563"/>
+            <a:off x="838200" y="114869"/>
+            <a:ext cx="10515600" cy="1325563"/>
           </a:xfrm>
         </p:spPr>
         <p:txBody>
           <a:bodyPr/>
           <a:lstStyle/>
           <a:p>
-            <a:pPr algn="ctr"/>
+            <a:pPr algn="r"/>
+            <a:r>
+              <a:rPr lang="en-US" u="sng" dirty="0"/>
+              <a:t>Documentation</a:t>
+            </a:r>
+          </a:p>
+        </p:txBody>
+      </p:sp>
+      <p:sp>
+        <p:nvSpPr>
+          <p:cNvPr id="3" name="Content Placeholder 2">
+            <a:extLst>
+              <a:ext uri="{FF2B5EF4-FFF2-40B4-BE49-F238E27FC236}">
+                <a16:creationId xmlns:a16="http://schemas.microsoft.com/office/drawing/2014/main" id="{15DB82A6-46CD-4453-8A4C-770C08B8E0C2}"/>
+              </a:ext>
+            </a:extLst>
+          </p:cNvPr>
+          <p:cNvSpPr>
+            <a:spLocks noGrp="1"/>
+          </p:cNvSpPr>
+          <p:nvPr>
+            <p:ph idx="1"/>
+          </p:nvPr>
+        </p:nvSpPr>
+        <p:spPr/>
+        <p:txBody>
+          <a:bodyPr>
+            <a:normAutofit/>
+          </a:bodyPr>
+          <a:lstStyle/>
+          <a:p>
+            <a:r>
+              <a:rPr lang="en-US" dirty="0"/>
+              <a:t>README for the integration tool</a:t>
+            </a:r>
+          </a:p>
+          <a:p>
+            <a:pPr lvl="1"/>
+            <a:endParaRPr lang="en-US" i="1" dirty="0"/>
+          </a:p>
+          <a:p>
+            <a:r>
+              <a:rPr lang="en-US" dirty="0"/>
+              <a:t>Best Practices documents</a:t>
+            </a:r>
+          </a:p>
+          <a:p>
+            <a:pPr lvl="1"/>
+            <a:r>
+              <a:rPr lang="en-US" dirty="0"/>
+              <a:t>Python programming</a:t>
+            </a:r>
+          </a:p>
+          <a:p>
+            <a:pPr lvl="1"/>
+            <a:r>
+              <a:rPr lang="en-US" dirty="0"/>
+              <a:t>Module implementation</a:t>
+            </a:r>
+          </a:p>
+          <a:p>
+            <a:pPr lvl="1"/>
+            <a:r>
+              <a:rPr lang="en-US" dirty="0"/>
+              <a:t>Docker usage</a:t>
+            </a:r>
+          </a:p>
+          <a:p>
+            <a:pPr lvl="1"/>
+            <a:r>
+              <a:rPr lang="en-US" dirty="0"/>
+              <a:t>Robust Code / Top Ten</a:t>
+            </a:r>
+          </a:p>
+          <a:p>
+            <a:pPr lvl="1"/>
+            <a:endParaRPr lang="en-US" dirty="0"/>
+          </a:p>
+          <a:p>
+            <a:r>
+              <a:rPr lang="en-US" dirty="0"/>
+              <a:t>Integration tool code docs  </a:t>
+            </a:r>
             <a:r>
               <a:rPr lang="en-US" i="1" dirty="0"/>
-              <a:t>(Discussion.)</a:t>
+              <a:t>(to do)</a:t>
             </a:r>
           </a:p>
         </p:txBody>
@@ -6446,7 +6833,7 @@
           <p:cNvPr id="4" name="Slide Number Placeholder 3">
             <a:extLst>
               <a:ext uri="{FF2B5EF4-FFF2-40B4-BE49-F238E27FC236}">
-                <a16:creationId xmlns:a16="http://schemas.microsoft.com/office/drawing/2014/main" id="{97536C3C-0651-65DC-46EC-8BC9EF52417F}"/>
+                <a16:creationId xmlns:a16="http://schemas.microsoft.com/office/drawing/2014/main" id="{B3ED3E4F-DCCD-B140-3CC4-BEDA3E533602}"/>
               </a:ext>
             </a:extLst>
           </p:cNvPr>
@@ -6465,6 +6852,99 @@
             <a:fld id="{B15EECDE-63F5-1E4D-8144-009D616F0C2C}" type="slidenum">
               <a:rPr lang="en-US" smtClean="0"/>
               <a:t>15</a:t>
+            </a:fld>
+            <a:endParaRPr lang="en-US" dirty="0"/>
+          </a:p>
+        </p:txBody>
+      </p:sp>
+    </p:spTree>
+    <p:extLst>
+      <p:ext uri="{BB962C8B-B14F-4D97-AF65-F5344CB8AC3E}">
+        <p14:creationId xmlns:p14="http://schemas.microsoft.com/office/powerpoint/2010/main" val="2609123852"/>
+      </p:ext>
+    </p:extLst>
+  </p:cSld>
+  <p:clrMapOvr>
+    <a:masterClrMapping/>
+  </p:clrMapOvr>
+</p:sld>
+</file>
+
+<file path=ppt/slides/slide16.xml><?xml version="1.0" encoding="utf-8"?>
+<p:sld xmlns:a="http://schemas.openxmlformats.org/drawingml/2006/main" xmlns:r="http://schemas.openxmlformats.org/officeDocument/2006/relationships" xmlns:p="http://schemas.openxmlformats.org/presentationml/2006/main">
+  <p:cSld>
+    <p:spTree>
+      <p:nvGrpSpPr>
+        <p:cNvPr id="1" name=""/>
+        <p:cNvGrpSpPr/>
+        <p:nvPr/>
+      </p:nvGrpSpPr>
+      <p:grpSpPr>
+        <a:xfrm>
+          <a:off x="0" y="0"/>
+          <a:ext cx="0" cy="0"/>
+          <a:chOff x="0" y="0"/>
+          <a:chExt cx="0" cy="0"/>
+        </a:xfrm>
+      </p:grpSpPr>
+      <p:sp>
+        <p:nvSpPr>
+          <p:cNvPr id="5" name="Title 4">
+            <a:extLst>
+              <a:ext uri="{FF2B5EF4-FFF2-40B4-BE49-F238E27FC236}">
+                <a16:creationId xmlns:a16="http://schemas.microsoft.com/office/drawing/2014/main" id="{A76AF2D9-89EF-5D68-C36E-2774C5B84E50}"/>
+              </a:ext>
+            </a:extLst>
+          </p:cNvPr>
+          <p:cNvSpPr>
+            <a:spLocks noGrp="1"/>
+          </p:cNvSpPr>
+          <p:nvPr>
+            <p:ph type="title"/>
+          </p:nvPr>
+        </p:nvSpPr>
+        <p:spPr>
+          <a:xfrm>
+            <a:off x="1862889" y="2694439"/>
+            <a:ext cx="8466221" cy="1325563"/>
+          </a:xfrm>
+        </p:spPr>
+        <p:txBody>
+          <a:bodyPr/>
+          <a:lstStyle/>
+          <a:p>
+            <a:pPr algn="ctr"/>
+            <a:r>
+              <a:rPr lang="en-US" i="1" dirty="0"/>
+              <a:t>(Discussion.)</a:t>
+            </a:r>
+          </a:p>
+        </p:txBody>
+      </p:sp>
+      <p:sp>
+        <p:nvSpPr>
+          <p:cNvPr id="4" name="Slide Number Placeholder 3">
+            <a:extLst>
+              <a:ext uri="{FF2B5EF4-FFF2-40B4-BE49-F238E27FC236}">
+                <a16:creationId xmlns:a16="http://schemas.microsoft.com/office/drawing/2014/main" id="{97536C3C-0651-65DC-46EC-8BC9EF52417F}"/>
+              </a:ext>
+            </a:extLst>
+          </p:cNvPr>
+          <p:cNvSpPr>
+            <a:spLocks noGrp="1"/>
+          </p:cNvSpPr>
+          <p:nvPr>
+            <p:ph type="sldNum" sz="quarter" idx="12"/>
+          </p:nvPr>
+        </p:nvSpPr>
+        <p:spPr/>
+        <p:txBody>
+          <a:bodyPr/>
+          <a:lstStyle/>
+          <a:p>
+            <a:fld id="{B15EECDE-63F5-1E4D-8144-009D616F0C2C}" type="slidenum">
+              <a:rPr lang="en-US" smtClean="0"/>
+              <a:t>16</a:t>
             </a:fld>
             <a:endParaRPr lang="en-US" dirty="0"/>
           </a:p>
@@ -8615,13 +9095,15 @@
               </a:ext>
             </a:extLst>
           </p:cNvPr>
-          <p:cNvCxnSpPr/>
+          <p:cNvCxnSpPr>
+            <a:cxnSpLocks/>
+          </p:cNvCxnSpPr>
           <p:nvPr/>
         </p:nvCxnSpPr>
         <p:spPr>
           <a:xfrm>
-            <a:off x="691376" y="4672361"/>
-            <a:ext cx="11028556" cy="0"/>
+            <a:off x="344496" y="4672361"/>
+            <a:ext cx="11375436" cy="0"/>
           </a:xfrm>
           <a:prstGeom prst="line">
             <a:avLst/>
@@ -9006,13 +9488,15 @@
               </a:ext>
             </a:extLst>
           </p:cNvPr>
-          <p:cNvCxnSpPr/>
+          <p:cNvCxnSpPr>
+            <a:cxnSpLocks/>
+          </p:cNvCxnSpPr>
           <p:nvPr/>
         </p:nvCxnSpPr>
         <p:spPr>
           <a:xfrm>
-            <a:off x="691376" y="2813081"/>
-            <a:ext cx="11028556" cy="0"/>
+            <a:off x="423746" y="2813081"/>
+            <a:ext cx="11296186" cy="0"/>
           </a:xfrm>
           <a:prstGeom prst="line">
             <a:avLst/>
@@ -9235,6 +9719,146 @@
           </a:fontRef>
         </p:style>
       </p:cxnSp>
+      <p:sp>
+        <p:nvSpPr>
+          <p:cNvPr id="5" name="TextBox 4">
+            <a:extLst>
+              <a:ext uri="{FF2B5EF4-FFF2-40B4-BE49-F238E27FC236}">
+                <a16:creationId xmlns:a16="http://schemas.microsoft.com/office/drawing/2014/main" id="{2689F321-E333-700D-4AF0-C7F351415D79}"/>
+              </a:ext>
+            </a:extLst>
+          </p:cNvPr>
+          <p:cNvSpPr txBox="1"/>
+          <p:nvPr/>
+        </p:nvSpPr>
+        <p:spPr>
+          <a:xfrm>
+            <a:off x="344496" y="4803092"/>
+            <a:ext cx="1642501" cy="369332"/>
+          </a:xfrm>
+          <a:prstGeom prst="rect">
+            <a:avLst/>
+          </a:prstGeom>
+          <a:noFill/>
+        </p:spPr>
+        <p:txBody>
+          <a:bodyPr wrap="none" rtlCol="0">
+            <a:spAutoFit/>
+          </a:bodyPr>
+          <a:lstStyle/>
+          <a:p>
+            <a:r>
+              <a:rPr lang="en-US" dirty="0"/>
+              <a:t>BOTTOM LAYER</a:t>
+            </a:r>
+          </a:p>
+        </p:txBody>
+      </p:sp>
+      <p:sp>
+        <p:nvSpPr>
+          <p:cNvPr id="6" name="TextBox 5">
+            <a:extLst>
+              <a:ext uri="{FF2B5EF4-FFF2-40B4-BE49-F238E27FC236}">
+                <a16:creationId xmlns:a16="http://schemas.microsoft.com/office/drawing/2014/main" id="{746E761D-BDAC-5BDF-136A-7FE0A472D5A4}"/>
+              </a:ext>
+            </a:extLst>
+          </p:cNvPr>
+          <p:cNvSpPr txBox="1"/>
+          <p:nvPr/>
+        </p:nvSpPr>
+        <p:spPr>
+          <a:xfrm>
+            <a:off x="344496" y="2926710"/>
+            <a:ext cx="1551130" cy="369332"/>
+          </a:xfrm>
+          <a:prstGeom prst="rect">
+            <a:avLst/>
+          </a:prstGeom>
+          <a:noFill/>
+        </p:spPr>
+        <p:txBody>
+          <a:bodyPr wrap="none" rtlCol="0">
+            <a:spAutoFit/>
+          </a:bodyPr>
+          <a:lstStyle/>
+          <a:p>
+            <a:r>
+              <a:rPr lang="en-US" dirty="0"/>
+              <a:t>MIDDLE LAYER</a:t>
+            </a:r>
+          </a:p>
+        </p:txBody>
+      </p:sp>
+      <p:sp>
+        <p:nvSpPr>
+          <p:cNvPr id="7" name="TextBox 6">
+            <a:extLst>
+              <a:ext uri="{FF2B5EF4-FFF2-40B4-BE49-F238E27FC236}">
+                <a16:creationId xmlns:a16="http://schemas.microsoft.com/office/drawing/2014/main" id="{7D4138A3-37B4-E02E-7440-9FF0516515D2}"/>
+              </a:ext>
+            </a:extLst>
+          </p:cNvPr>
+          <p:cNvSpPr txBox="1"/>
+          <p:nvPr/>
+        </p:nvSpPr>
+        <p:spPr>
+          <a:xfrm>
+            <a:off x="344496" y="741505"/>
+            <a:ext cx="1177502" cy="369332"/>
+          </a:xfrm>
+          <a:prstGeom prst="rect">
+            <a:avLst/>
+          </a:prstGeom>
+          <a:noFill/>
+        </p:spPr>
+        <p:txBody>
+          <a:bodyPr wrap="none" rtlCol="0">
+            <a:spAutoFit/>
+          </a:bodyPr>
+          <a:lstStyle/>
+          <a:p>
+            <a:r>
+              <a:rPr lang="en-US" dirty="0"/>
+              <a:t>TOP LAYER</a:t>
+            </a:r>
+          </a:p>
+        </p:txBody>
+      </p:sp>
+      <p:sp>
+        <p:nvSpPr>
+          <p:cNvPr id="25" name="TextBox 24">
+            <a:extLst>
+              <a:ext uri="{FF2B5EF4-FFF2-40B4-BE49-F238E27FC236}">
+                <a16:creationId xmlns:a16="http://schemas.microsoft.com/office/drawing/2014/main" id="{4A3A7D49-6CA4-F883-F5E9-87AB5D089A43}"/>
+              </a:ext>
+            </a:extLst>
+          </p:cNvPr>
+          <p:cNvSpPr txBox="1"/>
+          <p:nvPr/>
+        </p:nvSpPr>
+        <p:spPr>
+          <a:xfrm>
+            <a:off x="5799741" y="481491"/>
+            <a:ext cx="5026954" cy="646331"/>
+          </a:xfrm>
+          <a:prstGeom prst="rect">
+            <a:avLst/>
+          </a:prstGeom>
+          <a:noFill/>
+        </p:spPr>
+        <p:txBody>
+          <a:bodyPr wrap="none" rtlCol="0">
+            <a:spAutoFit/>
+          </a:bodyPr>
+          <a:lstStyle/>
+          <a:p>
+            <a:r>
+              <a:rPr lang="en-US" sz="3600" dirty="0"/>
+              <a:t>A “THREE-LAYER” SYSTEM</a:t>
+            </a:r>
+          </a:p>
+        </p:txBody>
+      </p:sp>
     </p:spTree>
     <p:extLst>
       <p:ext uri="{BB962C8B-B14F-4D97-AF65-F5344CB8AC3E}">
@@ -9267,132 +9891,65 @@
       </p:grpSpPr>
       <p:sp>
         <p:nvSpPr>
-          <p:cNvPr id="2" name="Title 1">
-            <a:extLst>
-              <a:ext uri="{FF2B5EF4-FFF2-40B4-BE49-F238E27FC236}">
-                <a16:creationId xmlns:a16="http://schemas.microsoft.com/office/drawing/2014/main" id="{59790955-AAD6-3686-2E9D-991D62BC144A}"/>
-              </a:ext>
-            </a:extLst>
-          </p:cNvPr>
-          <p:cNvSpPr>
-            <a:spLocks noGrp="1"/>
-          </p:cNvSpPr>
-          <p:nvPr>
-            <p:ph type="title"/>
-          </p:nvPr>
-        </p:nvSpPr>
-        <p:spPr>
-          <a:xfrm>
-            <a:off x="838200" y="134125"/>
-            <a:ext cx="10515600" cy="1325563"/>
-          </a:xfrm>
-        </p:spPr>
-        <p:txBody>
-          <a:bodyPr/>
-          <a:lstStyle/>
-          <a:p>
-            <a:pPr algn="r"/>
-            <a:r>
-              <a:rPr lang="en-US" u="sng" dirty="0"/>
-              <a:t>The Module Integration Project</a:t>
-            </a:r>
-          </a:p>
-        </p:txBody>
-      </p:sp>
-      <p:sp>
-        <p:nvSpPr>
-          <p:cNvPr id="3" name="Content Placeholder 2">
-            <a:extLst>
-              <a:ext uri="{FF2B5EF4-FFF2-40B4-BE49-F238E27FC236}">
-                <a16:creationId xmlns:a16="http://schemas.microsoft.com/office/drawing/2014/main" id="{7B490D49-53F5-96EE-0AEB-81312A24953F}"/>
-              </a:ext>
-            </a:extLst>
-          </p:cNvPr>
-          <p:cNvSpPr>
-            <a:spLocks noGrp="1"/>
-          </p:cNvSpPr>
-          <p:nvPr>
-            <p:ph idx="1"/>
-          </p:nvPr>
-        </p:nvSpPr>
-        <p:spPr/>
-        <p:txBody>
-          <a:bodyPr>
-            <a:normAutofit lnSpcReduction="10000"/>
-          </a:bodyPr>
-          <a:lstStyle/>
-          <a:p>
-            <a:pPr marL="0" indent="0">
-              <a:buNone/>
-            </a:pPr>
-            <a:r>
-              <a:rPr lang="en-US" i="1" dirty="0"/>
-              <a:t>One single tool, to run all the TA1 modules:</a:t>
-            </a:r>
-          </a:p>
-          <a:p>
-            <a:endParaRPr lang="en-US" dirty="0"/>
-          </a:p>
-          <a:p>
-            <a:pPr lvl="1"/>
+          <p:cNvPr id="45" name="Cloud 44">
+            <a:extLst>
+              <a:ext uri="{FF2B5EF4-FFF2-40B4-BE49-F238E27FC236}">
+                <a16:creationId xmlns:a16="http://schemas.microsoft.com/office/drawing/2014/main" id="{B5C407B9-97CB-FA97-E659-42829A01B290}"/>
+              </a:ext>
+            </a:extLst>
+          </p:cNvPr>
+          <p:cNvSpPr/>
+          <p:nvPr/>
+        </p:nvSpPr>
+        <p:spPr>
+          <a:xfrm>
+            <a:off x="9353372" y="746621"/>
+            <a:ext cx="2099487" cy="1633369"/>
+          </a:xfrm>
+          <a:prstGeom prst="cloud">
+            <a:avLst/>
+          </a:prstGeom>
+          <a:solidFill>
+            <a:schemeClr val="accent1">
+              <a:lumMod val="60000"/>
+              <a:lumOff val="40000"/>
+            </a:schemeClr>
+          </a:solidFill>
+        </p:spPr>
+        <p:style>
+          <a:lnRef idx="2">
+            <a:schemeClr val="accent1">
+              <a:shade val="15000"/>
+            </a:schemeClr>
+          </a:lnRef>
+          <a:fillRef idx="1">
+            <a:schemeClr val="accent1"/>
+          </a:fillRef>
+          <a:effectRef idx="0">
+            <a:schemeClr val="accent1"/>
+          </a:effectRef>
+          <a:fontRef idx="minor">
+            <a:schemeClr val="lt1"/>
+          </a:fontRef>
+        </p:style>
+        <p:txBody>
+          <a:bodyPr rtlCol="0" anchor="ctr"/>
+          <a:lstStyle/>
+          <a:p>
+            <a:pPr algn="ctr"/>
             <a:r>
               <a:rPr lang="en-US" dirty="0"/>
-              <a:t>Understands inter-module dependency graph</a:t>
-            </a:r>
-          </a:p>
-          <a:p>
-            <a:pPr lvl="1"/>
-            <a:r>
-              <a:rPr lang="en-US" dirty="0"/>
-              <a:t>Able to re-run a module from pre-existing outputs</a:t>
-            </a:r>
-          </a:p>
-          <a:p>
-            <a:endParaRPr lang="en-US" dirty="0"/>
-          </a:p>
-          <a:p>
-            <a:pPr lvl="1"/>
-            <a:r>
-              <a:rPr lang="en-US" dirty="0"/>
-              <a:t>Does not require complex command-line switches</a:t>
-            </a:r>
-          </a:p>
-          <a:p>
-            <a:pPr lvl="1"/>
-            <a:r>
-              <a:rPr lang="en-US" dirty="0"/>
-              <a:t>Assumes inputs and outputs are in well-defined locations</a:t>
-            </a:r>
-          </a:p>
-          <a:p>
-            <a:endParaRPr lang="en-US" dirty="0"/>
-          </a:p>
-          <a:p>
-            <a:pPr lvl="1"/>
-            <a:r>
-              <a:rPr lang="en-US" dirty="0"/>
-              <a:t>Requires only minimal dependences to install</a:t>
-            </a:r>
-          </a:p>
-          <a:p>
-            <a:pPr lvl="1"/>
-            <a:r>
-              <a:rPr lang="en-US" dirty="0"/>
-              <a:t>Requires all modules to be in docker containers</a:t>
-            </a:r>
-          </a:p>
-          <a:p>
-            <a:pPr lvl="1"/>
-            <a:endParaRPr lang="en-US" dirty="0"/>
-          </a:p>
-        </p:txBody>
-      </p:sp>
-      <p:sp>
-        <p:nvSpPr>
-          <p:cNvPr id="18" name="Slide Number Placeholder 17">
-            <a:extLst>
-              <a:ext uri="{FF2B5EF4-FFF2-40B4-BE49-F238E27FC236}">
-                <a16:creationId xmlns:a16="http://schemas.microsoft.com/office/drawing/2014/main" id="{02070FC6-BD77-A5BC-F476-9D4EF26D2C19}"/>
+              <a:t>S3 &amp; CDR</a:t>
+            </a:r>
+          </a:p>
+        </p:txBody>
+      </p:sp>
+      <p:sp>
+        <p:nvSpPr>
+          <p:cNvPr id="2" name="Slide Number Placeholder 1">
+            <a:extLst>
+              <a:ext uri="{FF2B5EF4-FFF2-40B4-BE49-F238E27FC236}">
+                <a16:creationId xmlns:a16="http://schemas.microsoft.com/office/drawing/2014/main" id="{0B9F1B91-D49E-C0D9-F526-11556BDBBD19}"/>
               </a:ext>
             </a:extLst>
           </p:cNvPr>
@@ -9416,10 +9973,485 @@
           </a:p>
         </p:txBody>
       </p:sp>
+      <p:sp>
+        <p:nvSpPr>
+          <p:cNvPr id="11" name="TextBox 10">
+            <a:extLst>
+              <a:ext uri="{FF2B5EF4-FFF2-40B4-BE49-F238E27FC236}">
+                <a16:creationId xmlns:a16="http://schemas.microsoft.com/office/drawing/2014/main" id="{ECCB4F75-159D-A91B-C7A1-C1CC63432F5A}"/>
+              </a:ext>
+            </a:extLst>
+          </p:cNvPr>
+          <p:cNvSpPr txBox="1"/>
+          <p:nvPr/>
+        </p:nvSpPr>
+        <p:spPr>
+          <a:xfrm>
+            <a:off x="1227741" y="423456"/>
+            <a:ext cx="4286686" cy="646331"/>
+          </a:xfrm>
+          <a:prstGeom prst="rect">
+            <a:avLst/>
+          </a:prstGeom>
+          <a:noFill/>
+        </p:spPr>
+        <p:txBody>
+          <a:bodyPr wrap="none" rtlCol="0">
+            <a:spAutoFit/>
+          </a:bodyPr>
+          <a:lstStyle/>
+          <a:p>
+            <a:r>
+              <a:rPr lang="en-US" sz="3600" dirty="0"/>
+              <a:t>DEPLOYMENT MODEL</a:t>
+            </a:r>
+          </a:p>
+        </p:txBody>
+      </p:sp>
+      <p:sp>
+        <p:nvSpPr>
+          <p:cNvPr id="12" name="Rectangle 11">
+            <a:extLst>
+              <a:ext uri="{FF2B5EF4-FFF2-40B4-BE49-F238E27FC236}">
+                <a16:creationId xmlns:a16="http://schemas.microsoft.com/office/drawing/2014/main" id="{09D926DA-F31D-2242-DB34-009355D3BE43}"/>
+              </a:ext>
+            </a:extLst>
+          </p:cNvPr>
+          <p:cNvSpPr/>
+          <p:nvPr/>
+        </p:nvSpPr>
+        <p:spPr>
+          <a:xfrm>
+            <a:off x="5368384" y="1907944"/>
+            <a:ext cx="4926980" cy="3902926"/>
+          </a:xfrm>
+          <a:prstGeom prst="rect">
+            <a:avLst/>
+          </a:prstGeom>
+          <a:solidFill>
+            <a:schemeClr val="bg1">
+              <a:lumMod val="95000"/>
+            </a:schemeClr>
+          </a:solidFill>
+        </p:spPr>
+        <p:style>
+          <a:lnRef idx="2">
+            <a:schemeClr val="accent1">
+              <a:shade val="15000"/>
+            </a:schemeClr>
+          </a:lnRef>
+          <a:fillRef idx="1">
+            <a:schemeClr val="accent1"/>
+          </a:fillRef>
+          <a:effectRef idx="0">
+            <a:schemeClr val="accent1"/>
+          </a:effectRef>
+          <a:fontRef idx="minor">
+            <a:schemeClr val="lt1"/>
+          </a:fontRef>
+        </p:style>
+        <p:txBody>
+          <a:bodyPr rtlCol="0" anchor="t"/>
+          <a:lstStyle/>
+          <a:p>
+            <a:r>
+              <a:rPr lang="en-US" dirty="0">
+                <a:solidFill>
+                  <a:sysClr val="windowText" lastClr="000000"/>
+                </a:solidFill>
+              </a:rPr>
+              <a:t>EC2 HOST</a:t>
+            </a:r>
+          </a:p>
+        </p:txBody>
+      </p:sp>
+      <p:sp>
+        <p:nvSpPr>
+          <p:cNvPr id="14" name="Rounded Rectangle 13">
+            <a:extLst>
+              <a:ext uri="{FF2B5EF4-FFF2-40B4-BE49-F238E27FC236}">
+                <a16:creationId xmlns:a16="http://schemas.microsoft.com/office/drawing/2014/main" id="{0ECC3D8E-F2B5-BC54-B9F3-DFB0B393173F}"/>
+              </a:ext>
+            </a:extLst>
+          </p:cNvPr>
+          <p:cNvSpPr/>
+          <p:nvPr/>
+        </p:nvSpPr>
+        <p:spPr>
+          <a:xfrm>
+            <a:off x="5989598" y="4674375"/>
+            <a:ext cx="3501483" cy="591014"/>
+          </a:xfrm>
+          <a:prstGeom prst="roundRect">
+            <a:avLst/>
+          </a:prstGeom>
+        </p:spPr>
+        <p:style>
+          <a:lnRef idx="2">
+            <a:schemeClr val="accent1">
+              <a:shade val="15000"/>
+            </a:schemeClr>
+          </a:lnRef>
+          <a:fillRef idx="1">
+            <a:schemeClr val="accent1"/>
+          </a:fillRef>
+          <a:effectRef idx="0">
+            <a:schemeClr val="accent1"/>
+          </a:effectRef>
+          <a:fontRef idx="minor">
+            <a:schemeClr val="lt1"/>
+          </a:fontRef>
+        </p:style>
+        <p:txBody>
+          <a:bodyPr rtlCol="0" anchor="ctr"/>
+          <a:lstStyle/>
+          <a:p>
+            <a:pPr algn="ctr"/>
+            <a:r>
+              <a:rPr lang="en-US" dirty="0"/>
+              <a:t>Bottom Layer (modules)</a:t>
+            </a:r>
+          </a:p>
+        </p:txBody>
+      </p:sp>
+      <p:sp>
+        <p:nvSpPr>
+          <p:cNvPr id="15" name="Rounded Rectangle 14">
+            <a:extLst>
+              <a:ext uri="{FF2B5EF4-FFF2-40B4-BE49-F238E27FC236}">
+                <a16:creationId xmlns:a16="http://schemas.microsoft.com/office/drawing/2014/main" id="{B2940412-7CCD-5BD3-B2DD-BE4BEA599502}"/>
+              </a:ext>
+            </a:extLst>
+          </p:cNvPr>
+          <p:cNvSpPr/>
+          <p:nvPr/>
+        </p:nvSpPr>
+        <p:spPr>
+          <a:xfrm>
+            <a:off x="5989599" y="3578907"/>
+            <a:ext cx="3501482" cy="591014"/>
+          </a:xfrm>
+          <a:prstGeom prst="roundRect">
+            <a:avLst/>
+          </a:prstGeom>
+        </p:spPr>
+        <p:style>
+          <a:lnRef idx="2">
+            <a:schemeClr val="accent1">
+              <a:shade val="15000"/>
+            </a:schemeClr>
+          </a:lnRef>
+          <a:fillRef idx="1">
+            <a:schemeClr val="accent1"/>
+          </a:fillRef>
+          <a:effectRef idx="0">
+            <a:schemeClr val="accent1"/>
+          </a:effectRef>
+          <a:fontRef idx="minor">
+            <a:schemeClr val="lt1"/>
+          </a:fontRef>
+        </p:style>
+        <p:txBody>
+          <a:bodyPr rtlCol="0" anchor="ctr"/>
+          <a:lstStyle/>
+          <a:p>
+            <a:pPr algn="ctr"/>
+            <a:r>
+              <a:rPr lang="en-US" dirty="0"/>
+              <a:t>Middle Layer (</a:t>
+            </a:r>
+            <a:r>
+              <a:rPr lang="en-US" dirty="0" err="1"/>
+              <a:t>mipper</a:t>
+            </a:r>
+            <a:r>
+              <a:rPr lang="en-US" dirty="0"/>
+              <a:t> tool)</a:t>
+            </a:r>
+          </a:p>
+        </p:txBody>
+      </p:sp>
+      <p:sp>
+        <p:nvSpPr>
+          <p:cNvPr id="18" name="Rounded Rectangle 17">
+            <a:extLst>
+              <a:ext uri="{FF2B5EF4-FFF2-40B4-BE49-F238E27FC236}">
+                <a16:creationId xmlns:a16="http://schemas.microsoft.com/office/drawing/2014/main" id="{7491A971-8B80-69E4-C447-B681C036C34A}"/>
+              </a:ext>
+            </a:extLst>
+          </p:cNvPr>
+          <p:cNvSpPr/>
+          <p:nvPr/>
+        </p:nvSpPr>
+        <p:spPr>
+          <a:xfrm>
+            <a:off x="5989598" y="2500813"/>
+            <a:ext cx="3501482" cy="591014"/>
+          </a:xfrm>
+          <a:prstGeom prst="roundRect">
+            <a:avLst/>
+          </a:prstGeom>
+        </p:spPr>
+        <p:style>
+          <a:lnRef idx="2">
+            <a:schemeClr val="accent1">
+              <a:shade val="15000"/>
+            </a:schemeClr>
+          </a:lnRef>
+          <a:fillRef idx="1">
+            <a:schemeClr val="accent1"/>
+          </a:fillRef>
+          <a:effectRef idx="0">
+            <a:schemeClr val="accent1"/>
+          </a:effectRef>
+          <a:fontRef idx="minor">
+            <a:schemeClr val="lt1"/>
+          </a:fontRef>
+        </p:style>
+        <p:txBody>
+          <a:bodyPr rtlCol="0" anchor="ctr"/>
+          <a:lstStyle/>
+          <a:p>
+            <a:pPr algn="ctr"/>
+            <a:r>
+              <a:rPr lang="en-US" dirty="0"/>
+              <a:t>Top Layer (web server)</a:t>
+            </a:r>
+          </a:p>
+        </p:txBody>
+      </p:sp>
+      <p:sp>
+        <p:nvSpPr>
+          <p:cNvPr id="19" name="Rounded Rectangle 18">
+            <a:extLst>
+              <a:ext uri="{FF2B5EF4-FFF2-40B4-BE49-F238E27FC236}">
+                <a16:creationId xmlns:a16="http://schemas.microsoft.com/office/drawing/2014/main" id="{D562E119-C5A0-66BA-BD8F-F9188A4D3C22}"/>
+              </a:ext>
+            </a:extLst>
+          </p:cNvPr>
+          <p:cNvSpPr/>
+          <p:nvPr/>
+        </p:nvSpPr>
+        <p:spPr>
+          <a:xfrm>
+            <a:off x="1671289" y="2224394"/>
+            <a:ext cx="1427356" cy="1143852"/>
+          </a:xfrm>
+          <a:prstGeom prst="roundRect">
+            <a:avLst/>
+          </a:prstGeom>
+          <a:solidFill>
+            <a:schemeClr val="accent4">
+              <a:lumMod val="60000"/>
+              <a:lumOff val="40000"/>
+            </a:schemeClr>
+          </a:solidFill>
+        </p:spPr>
+        <p:style>
+          <a:lnRef idx="2">
+            <a:schemeClr val="accent1">
+              <a:shade val="15000"/>
+            </a:schemeClr>
+          </a:lnRef>
+          <a:fillRef idx="1">
+            <a:schemeClr val="accent1"/>
+          </a:fillRef>
+          <a:effectRef idx="0">
+            <a:schemeClr val="accent1"/>
+          </a:effectRef>
+          <a:fontRef idx="minor">
+            <a:schemeClr val="lt1"/>
+          </a:fontRef>
+        </p:style>
+        <p:txBody>
+          <a:bodyPr rtlCol="0" anchor="ctr"/>
+          <a:lstStyle/>
+          <a:p>
+            <a:pPr algn="ctr"/>
+            <a:r>
+              <a:rPr lang="en-US" dirty="0"/>
+              <a:t>demo python script</a:t>
+            </a:r>
+          </a:p>
+        </p:txBody>
+      </p:sp>
+      <p:cxnSp>
+        <p:nvCxnSpPr>
+          <p:cNvPr id="25" name="Straight Arrow Connector 24">
+            <a:extLst>
+              <a:ext uri="{FF2B5EF4-FFF2-40B4-BE49-F238E27FC236}">
+                <a16:creationId xmlns:a16="http://schemas.microsoft.com/office/drawing/2014/main" id="{42B42B92-8138-5BE0-DC1E-92A3A0C0E37B}"/>
+              </a:ext>
+            </a:extLst>
+          </p:cNvPr>
+          <p:cNvCxnSpPr>
+            <a:cxnSpLocks/>
+            <a:stCxn id="19" idx="3"/>
+            <a:endCxn id="18" idx="1"/>
+          </p:cNvCxnSpPr>
+          <p:nvPr/>
+        </p:nvCxnSpPr>
+        <p:spPr>
+          <a:xfrm>
+            <a:off x="3098645" y="2796320"/>
+            <a:ext cx="2890953" cy="0"/>
+          </a:xfrm>
+          <a:prstGeom prst="straightConnector1">
+            <a:avLst/>
+          </a:prstGeom>
+          <a:ln w="12700">
+            <a:solidFill>
+              <a:schemeClr val="tx1"/>
+            </a:solidFill>
+            <a:tailEnd type="triangle"/>
+          </a:ln>
+        </p:spPr>
+        <p:style>
+          <a:lnRef idx="1">
+            <a:schemeClr val="accent1"/>
+          </a:lnRef>
+          <a:fillRef idx="0">
+            <a:schemeClr val="accent1"/>
+          </a:fillRef>
+          <a:effectRef idx="0">
+            <a:schemeClr val="accent1"/>
+          </a:effectRef>
+          <a:fontRef idx="minor">
+            <a:schemeClr val="tx1"/>
+          </a:fontRef>
+        </p:style>
+      </p:cxnSp>
+      <p:sp>
+        <p:nvSpPr>
+          <p:cNvPr id="26" name="TextBox 25">
+            <a:extLst>
+              <a:ext uri="{FF2B5EF4-FFF2-40B4-BE49-F238E27FC236}">
+                <a16:creationId xmlns:a16="http://schemas.microsoft.com/office/drawing/2014/main" id="{3E0B684F-8D6E-246F-A1E6-FFDD4FC5B717}"/>
+              </a:ext>
+            </a:extLst>
+          </p:cNvPr>
+          <p:cNvSpPr txBox="1"/>
+          <p:nvPr/>
+        </p:nvSpPr>
+        <p:spPr>
+          <a:xfrm>
+            <a:off x="3254048" y="2434370"/>
+            <a:ext cx="1130053" cy="369332"/>
+          </a:xfrm>
+          <a:prstGeom prst="rect">
+            <a:avLst/>
+          </a:prstGeom>
+          <a:noFill/>
+        </p:spPr>
+        <p:txBody>
+          <a:bodyPr wrap="none" rtlCol="0">
+            <a:spAutoFit/>
+          </a:bodyPr>
+          <a:lstStyle/>
+          <a:p>
+            <a:r>
+              <a:rPr lang="en-US" dirty="0"/>
+              <a:t>HTTP calls</a:t>
+            </a:r>
+          </a:p>
+        </p:txBody>
+      </p:sp>
+      <p:cxnSp>
+        <p:nvCxnSpPr>
+          <p:cNvPr id="33" name="Straight Arrow Connector 32">
+            <a:extLst>
+              <a:ext uri="{FF2B5EF4-FFF2-40B4-BE49-F238E27FC236}">
+                <a16:creationId xmlns:a16="http://schemas.microsoft.com/office/drawing/2014/main" id="{9027014C-4AC1-6E22-E01A-6F798EDE94E9}"/>
+              </a:ext>
+            </a:extLst>
+          </p:cNvPr>
+          <p:cNvCxnSpPr>
+            <a:cxnSpLocks/>
+            <a:stCxn id="15" idx="2"/>
+            <a:endCxn id="14" idx="0"/>
+          </p:cNvCxnSpPr>
+          <p:nvPr/>
+        </p:nvCxnSpPr>
+        <p:spPr>
+          <a:xfrm>
+            <a:off x="7740340" y="4169921"/>
+            <a:ext cx="0" cy="504454"/>
+          </a:xfrm>
+          <a:prstGeom prst="straightConnector1">
+            <a:avLst/>
+          </a:prstGeom>
+          <a:ln w="63500">
+            <a:solidFill>
+              <a:schemeClr val="tx1"/>
+            </a:solidFill>
+            <a:tailEnd type="triangle"/>
+          </a:ln>
+        </p:spPr>
+        <p:style>
+          <a:lnRef idx="1">
+            <a:schemeClr val="accent1"/>
+          </a:lnRef>
+          <a:fillRef idx="0">
+            <a:schemeClr val="accent1"/>
+          </a:fillRef>
+          <a:effectRef idx="0">
+            <a:schemeClr val="accent1"/>
+          </a:effectRef>
+          <a:fontRef idx="minor">
+            <a:schemeClr val="tx1"/>
+          </a:fontRef>
+        </p:style>
+      </p:cxnSp>
+      <p:cxnSp>
+        <p:nvCxnSpPr>
+          <p:cNvPr id="40" name="Straight Arrow Connector 39">
+            <a:extLst>
+              <a:ext uri="{FF2B5EF4-FFF2-40B4-BE49-F238E27FC236}">
+                <a16:creationId xmlns:a16="http://schemas.microsoft.com/office/drawing/2014/main" id="{E8F4D16F-F8B4-0248-4642-74D37DF3042F}"/>
+              </a:ext>
+            </a:extLst>
+          </p:cNvPr>
+          <p:cNvCxnSpPr>
+            <a:cxnSpLocks/>
+            <a:stCxn id="18" idx="2"/>
+            <a:endCxn id="15" idx="0"/>
+          </p:cNvCxnSpPr>
+          <p:nvPr/>
+        </p:nvCxnSpPr>
+        <p:spPr>
+          <a:xfrm>
+            <a:off x="7740339" y="3091827"/>
+            <a:ext cx="1" cy="487080"/>
+          </a:xfrm>
+          <a:prstGeom prst="straightConnector1">
+            <a:avLst/>
+          </a:prstGeom>
+          <a:ln w="63500">
+            <a:solidFill>
+              <a:schemeClr val="tx1"/>
+            </a:solidFill>
+            <a:tailEnd type="triangle"/>
+          </a:ln>
+        </p:spPr>
+        <p:style>
+          <a:lnRef idx="1">
+            <a:schemeClr val="accent1"/>
+          </a:lnRef>
+          <a:fillRef idx="0">
+            <a:schemeClr val="accent1"/>
+          </a:fillRef>
+          <a:effectRef idx="0">
+            <a:schemeClr val="accent1"/>
+          </a:effectRef>
+          <a:fontRef idx="minor">
+            <a:schemeClr val="tx1"/>
+          </a:fontRef>
+        </p:style>
+      </p:cxnSp>
     </p:spTree>
     <p:extLst>
       <p:ext uri="{BB962C8B-B14F-4D97-AF65-F5344CB8AC3E}">
-        <p14:creationId xmlns:p14="http://schemas.microsoft.com/office/powerpoint/2010/main" val="1719484750"/>
+        <p14:creationId xmlns:p14="http://schemas.microsoft.com/office/powerpoint/2010/main" val="705701173"/>
       </p:ext>
     </p:extLst>
   </p:cSld>
@@ -9451,7 +10483,7 @@
           <p:cNvPr id="2" name="Title 1">
             <a:extLst>
               <a:ext uri="{FF2B5EF4-FFF2-40B4-BE49-F238E27FC236}">
-                <a16:creationId xmlns:a16="http://schemas.microsoft.com/office/drawing/2014/main" id="{ADB63555-601B-6DD9-8E8B-7C55B173D01F}"/>
+                <a16:creationId xmlns:a16="http://schemas.microsoft.com/office/drawing/2014/main" id="{59790955-AAD6-3686-2E9D-991D62BC144A}"/>
               </a:ext>
             </a:extLst>
           </p:cNvPr>
@@ -9464,7 +10496,7 @@
         </p:nvSpPr>
         <p:spPr>
           <a:xfrm>
-            <a:off x="838200" y="124500"/>
+            <a:off x="838200" y="134125"/>
             <a:ext cx="10515600" cy="1325563"/>
           </a:xfrm>
         </p:spPr>
@@ -9475,7 +10507,7 @@
             <a:pPr algn="r"/>
             <a:r>
               <a:rPr lang="en-US" u="sng" dirty="0"/>
-              <a:t>Topics</a:t>
+              <a:t>The Module Integration Project</a:t>
             </a:r>
           </a:p>
         </p:txBody>
@@ -9485,7 +10517,7 @@
           <p:cNvPr id="3" name="Content Placeholder 2">
             <a:extLst>
               <a:ext uri="{FF2B5EF4-FFF2-40B4-BE49-F238E27FC236}">
-                <a16:creationId xmlns:a16="http://schemas.microsoft.com/office/drawing/2014/main" id="{41129D8F-32FE-4946-16AB-C0A1DC4A0D47}"/>
+                <a16:creationId xmlns:a16="http://schemas.microsoft.com/office/drawing/2014/main" id="{7B490D49-53F5-96EE-0AEB-81312A24953F}"/>
               </a:ext>
             </a:extLst>
           </p:cNvPr>
@@ -9496,56 +10528,84 @@
             <p:ph idx="1"/>
           </p:nvPr>
         </p:nvSpPr>
-        <p:spPr>
-          <a:xfrm>
-            <a:off x="3763478" y="1825625"/>
-            <a:ext cx="4331368" cy="3169887"/>
-          </a:xfrm>
-        </p:spPr>
-        <p:txBody>
-          <a:bodyPr/>
-          <a:lstStyle/>
-          <a:p>
+        <p:spPr/>
+        <p:txBody>
+          <a:bodyPr>
+            <a:normAutofit lnSpcReduction="10000"/>
+          </a:bodyPr>
+          <a:lstStyle/>
+          <a:p>
+            <a:pPr marL="0" indent="0">
+              <a:buNone/>
+            </a:pPr>
+            <a:r>
+              <a:rPr lang="en-US" i="1" dirty="0"/>
+              <a:t>One single tool, to run all the TA1 modules:</a:t>
+            </a:r>
+          </a:p>
+          <a:p>
+            <a:endParaRPr lang="en-US" dirty="0"/>
+          </a:p>
+          <a:p>
+            <a:pPr lvl="1"/>
             <a:r>
               <a:rPr lang="en-US" dirty="0"/>
-              <a:t>User View</a:t>
-            </a:r>
-          </a:p>
-          <a:p>
+              <a:t>Understands inter-module dependency graph</a:t>
+            </a:r>
+          </a:p>
+          <a:p>
+            <a:pPr lvl="1"/>
             <a:r>
               <a:rPr lang="en-US" dirty="0"/>
-              <a:t>System View</a:t>
-            </a:r>
-          </a:p>
-          <a:p>
+              <a:t>Able to re-run a module from pre-existing outputs</a:t>
+            </a:r>
+          </a:p>
+          <a:p>
+            <a:endParaRPr lang="en-US" dirty="0"/>
+          </a:p>
+          <a:p>
+            <a:pPr lvl="1"/>
             <a:r>
               <a:rPr lang="en-US" dirty="0"/>
-              <a:t>Performance Data</a:t>
-            </a:r>
-          </a:p>
-          <a:p>
+              <a:t>Does not require complex command-line switches</a:t>
+            </a:r>
+          </a:p>
+          <a:p>
+            <a:pPr lvl="1"/>
             <a:r>
               <a:rPr lang="en-US" dirty="0"/>
-              <a:t>Open Issues</a:t>
-            </a:r>
-          </a:p>
-          <a:p>
+              <a:t>Assumes inputs and outputs are in well-defined locations</a:t>
+            </a:r>
+          </a:p>
+          <a:p>
+            <a:endParaRPr lang="en-US" dirty="0"/>
+          </a:p>
+          <a:p>
+            <a:pPr lvl="1"/>
             <a:r>
               <a:rPr lang="en-US" dirty="0"/>
-              <a:t>Docs</a:t>
-            </a:r>
-          </a:p>
-          <a:p>
+              <a:t>Requires only minimal dependences to install</a:t>
+            </a:r>
+          </a:p>
+          <a:p>
+            <a:pPr lvl="1"/>
+            <a:r>
+              <a:rPr lang="en-US" dirty="0"/>
+              <a:t>Requires all modules to be in docker containers</a:t>
+            </a:r>
+          </a:p>
+          <a:p>
+            <a:pPr lvl="1"/>
             <a:endParaRPr lang="en-US" dirty="0"/>
           </a:p>
         </p:txBody>
       </p:sp>
       <p:sp>
         <p:nvSpPr>
-          <p:cNvPr id="4" name="Slide Number Placeholder 3">
-            <a:extLst>
-              <a:ext uri="{FF2B5EF4-FFF2-40B4-BE49-F238E27FC236}">
-                <a16:creationId xmlns:a16="http://schemas.microsoft.com/office/drawing/2014/main" id="{1B0221F0-8D84-0E6F-C4F7-A6EF98478C4E}"/>
+          <p:cNvPr id="18" name="Slide Number Placeholder 17">
+            <a:extLst>
+              <a:ext uri="{FF2B5EF4-FFF2-40B4-BE49-F238E27FC236}">
+                <a16:creationId xmlns:a16="http://schemas.microsoft.com/office/drawing/2014/main" id="{02070FC6-BD77-A5BC-F476-9D4EF26D2C19}"/>
               </a:ext>
             </a:extLst>
           </p:cNvPr>
@@ -9572,7 +10632,7 @@
     </p:spTree>
     <p:extLst>
       <p:ext uri="{BB962C8B-B14F-4D97-AF65-F5344CB8AC3E}">
-        <p14:creationId xmlns:p14="http://schemas.microsoft.com/office/powerpoint/2010/main" val="1179050850"/>
+        <p14:creationId xmlns:p14="http://schemas.microsoft.com/office/powerpoint/2010/main" val="1719484750"/>
       </p:ext>
     </p:extLst>
   </p:cSld>
@@ -9604,7 +10664,7 @@
           <p:cNvPr id="2" name="Title 1">
             <a:extLst>
               <a:ext uri="{FF2B5EF4-FFF2-40B4-BE49-F238E27FC236}">
-                <a16:creationId xmlns:a16="http://schemas.microsoft.com/office/drawing/2014/main" id="{AEED7400-85D5-F61B-E06D-4F3DF79BCBB3}"/>
+                <a16:creationId xmlns:a16="http://schemas.microsoft.com/office/drawing/2014/main" id="{ADB63555-601B-6DD9-8E8B-7C55B173D01F}"/>
               </a:ext>
             </a:extLst>
           </p:cNvPr>
@@ -9628,11 +10688,7 @@
             <a:pPr algn="r"/>
             <a:r>
               <a:rPr lang="en-US" u="sng" dirty="0"/>
-              <a:t>User View: </a:t>
-            </a:r>
-            <a:r>
-              <a:rPr lang="en-US" i="1" u="sng" dirty="0"/>
-              <a:t>the command Line</a:t>
+              <a:t>Topics</a:t>
             </a:r>
           </a:p>
         </p:txBody>
@@ -9642,7 +10698,7 @@
           <p:cNvPr id="3" name="Content Placeholder 2">
             <a:extLst>
               <a:ext uri="{FF2B5EF4-FFF2-40B4-BE49-F238E27FC236}">
-                <a16:creationId xmlns:a16="http://schemas.microsoft.com/office/drawing/2014/main" id="{85FE05FA-E178-E302-F37B-A87696E21725}"/>
+                <a16:creationId xmlns:a16="http://schemas.microsoft.com/office/drawing/2014/main" id="{41129D8F-32FE-4946-16AB-C0A1DC4A0D47}"/>
               </a:ext>
             </a:extLst>
           </p:cNvPr>
@@ -9655,92 +10711,45 @@
         </p:nvSpPr>
         <p:spPr>
           <a:xfrm>
-            <a:off x="2580373" y="2451267"/>
-            <a:ext cx="6342246" cy="2630872"/>
-          </a:xfrm>
-        </p:spPr>
-        <p:txBody>
-          <a:bodyPr>
-            <a:normAutofit/>
-          </a:bodyPr>
-          <a:lstStyle/>
-          <a:p>
-            <a:pPr marL="0" indent="0">
-              <a:buNone/>
-            </a:pPr>
-            <a:r>
-              <a:rPr lang="en-US" dirty="0">
-                <a:latin typeface="Courier New" panose="02070309020205020404" pitchFamily="49" charset="0"/>
-                <a:cs typeface="Courier New" panose="02070309020205020404" pitchFamily="49" charset="0"/>
-              </a:rPr>
-              <a:t>mip.py</a:t>
-            </a:r>
-          </a:p>
-          <a:p>
-            <a:pPr marL="0" indent="0">
-              <a:buNone/>
-            </a:pPr>
-            <a:r>
-              <a:rPr lang="en-US" b="1" dirty="0">
-                <a:latin typeface="Courier New" panose="02070309020205020404" pitchFamily="49" charset="0"/>
-                <a:cs typeface="Courier New" panose="02070309020205020404" pitchFamily="49" charset="0"/>
-              </a:rPr>
-              <a:t>    --job-name </a:t>
-            </a:r>
-            <a:r>
-              <a:rPr lang="en-US" dirty="0">
-                <a:latin typeface="Courier New" panose="02070309020205020404" pitchFamily="49" charset="0"/>
-                <a:cs typeface="Courier New" panose="02070309020205020404" pitchFamily="49" charset="0"/>
-              </a:rPr>
-              <a:t>job_18h</a:t>
-            </a:r>
-          </a:p>
-          <a:p>
-            <a:pPr marL="0" indent="0">
-              <a:buNone/>
-            </a:pPr>
-            <a:r>
-              <a:rPr lang="en-US" b="1" dirty="0">
-                <a:latin typeface="Courier New" panose="02070309020205020404" pitchFamily="49" charset="0"/>
-                <a:cs typeface="Courier New" panose="02070309020205020404" pitchFamily="49" charset="0"/>
-              </a:rPr>
-              <a:t>    --module-name </a:t>
-            </a:r>
-            <a:r>
-              <a:rPr lang="en-US" dirty="0">
-                <a:latin typeface="Courier New" panose="02070309020205020404" pitchFamily="49" charset="0"/>
-                <a:cs typeface="Courier New" panose="02070309020205020404" pitchFamily="49" charset="0"/>
-              </a:rPr>
-              <a:t>map_crop</a:t>
-            </a:r>
-          </a:p>
-          <a:p>
-            <a:pPr marL="0" indent="0">
-              <a:buNone/>
-            </a:pPr>
-            <a:r>
-              <a:rPr lang="en-US" b="1" dirty="0">
-                <a:latin typeface="Courier New" panose="02070309020205020404" pitchFamily="49" charset="0"/>
-                <a:cs typeface="Courier New" panose="02070309020205020404" pitchFamily="49" charset="0"/>
-              </a:rPr>
-              <a:t>    --map-name </a:t>
-            </a:r>
-            <a:r>
-              <a:rPr lang="en-US" dirty="0">
-                <a:latin typeface="Courier New" panose="02070309020205020404" pitchFamily="49" charset="0"/>
-                <a:cs typeface="Courier New" panose="02070309020205020404" pitchFamily="49" charset="0"/>
-              </a:rPr>
-              <a:t>AK_Dillingham</a:t>
-            </a:r>
-          </a:p>
-          <a:p>
-            <a:pPr marL="0" indent="0">
-              <a:buNone/>
-            </a:pPr>
-            <a:endParaRPr lang="en-US" dirty="0">
-              <a:latin typeface="Courier New" panose="02070309020205020404" pitchFamily="49" charset="0"/>
-              <a:cs typeface="Courier New" panose="02070309020205020404" pitchFamily="49" charset="0"/>
-            </a:endParaRPr>
+            <a:off x="3763478" y="1825625"/>
+            <a:ext cx="4331368" cy="3169887"/>
+          </a:xfrm>
+        </p:spPr>
+        <p:txBody>
+          <a:bodyPr/>
+          <a:lstStyle/>
+          <a:p>
+            <a:r>
+              <a:rPr lang="en-US" dirty="0"/>
+              <a:t>User View</a:t>
+            </a:r>
+          </a:p>
+          <a:p>
+            <a:r>
+              <a:rPr lang="en-US" dirty="0"/>
+              <a:t>System View</a:t>
+            </a:r>
+          </a:p>
+          <a:p>
+            <a:r>
+              <a:rPr lang="en-US" dirty="0"/>
+              <a:t>Performance Data</a:t>
+            </a:r>
+          </a:p>
+          <a:p>
+            <a:r>
+              <a:rPr lang="en-US" dirty="0"/>
+              <a:t>Open Issues</a:t>
+            </a:r>
+          </a:p>
+          <a:p>
+            <a:r>
+              <a:rPr lang="en-US" dirty="0"/>
+              <a:t>Docs</a:t>
+            </a:r>
+          </a:p>
+          <a:p>
+            <a:endParaRPr lang="en-US" dirty="0"/>
           </a:p>
         </p:txBody>
       </p:sp>
@@ -9749,7 +10758,7 @@
           <p:cNvPr id="4" name="Slide Number Placeholder 3">
             <a:extLst>
               <a:ext uri="{FF2B5EF4-FFF2-40B4-BE49-F238E27FC236}">
-                <a16:creationId xmlns:a16="http://schemas.microsoft.com/office/drawing/2014/main" id="{1F622605-BD9E-435D-50E4-F2BD77612FD9}"/>
+                <a16:creationId xmlns:a16="http://schemas.microsoft.com/office/drawing/2014/main" id="{1B0221F0-8D84-0E6F-C4F7-A6EF98478C4E}"/>
               </a:ext>
             </a:extLst>
           </p:cNvPr>
@@ -9776,7 +10785,7 @@
     </p:spTree>
     <p:extLst>
       <p:ext uri="{BB962C8B-B14F-4D97-AF65-F5344CB8AC3E}">
-        <p14:creationId xmlns:p14="http://schemas.microsoft.com/office/powerpoint/2010/main" val="3315714318"/>
+        <p14:creationId xmlns:p14="http://schemas.microsoft.com/office/powerpoint/2010/main" val="1179050850"/>
       </p:ext>
     </p:extLst>
   </p:cSld>
@@ -9808,7 +10817,7 @@
           <p:cNvPr id="2" name="Title 1">
             <a:extLst>
               <a:ext uri="{FF2B5EF4-FFF2-40B4-BE49-F238E27FC236}">
-                <a16:creationId xmlns:a16="http://schemas.microsoft.com/office/drawing/2014/main" id="{A634B76A-6C5B-8853-3525-4F06499FEDAD}"/>
+                <a16:creationId xmlns:a16="http://schemas.microsoft.com/office/drawing/2014/main" id="{AEED7400-85D5-F61B-E06D-4F3DF79BCBB3}"/>
               </a:ext>
             </a:extLst>
           </p:cNvPr>
@@ -9821,7 +10830,7 @@
         </p:nvSpPr>
         <p:spPr>
           <a:xfrm>
-            <a:off x="838200" y="124499"/>
+            <a:off x="838200" y="124500"/>
             <a:ext cx="10515600" cy="1325563"/>
           </a:xfrm>
         </p:spPr>
@@ -9836,7 +10845,7 @@
             </a:r>
             <a:r>
               <a:rPr lang="en-US" i="1" u="sng" dirty="0"/>
-              <a:t>inputs directory</a:t>
+              <a:t>the command Line</a:t>
             </a:r>
           </a:p>
         </p:txBody>
@@ -9846,7 +10855,7 @@
           <p:cNvPr id="3" name="Content Placeholder 2">
             <a:extLst>
               <a:ext uri="{FF2B5EF4-FFF2-40B4-BE49-F238E27FC236}">
-                <a16:creationId xmlns:a16="http://schemas.microsoft.com/office/drawing/2014/main" id="{92B27295-AB3A-8B6E-5DF4-791F31FA9D8A}"/>
+                <a16:creationId xmlns:a16="http://schemas.microsoft.com/office/drawing/2014/main" id="{85FE05FA-E178-E302-F37B-A87696E21725}"/>
               </a:ext>
             </a:extLst>
           </p:cNvPr>
@@ -9859,15 +10868,27 @@
         </p:nvSpPr>
         <p:spPr>
           <a:xfrm>
-            <a:off x="3042391" y="1825625"/>
-            <a:ext cx="7198895" cy="4007284"/>
+            <a:off x="2580373" y="2451267"/>
+            <a:ext cx="6342246" cy="2630872"/>
           </a:xfrm>
         </p:spPr>
         <p:txBody>
           <a:bodyPr>
-            <a:normAutofit fontScale="92500" lnSpcReduction="20000"/>
+            <a:normAutofit/>
           </a:bodyPr>
           <a:lstStyle/>
+          <a:p>
+            <a:pPr marL="0" indent="0">
+              <a:buNone/>
+            </a:pPr>
+            <a:r>
+              <a:rPr lang="en-US" dirty="0">
+                <a:latin typeface="Courier New" panose="02070309020205020404" pitchFamily="49" charset="0"/>
+                <a:cs typeface="Courier New" panose="02070309020205020404" pitchFamily="49" charset="0"/>
+              </a:rPr>
+              <a:t>mip.py</a:t>
+            </a:r>
+          </a:p>
           <a:p>
             <a:pPr marL="0" indent="0">
               <a:buNone/>
@@ -9877,18 +10898,18 @@
                 <a:latin typeface="Courier New" panose="02070309020205020404" pitchFamily="49" charset="0"/>
                 <a:cs typeface="Courier New" panose="02070309020205020404" pitchFamily="49" charset="0"/>
               </a:rPr>
-              <a:t>inputs/</a:t>
-            </a:r>
-          </a:p>
-          <a:p>
-            <a:pPr lvl="1"/>
-            <a:endParaRPr lang="en-US" b="1" dirty="0">
-              <a:latin typeface="Courier New" panose="02070309020205020404" pitchFamily="49" charset="0"/>
-              <a:cs typeface="Courier New" panose="02070309020205020404" pitchFamily="49" charset="0"/>
-            </a:endParaRPr>
-          </a:p>
-          <a:p>
-            <a:pPr marL="457200" lvl="1" indent="0">
+              <a:t>    --job-name </a:t>
+            </a:r>
+            <a:r>
+              <a:rPr lang="en-US" dirty="0">
+                <a:latin typeface="Courier New" panose="02070309020205020404" pitchFamily="49" charset="0"/>
+                <a:cs typeface="Courier New" panose="02070309020205020404" pitchFamily="49" charset="0"/>
+              </a:rPr>
+              <a:t>job_18h</a:t>
+            </a:r>
+          </a:p>
+          <a:p>
+            <a:pPr marL="0" indent="0">
               <a:buNone/>
             </a:pPr>
             <a:r>
@@ -9896,13 +10917,27 @@
                 <a:latin typeface="Courier New" panose="02070309020205020404" pitchFamily="49" charset="0"/>
                 <a:cs typeface="Courier New" panose="02070309020205020404" pitchFamily="49" charset="0"/>
               </a:rPr>
-              <a:t>maps/</a:t>
-            </a:r>
-          </a:p>
-          <a:p>
-            <a:pPr marL="914400" lvl="2" indent="0">
+              <a:t>    --module-name </a:t>
+            </a:r>
+            <a:r>
+              <a:rPr lang="en-US" dirty="0">
+                <a:latin typeface="Courier New" panose="02070309020205020404" pitchFamily="49" charset="0"/>
+                <a:cs typeface="Courier New" panose="02070309020205020404" pitchFamily="49" charset="0"/>
+              </a:rPr>
+              <a:t>map_crop</a:t>
+            </a:r>
+          </a:p>
+          <a:p>
+            <a:pPr marL="0" indent="0">
               <a:buNone/>
             </a:pPr>
+            <a:r>
+              <a:rPr lang="en-US" b="1" dirty="0">
+                <a:latin typeface="Courier New" panose="02070309020205020404" pitchFamily="49" charset="0"/>
+                <a:cs typeface="Courier New" panose="02070309020205020404" pitchFamily="49" charset="0"/>
+              </a:rPr>
+              <a:t>    --map-name </a:t>
+            </a:r>
             <a:r>
               <a:rPr lang="en-US" dirty="0">
                 <a:latin typeface="Courier New" panose="02070309020205020404" pitchFamily="49" charset="0"/>
@@ -9912,120 +10947,14 @@
             </a:r>
           </a:p>
           <a:p>
-            <a:pPr marL="1371600" lvl="3" indent="0">
+            <a:pPr marL="0" indent="0">
               <a:buNone/>
             </a:pPr>
-            <a:r>
-              <a:rPr lang="en-US" dirty="0">
-                <a:latin typeface="Courier New" panose="02070309020205020404" pitchFamily="49" charset="0"/>
-                <a:cs typeface="Courier New" panose="02070309020205020404" pitchFamily="49" charset="0"/>
-              </a:rPr>
-              <a:t>AK_Dillingham.tif</a:t>
-            </a:r>
-          </a:p>
-          <a:p>
-            <a:pPr marL="1371600" lvl="3" indent="0">
-              <a:buNone/>
-            </a:pPr>
-            <a:r>
-              <a:rPr lang="en-US" dirty="0">
-                <a:latin typeface="Courier New" panose="02070309020205020404" pitchFamily="49" charset="0"/>
-                <a:cs typeface="Courier New" panose="02070309020205020404" pitchFamily="49" charset="0"/>
-              </a:rPr>
-              <a:t>…</a:t>
-            </a:r>
-          </a:p>
-          <a:p>
-            <a:pPr marL="914400" lvl="2" indent="0">
-              <a:buNone/>
-            </a:pPr>
-            <a:r>
-              <a:rPr lang="en-US" b="1" dirty="0">
-                <a:latin typeface="Courier New" panose="02070309020205020404" pitchFamily="49" charset="0"/>
-                <a:cs typeface="Courier New" panose="02070309020205020404" pitchFamily="49" charset="0"/>
-              </a:rPr>
-              <a:t>…</a:t>
-            </a:r>
-          </a:p>
-          <a:p>
-            <a:pPr lvl="1"/>
-            <a:endParaRPr lang="en-US" b="1" dirty="0">
+            <a:endParaRPr lang="en-US" dirty="0">
               <a:latin typeface="Courier New" panose="02070309020205020404" pitchFamily="49" charset="0"/>
               <a:cs typeface="Courier New" panose="02070309020205020404" pitchFamily="49" charset="0"/>
             </a:endParaRPr>
           </a:p>
-          <a:p>
-            <a:pPr marL="457200" lvl="1" indent="0">
-              <a:buNone/>
-            </a:pPr>
-            <a:r>
-              <a:rPr lang="en-US" b="1" dirty="0">
-                <a:latin typeface="Courier New" panose="02070309020205020404" pitchFamily="49" charset="0"/>
-                <a:cs typeface="Courier New" panose="02070309020205020404" pitchFamily="49" charset="0"/>
-              </a:rPr>
-              <a:t>modules/</a:t>
-            </a:r>
-          </a:p>
-          <a:p>
-            <a:pPr marL="914400" lvl="2" indent="0">
-              <a:buNone/>
-            </a:pPr>
-            <a:r>
-              <a:rPr lang="en-US" b="1" dirty="0">
-                <a:latin typeface="Courier New" panose="02070309020205020404" pitchFamily="49" charset="0"/>
-                <a:cs typeface="Courier New" panose="02070309020205020404" pitchFamily="49" charset="0"/>
-              </a:rPr>
-              <a:t>line_extract/</a:t>
-            </a:r>
-          </a:p>
-          <a:p>
-            <a:pPr marL="1371600" lvl="3" indent="0">
-              <a:buNone/>
-            </a:pPr>
-            <a:r>
-              <a:rPr lang="en-US" b="1" dirty="0">
-                <a:latin typeface="Courier New" panose="02070309020205020404" pitchFamily="49" charset="0"/>
-                <a:cs typeface="Courier New" panose="02070309020205020404" pitchFamily="49" charset="0"/>
-              </a:rPr>
-              <a:t>trained_weights/</a:t>
-            </a:r>
-          </a:p>
-          <a:p>
-            <a:pPr marL="1828800" lvl="4" indent="0">
-              <a:buNone/>
-            </a:pPr>
-            <a:r>
-              <a:rPr lang="en-US" dirty="0">
-                <a:latin typeface="Courier New" panose="02070309020205020404" pitchFamily="49" charset="0"/>
-                <a:cs typeface="Courier New" panose="02070309020205020404" pitchFamily="49" charset="0"/>
-              </a:rPr>
-              <a:t>model.pt</a:t>
-            </a:r>
-          </a:p>
-          <a:p>
-            <a:pPr marL="1828800" lvl="4" indent="0">
-              <a:buNone/>
-            </a:pPr>
-            <a:r>
-              <a:rPr lang="en-US" dirty="0">
-                <a:latin typeface="Courier New" panose="02070309020205020404" pitchFamily="49" charset="0"/>
-                <a:cs typeface="Courier New" panose="02070309020205020404" pitchFamily="49" charset="0"/>
-              </a:rPr>
-              <a:t>…</a:t>
-            </a:r>
-          </a:p>
-          <a:p>
-            <a:pPr marL="914400" lvl="2" indent="0">
-              <a:buNone/>
-            </a:pPr>
-            <a:r>
-              <a:rPr lang="en-US" b="1" dirty="0">
-                <a:latin typeface="Courier New" panose="02070309020205020404" pitchFamily="49" charset="0"/>
-                <a:cs typeface="Courier New" panose="02070309020205020404" pitchFamily="49" charset="0"/>
-              </a:rPr>
-              <a:t>…</a:t>
-            </a:r>
-          </a:p>
         </p:txBody>
       </p:sp>
       <p:sp>
@@ -10033,7 +10962,7 @@
           <p:cNvPr id="4" name="Slide Number Placeholder 3">
             <a:extLst>
               <a:ext uri="{FF2B5EF4-FFF2-40B4-BE49-F238E27FC236}">
-                <a16:creationId xmlns:a16="http://schemas.microsoft.com/office/drawing/2014/main" id="{E0DC827F-CE30-3C8A-2FC1-E3F8E82F9516}"/>
+                <a16:creationId xmlns:a16="http://schemas.microsoft.com/office/drawing/2014/main" id="{1F622605-BD9E-435D-50E4-F2BD77612FD9}"/>
               </a:ext>
             </a:extLst>
           </p:cNvPr>
@@ -10044,309 +10973,23 @@
             <p:ph type="sldNum" sz="quarter" idx="12"/>
           </p:nvPr>
         </p:nvSpPr>
-        <p:spPr>
-          <a:xfrm>
-            <a:off x="8610600" y="6356350"/>
-            <a:ext cx="2743200" cy="365125"/>
-          </a:xfrm>
-        </p:spPr>
+        <p:spPr/>
         <p:txBody>
           <a:bodyPr/>
           <a:lstStyle/>
           <a:p>
             <a:fld id="{B15EECDE-63F5-1E4D-8144-009D616F0C2C}" type="slidenum">
               <a:rPr lang="en-US" smtClean="0"/>
-              <a:pPr/>
               <a:t>7</a:t>
             </a:fld>
             <a:endParaRPr lang="en-US" dirty="0"/>
           </a:p>
         </p:txBody>
       </p:sp>
-      <p:sp>
-        <p:nvSpPr>
-          <p:cNvPr id="8" name="TextBox 7">
-            <a:extLst>
-              <a:ext uri="{FF2B5EF4-FFF2-40B4-BE49-F238E27FC236}">
-                <a16:creationId xmlns:a16="http://schemas.microsoft.com/office/drawing/2014/main" id="{85F6D2C2-697A-05B4-117F-01B27028C7ED}"/>
-              </a:ext>
-            </a:extLst>
-          </p:cNvPr>
-          <p:cNvSpPr txBox="1"/>
-          <p:nvPr/>
-        </p:nvSpPr>
-        <p:spPr>
-          <a:xfrm>
-            <a:off x="7401036" y="1774155"/>
-            <a:ext cx="2271561" cy="307777"/>
-          </a:xfrm>
-          <a:prstGeom prst="rect">
-            <a:avLst/>
-          </a:prstGeom>
-          <a:solidFill>
-            <a:schemeClr val="bg1">
-              <a:lumMod val="95000"/>
-            </a:schemeClr>
-          </a:solidFill>
-        </p:spPr>
-        <p:txBody>
-          <a:bodyPr wrap="square" rtlCol="0">
-            <a:spAutoFit/>
-          </a:bodyPr>
-          <a:lstStyle/>
-          <a:p>
-            <a:pPr algn="ctr"/>
-            <a:r>
-              <a:rPr lang="en-US" sz="1400" i="1" dirty="0"/>
-              <a:t>Mounted to docker container</a:t>
-            </a:r>
-          </a:p>
-        </p:txBody>
-      </p:sp>
-      <p:cxnSp>
-        <p:nvCxnSpPr>
-          <p:cNvPr id="9" name="Curved Connector 8">
-            <a:extLst>
-              <a:ext uri="{FF2B5EF4-FFF2-40B4-BE49-F238E27FC236}">
-                <a16:creationId xmlns:a16="http://schemas.microsoft.com/office/drawing/2014/main" id="{53775AF3-A490-D390-7A0F-6217B03E7ED5}"/>
-              </a:ext>
-            </a:extLst>
-          </p:cNvPr>
-          <p:cNvCxnSpPr>
-            <a:cxnSpLocks/>
-            <a:stCxn id="8" idx="1"/>
-          </p:cNvCxnSpPr>
-          <p:nvPr/>
-        </p:nvCxnSpPr>
-        <p:spPr>
-          <a:xfrm flipH="1">
-            <a:off x="5130264" y="1928044"/>
-            <a:ext cx="2270772" cy="10030"/>
-          </a:xfrm>
-          <a:prstGeom prst="straightConnector1">
-            <a:avLst/>
-          </a:prstGeom>
-          <a:ln w="12700">
-            <a:solidFill>
-              <a:schemeClr val="tx1">
-                <a:lumMod val="50000"/>
-                <a:lumOff val="50000"/>
-              </a:schemeClr>
-            </a:solidFill>
-            <a:tailEnd type="arrow" w="lg" len="lg"/>
-          </a:ln>
-        </p:spPr>
-        <p:style>
-          <a:lnRef idx="1">
-            <a:schemeClr val="accent1"/>
-          </a:lnRef>
-          <a:fillRef idx="0">
-            <a:schemeClr val="accent1"/>
-          </a:fillRef>
-          <a:effectRef idx="0">
-            <a:schemeClr val="accent1"/>
-          </a:effectRef>
-          <a:fontRef idx="minor">
-            <a:schemeClr val="tx1"/>
-          </a:fontRef>
-        </p:style>
-      </p:cxnSp>
-      <p:sp>
-        <p:nvSpPr>
-          <p:cNvPr id="19" name="TextBox 18">
-            <a:extLst>
-              <a:ext uri="{FF2B5EF4-FFF2-40B4-BE49-F238E27FC236}">
-                <a16:creationId xmlns:a16="http://schemas.microsoft.com/office/drawing/2014/main" id="{4C832677-7EC5-3136-0E0C-50148C42EBAD}"/>
-              </a:ext>
-            </a:extLst>
-          </p:cNvPr>
-          <p:cNvSpPr txBox="1"/>
-          <p:nvPr/>
-        </p:nvSpPr>
-        <p:spPr>
-          <a:xfrm>
-            <a:off x="7478839" y="3028340"/>
-            <a:ext cx="2002858" cy="307777"/>
-          </a:xfrm>
-          <a:prstGeom prst="rect">
-            <a:avLst/>
-          </a:prstGeom>
-          <a:solidFill>
-            <a:schemeClr val="bg1">
-              <a:lumMod val="95000"/>
-            </a:schemeClr>
-          </a:solidFill>
-        </p:spPr>
-        <p:txBody>
-          <a:bodyPr wrap="square" rtlCol="0">
-            <a:spAutoFit/>
-          </a:bodyPr>
-          <a:lstStyle/>
-          <a:p>
-            <a:pPr algn="ctr"/>
-            <a:r>
-              <a:rPr lang="en-US" sz="1400" i="1" dirty="0"/>
-              <a:t>Static, map-specific data</a:t>
-            </a:r>
-          </a:p>
-        </p:txBody>
-      </p:sp>
-      <p:sp>
-        <p:nvSpPr>
-          <p:cNvPr id="27" name="TextBox 26">
-            <a:extLst>
-              <a:ext uri="{FF2B5EF4-FFF2-40B4-BE49-F238E27FC236}">
-                <a16:creationId xmlns:a16="http://schemas.microsoft.com/office/drawing/2014/main" id="{B8FFE121-97EE-9DBC-8F47-CE816CAF9A46}"/>
-              </a:ext>
-            </a:extLst>
-          </p:cNvPr>
-          <p:cNvSpPr txBox="1"/>
-          <p:nvPr/>
-        </p:nvSpPr>
-        <p:spPr>
-          <a:xfrm>
-            <a:off x="7478839" y="4767001"/>
-            <a:ext cx="2193758" cy="307777"/>
-          </a:xfrm>
-          <a:prstGeom prst="rect">
-            <a:avLst/>
-          </a:prstGeom>
-          <a:solidFill>
-            <a:schemeClr val="bg1">
-              <a:lumMod val="95000"/>
-            </a:schemeClr>
-          </a:solidFill>
-        </p:spPr>
-        <p:txBody>
-          <a:bodyPr wrap="square" rtlCol="0">
-            <a:spAutoFit/>
-          </a:bodyPr>
-          <a:lstStyle/>
-          <a:p>
-            <a:pPr algn="ctr"/>
-            <a:r>
-              <a:rPr lang="en-US" sz="1400" i="1" dirty="0"/>
-              <a:t>Static, module-specific data</a:t>
-            </a:r>
-          </a:p>
-        </p:txBody>
-      </p:sp>
-      <p:sp>
-        <p:nvSpPr>
-          <p:cNvPr id="30" name="Right Brace 29">
-            <a:extLst>
-              <a:ext uri="{FF2B5EF4-FFF2-40B4-BE49-F238E27FC236}">
-                <a16:creationId xmlns:a16="http://schemas.microsoft.com/office/drawing/2014/main" id="{BA728648-EAFF-0614-C01A-CEBDB51DEFCD}"/>
-              </a:ext>
-            </a:extLst>
-          </p:cNvPr>
-          <p:cNvSpPr/>
-          <p:nvPr/>
-        </p:nvSpPr>
-        <p:spPr>
-          <a:xfrm>
-            <a:off x="7170830" y="2791108"/>
-            <a:ext cx="308009" cy="782242"/>
-          </a:xfrm>
-          <a:prstGeom prst="rightBrace">
-            <a:avLst>
-              <a:gd name="adj1" fmla="val 8333"/>
-              <a:gd name="adj2" fmla="val 50973"/>
-            </a:avLst>
-          </a:prstGeom>
-          <a:noFill/>
-          <a:ln w="12700">
-            <a:solidFill>
-              <a:schemeClr val="tx1">
-                <a:lumMod val="50000"/>
-                <a:lumOff val="50000"/>
-              </a:schemeClr>
-            </a:solidFill>
-          </a:ln>
-        </p:spPr>
-        <p:style>
-          <a:lnRef idx="1">
-            <a:schemeClr val="accent1"/>
-          </a:lnRef>
-          <a:fillRef idx="0">
-            <a:schemeClr val="accent1"/>
-          </a:fillRef>
-          <a:effectRef idx="0">
-            <a:schemeClr val="accent1"/>
-          </a:effectRef>
-          <a:fontRef idx="minor">
-            <a:schemeClr val="tx1"/>
-          </a:fontRef>
-        </p:style>
-        <p:txBody>
-          <a:bodyPr rtlCol="0" anchor="ctr"/>
-          <a:lstStyle/>
-          <a:p>
-            <a:pPr algn="ctr"/>
-            <a:endParaRPr lang="en-US" dirty="0"/>
-          </a:p>
-        </p:txBody>
-      </p:sp>
-      <p:sp>
-        <p:nvSpPr>
-          <p:cNvPr id="34" name="Right Brace 33">
-            <a:extLst>
-              <a:ext uri="{FF2B5EF4-FFF2-40B4-BE49-F238E27FC236}">
-                <a16:creationId xmlns:a16="http://schemas.microsoft.com/office/drawing/2014/main" id="{BBDB4B4B-E9A7-3F19-926C-270AA2B8E8DC}"/>
-              </a:ext>
-            </a:extLst>
-          </p:cNvPr>
-          <p:cNvSpPr/>
-          <p:nvPr/>
-        </p:nvSpPr>
-        <p:spPr>
-          <a:xfrm>
-            <a:off x="7170831" y="4426383"/>
-            <a:ext cx="308009" cy="989015"/>
-          </a:xfrm>
-          <a:prstGeom prst="rightBrace">
-            <a:avLst>
-              <a:gd name="adj1" fmla="val 8333"/>
-              <a:gd name="adj2" fmla="val 50973"/>
-            </a:avLst>
-          </a:prstGeom>
-          <a:noFill/>
-          <a:ln w="12700">
-            <a:solidFill>
-              <a:schemeClr val="tx1">
-                <a:lumMod val="50000"/>
-                <a:lumOff val="50000"/>
-              </a:schemeClr>
-            </a:solidFill>
-          </a:ln>
-        </p:spPr>
-        <p:style>
-          <a:lnRef idx="1">
-            <a:schemeClr val="accent1"/>
-          </a:lnRef>
-          <a:fillRef idx="0">
-            <a:schemeClr val="accent1"/>
-          </a:fillRef>
-          <a:effectRef idx="0">
-            <a:schemeClr val="accent1"/>
-          </a:effectRef>
-          <a:fontRef idx="minor">
-            <a:schemeClr val="tx1"/>
-          </a:fontRef>
-        </p:style>
-        <p:txBody>
-          <a:bodyPr rtlCol="0" anchor="ctr"/>
-          <a:lstStyle/>
-          <a:p>
-            <a:pPr algn="ctr"/>
-            <a:endParaRPr lang="en-US" dirty="0"/>
-          </a:p>
-        </p:txBody>
-      </p:sp>
     </p:spTree>
     <p:extLst>
       <p:ext uri="{BB962C8B-B14F-4D97-AF65-F5344CB8AC3E}">
-        <p14:creationId xmlns:p14="http://schemas.microsoft.com/office/powerpoint/2010/main" val="1680803557"/>
+        <p14:creationId xmlns:p14="http://schemas.microsoft.com/office/powerpoint/2010/main" val="3315714318"/>
       </p:ext>
     </p:extLst>
   </p:cSld>
@@ -10378,7 +11021,7 @@
           <p:cNvPr id="2" name="Title 1">
             <a:extLst>
               <a:ext uri="{FF2B5EF4-FFF2-40B4-BE49-F238E27FC236}">
-                <a16:creationId xmlns:a16="http://schemas.microsoft.com/office/drawing/2014/main" id="{A62D5101-6377-6A9E-C785-07942533F619}"/>
+                <a16:creationId xmlns:a16="http://schemas.microsoft.com/office/drawing/2014/main" id="{A634B76A-6C5B-8853-3525-4F06499FEDAD}"/>
               </a:ext>
             </a:extLst>
           </p:cNvPr>
@@ -10391,7 +11034,7 @@
         </p:nvSpPr>
         <p:spPr>
           <a:xfrm>
-            <a:off x="838200" y="134125"/>
+            <a:off x="838200" y="124499"/>
             <a:ext cx="10515600" cy="1325563"/>
           </a:xfrm>
         </p:spPr>
@@ -10406,7 +11049,7 @@
             </a:r>
             <a:r>
               <a:rPr lang="en-US" i="1" u="sng" dirty="0"/>
-              <a:t>outputs directory</a:t>
+              <a:t>inputs directory</a:t>
             </a:r>
           </a:p>
         </p:txBody>
@@ -10416,7 +11059,7 @@
           <p:cNvPr id="3" name="Content Placeholder 2">
             <a:extLst>
               <a:ext uri="{FF2B5EF4-FFF2-40B4-BE49-F238E27FC236}">
-                <a16:creationId xmlns:a16="http://schemas.microsoft.com/office/drawing/2014/main" id="{2B9CC1A1-A4AB-4BCD-88DD-707BD5163199}"/>
+                <a16:creationId xmlns:a16="http://schemas.microsoft.com/office/drawing/2014/main" id="{92B27295-AB3A-8B6E-5DF4-791F31FA9D8A}"/>
               </a:ext>
             </a:extLst>
           </p:cNvPr>
@@ -10429,13 +11072,13 @@
         </p:nvSpPr>
         <p:spPr>
           <a:xfrm>
-            <a:off x="1848853" y="1816000"/>
-            <a:ext cx="4648200" cy="4667250"/>
+            <a:off x="3042391" y="1825625"/>
+            <a:ext cx="7198895" cy="4007284"/>
           </a:xfrm>
         </p:spPr>
         <p:txBody>
           <a:bodyPr>
-            <a:normAutofit fontScale="85000" lnSpcReduction="20000"/>
+            <a:normAutofit fontScale="92500" lnSpcReduction="20000"/>
           </a:bodyPr>
           <a:lstStyle/>
           <a:p>
@@ -10447,12 +11090,12 @@
                 <a:latin typeface="Courier New" panose="02070309020205020404" pitchFamily="49" charset="0"/>
                 <a:cs typeface="Courier New" panose="02070309020205020404" pitchFamily="49" charset="0"/>
               </a:rPr>
-              <a:t>outputs/</a:t>
-            </a:r>
-          </a:p>
-          <a:p>
-            <a:pPr lvl="2"/>
-            <a:endParaRPr lang="en-US" dirty="0">
+              <a:t>inputs/</a:t>
+            </a:r>
+          </a:p>
+          <a:p>
+            <a:pPr lvl="1"/>
+            <a:endParaRPr lang="en-US" b="1" dirty="0">
               <a:latin typeface="Courier New" panose="02070309020205020404" pitchFamily="49" charset="0"/>
               <a:cs typeface="Courier New" panose="02070309020205020404" pitchFamily="49" charset="0"/>
             </a:endParaRPr>
@@ -10466,7 +11109,7 @@
                 <a:latin typeface="Courier New" panose="02070309020205020404" pitchFamily="49" charset="0"/>
                 <a:cs typeface="Courier New" panose="02070309020205020404" pitchFamily="49" charset="0"/>
               </a:rPr>
-              <a:t>job_17a/</a:t>
+              <a:t>maps/</a:t>
             </a:r>
           </a:p>
           <a:p>
@@ -10478,11 +11121,11 @@
                 <a:latin typeface="Courier New" panose="02070309020205020404" pitchFamily="49" charset="0"/>
                 <a:cs typeface="Courier New" panose="02070309020205020404" pitchFamily="49" charset="0"/>
               </a:rPr>
-              <a:t>line_extract.task.txt</a:t>
-            </a:r>
-          </a:p>
-          <a:p>
-            <a:pPr marL="914400" lvl="2" indent="0">
+              <a:t>AK_Dillingham</a:t>
+            </a:r>
+          </a:p>
+          <a:p>
+            <a:pPr marL="1371600" lvl="3" indent="0">
               <a:buNone/>
             </a:pPr>
             <a:r>
@@ -10490,7 +11133,50 @@
                 <a:latin typeface="Courier New" panose="02070309020205020404" pitchFamily="49" charset="0"/>
                 <a:cs typeface="Courier New" panose="02070309020205020404" pitchFamily="49" charset="0"/>
               </a:rPr>
-              <a:t>line_extract.docker.log</a:t>
+              <a:t>AK_Dillingham.tif</a:t>
+            </a:r>
+          </a:p>
+          <a:p>
+            <a:pPr marL="1371600" lvl="3" indent="0">
+              <a:buNone/>
+            </a:pPr>
+            <a:r>
+              <a:rPr lang="en-US" dirty="0">
+                <a:latin typeface="Courier New" panose="02070309020205020404" pitchFamily="49" charset="0"/>
+                <a:cs typeface="Courier New" panose="02070309020205020404" pitchFamily="49" charset="0"/>
+              </a:rPr>
+              <a:t>…</a:t>
+            </a:r>
+          </a:p>
+          <a:p>
+            <a:pPr marL="914400" lvl="2" indent="0">
+              <a:buNone/>
+            </a:pPr>
+            <a:r>
+              <a:rPr lang="en-US" b="1" dirty="0">
+                <a:latin typeface="Courier New" panose="02070309020205020404" pitchFamily="49" charset="0"/>
+                <a:cs typeface="Courier New" panose="02070309020205020404" pitchFamily="49" charset="0"/>
+              </a:rPr>
+              <a:t>…</a:t>
+            </a:r>
+          </a:p>
+          <a:p>
+            <a:pPr lvl="1"/>
+            <a:endParaRPr lang="en-US" b="1" dirty="0">
+              <a:latin typeface="Courier New" panose="02070309020205020404" pitchFamily="49" charset="0"/>
+              <a:cs typeface="Courier New" panose="02070309020205020404" pitchFamily="49" charset="0"/>
+            </a:endParaRPr>
+          </a:p>
+          <a:p>
+            <a:pPr marL="457200" lvl="1" indent="0">
+              <a:buNone/>
+            </a:pPr>
+            <a:r>
+              <a:rPr lang="en-US" b="1" dirty="0">
+                <a:latin typeface="Courier New" panose="02070309020205020404" pitchFamily="49" charset="0"/>
+                <a:cs typeface="Courier New" panose="02070309020205020404" pitchFamily="49" charset="0"/>
+              </a:rPr>
+              <a:t>modules/</a:t>
             </a:r>
           </a:p>
           <a:p>
@@ -10510,15 +11196,27 @@
               <a:buNone/>
             </a:pPr>
             <a:r>
+              <a:rPr lang="en-US" b="1" dirty="0">
+                <a:latin typeface="Courier New" panose="02070309020205020404" pitchFamily="49" charset="0"/>
+                <a:cs typeface="Courier New" panose="02070309020205020404" pitchFamily="49" charset="0"/>
+              </a:rPr>
+              <a:t>trained_weights/</a:t>
+            </a:r>
+          </a:p>
+          <a:p>
+            <a:pPr marL="1828800" lvl="4" indent="0">
+              <a:buNone/>
+            </a:pPr>
+            <a:r>
               <a:rPr lang="en-US" dirty="0">
                 <a:latin typeface="Courier New" panose="02070309020205020404" pitchFamily="49" charset="0"/>
                 <a:cs typeface="Courier New" panose="02070309020205020404" pitchFamily="49" charset="0"/>
               </a:rPr>
-              <a:t>AK_Dillingham.geojson</a:t>
-            </a:r>
-          </a:p>
-          <a:p>
-            <a:pPr marL="1371600" lvl="3" indent="0">
+              <a:t>model.pt</a:t>
+            </a:r>
+          </a:p>
+          <a:p>
+            <a:pPr marL="1828800" lvl="4" indent="0">
               <a:buNone/>
             </a:pPr>
             <a:r>
@@ -10530,37 +11228,6 @@
             </a:r>
           </a:p>
           <a:p>
-            <a:pPr lvl="3"/>
-            <a:endParaRPr lang="en-US" dirty="0">
-              <a:latin typeface="Courier New" panose="02070309020205020404" pitchFamily="49" charset="0"/>
-              <a:cs typeface="Courier New" panose="02070309020205020404" pitchFamily="49" charset="0"/>
-            </a:endParaRPr>
-          </a:p>
-          <a:p>
-            <a:pPr marL="914400" lvl="2" indent="0">
-              <a:buNone/>
-            </a:pPr>
-            <a:r>
-              <a:rPr lang="en-US" dirty="0">
-                <a:latin typeface="Courier New" panose="02070309020205020404" pitchFamily="49" charset="0"/>
-                <a:cs typeface="Courier New" panose="02070309020205020404" pitchFamily="49" charset="0"/>
-              </a:rPr>
-              <a:t>georeference.task.txt</a:t>
-            </a:r>
-          </a:p>
-          <a:p>
-            <a:pPr marL="914400" lvl="2" indent="0">
-              <a:buNone/>
-            </a:pPr>
-            <a:r>
-              <a:rPr lang="en-US" dirty="0">
-                <a:latin typeface="Courier New" panose="02070309020205020404" pitchFamily="49" charset="0"/>
-                <a:cs typeface="Courier New" panose="02070309020205020404" pitchFamily="49" charset="0"/>
-              </a:rPr>
-              <a:t>georeference.docker.log</a:t>
-            </a:r>
-          </a:p>
-          <a:p>
             <a:pPr marL="914400" lvl="2" indent="0">
               <a:buNone/>
             </a:pPr>
@@ -10569,67 +11236,9 @@
                 <a:latin typeface="Courier New" panose="02070309020205020404" pitchFamily="49" charset="0"/>
                 <a:cs typeface="Courier New" panose="02070309020205020404" pitchFamily="49" charset="0"/>
               </a:rPr>
-              <a:t>georeference/</a:t>
-            </a:r>
-          </a:p>
-          <a:p>
-            <a:pPr lvl="3"/>
-            <a:r>
-              <a:rPr lang="en-US" dirty="0">
-                <a:latin typeface="Courier New" panose="02070309020205020404" pitchFamily="49" charset="0"/>
-                <a:cs typeface="Courier New" panose="02070309020205020404" pitchFamily="49" charset="0"/>
-              </a:rPr>
-              <a:t>AK_Dillingham.txt</a:t>
-            </a:r>
-          </a:p>
-          <a:p>
-            <a:pPr lvl="3"/>
-            <a:r>
-              <a:rPr lang="en-US" dirty="0">
-                <a:latin typeface="Courier New" panose="02070309020205020404" pitchFamily="49" charset="0"/>
-                <a:cs typeface="Courier New" panose="02070309020205020404" pitchFamily="49" charset="0"/>
-              </a:rPr>
               <a:t>…</a:t>
             </a:r>
           </a:p>
-          <a:p>
-            <a:pPr lvl="2"/>
-            <a:endParaRPr lang="en-US" dirty="0">
-              <a:latin typeface="Courier New" panose="02070309020205020404" pitchFamily="49" charset="0"/>
-              <a:cs typeface="Courier New" panose="02070309020205020404" pitchFamily="49" charset="0"/>
-            </a:endParaRPr>
-          </a:p>
-          <a:p>
-            <a:pPr marL="457200" lvl="1" indent="0">
-              <a:buNone/>
-            </a:pPr>
-            <a:r>
-              <a:rPr lang="en-US" b="1" dirty="0">
-                <a:latin typeface="Courier New" panose="02070309020205020404" pitchFamily="49" charset="0"/>
-                <a:cs typeface="Courier New" panose="02070309020205020404" pitchFamily="49" charset="0"/>
-              </a:rPr>
-              <a:t>job_27f/</a:t>
-            </a:r>
-          </a:p>
-          <a:p>
-            <a:pPr marL="914400" lvl="2" indent="0">
-              <a:buNone/>
-            </a:pPr>
-            <a:r>
-              <a:rPr lang="en-US" dirty="0">
-                <a:latin typeface="Courier New" panose="02070309020205020404" pitchFamily="49" charset="0"/>
-                <a:cs typeface="Courier New" panose="02070309020205020404" pitchFamily="49" charset="0"/>
-              </a:rPr>
-              <a:t>…</a:t>
-            </a:r>
-          </a:p>
-          <a:p>
-            <a:pPr lvl="1"/>
-            <a:endParaRPr lang="en-US" dirty="0">
-              <a:latin typeface="Courier New" panose="02070309020205020404" pitchFamily="49" charset="0"/>
-              <a:cs typeface="Courier New" panose="02070309020205020404" pitchFamily="49" charset="0"/>
-            </a:endParaRPr>
-          </a:p>
         </p:txBody>
       </p:sp>
       <p:sp>
@@ -10637,7 +11246,7 @@
           <p:cNvPr id="4" name="Slide Number Placeholder 3">
             <a:extLst>
               <a:ext uri="{FF2B5EF4-FFF2-40B4-BE49-F238E27FC236}">
-                <a16:creationId xmlns:a16="http://schemas.microsoft.com/office/drawing/2014/main" id="{BC61B19F-98EA-D5F0-8038-B5E5272BF1AE}"/>
+                <a16:creationId xmlns:a16="http://schemas.microsoft.com/office/drawing/2014/main" id="{E0DC827F-CE30-3C8A-2FC1-E3F8E82F9516}"/>
               </a:ext>
             </a:extLst>
           </p:cNvPr>
@@ -10648,13 +11257,19 @@
             <p:ph type="sldNum" sz="quarter" idx="12"/>
           </p:nvPr>
         </p:nvSpPr>
-        <p:spPr/>
+        <p:spPr>
+          <a:xfrm>
+            <a:off x="8610600" y="6356350"/>
+            <a:ext cx="2743200" cy="365125"/>
+          </a:xfrm>
+        </p:spPr>
         <p:txBody>
           <a:bodyPr/>
           <a:lstStyle/>
           <a:p>
             <a:fld id="{B15EECDE-63F5-1E4D-8144-009D616F0C2C}" type="slidenum">
               <a:rPr lang="en-US" smtClean="0"/>
+              <a:pPr/>
               <a:t>8</a:t>
             </a:fld>
             <a:endParaRPr lang="en-US" dirty="0"/>
@@ -10663,10 +11278,10 @@
       </p:sp>
       <p:sp>
         <p:nvSpPr>
-          <p:cNvPr id="5" name="TextBox 4">
-            <a:extLst>
-              <a:ext uri="{FF2B5EF4-FFF2-40B4-BE49-F238E27FC236}">
-                <a16:creationId xmlns:a16="http://schemas.microsoft.com/office/drawing/2014/main" id="{AE188AFA-0ADA-072C-CAD0-0316C9F08222}"/>
+          <p:cNvPr id="8" name="TextBox 7">
+            <a:extLst>
+              <a:ext uri="{FF2B5EF4-FFF2-40B4-BE49-F238E27FC236}">
+                <a16:creationId xmlns:a16="http://schemas.microsoft.com/office/drawing/2014/main" id="{85F6D2C2-697A-05B4-117F-01B27028C7ED}"/>
               </a:ext>
             </a:extLst>
           </p:cNvPr>
@@ -10675,7 +11290,7 @@
         </p:nvSpPr>
         <p:spPr>
           <a:xfrm>
-            <a:off x="6805062" y="2317583"/>
+            <a:off x="7401036" y="1774155"/>
             <a:ext cx="2271561" cy="307777"/>
           </a:xfrm>
           <a:prstGeom prst="rect">
@@ -10703,23 +11318,23 @@
       </p:sp>
       <p:cxnSp>
         <p:nvCxnSpPr>
-          <p:cNvPr id="6" name="Curved Connector 8">
-            <a:extLst>
-              <a:ext uri="{FF2B5EF4-FFF2-40B4-BE49-F238E27FC236}">
-                <a16:creationId xmlns:a16="http://schemas.microsoft.com/office/drawing/2014/main" id="{D1A16DFA-C15D-D685-DF58-B3144B30E453}"/>
+          <p:cNvPr id="9" name="Curved Connector 8">
+            <a:extLst>
+              <a:ext uri="{FF2B5EF4-FFF2-40B4-BE49-F238E27FC236}">
+                <a16:creationId xmlns:a16="http://schemas.microsoft.com/office/drawing/2014/main" id="{53775AF3-A490-D390-7A0F-6217B03E7ED5}"/>
               </a:ext>
             </a:extLst>
           </p:cNvPr>
           <p:cNvCxnSpPr>
             <a:cxnSpLocks/>
-            <a:stCxn id="5" idx="1"/>
+            <a:stCxn id="8" idx="1"/>
           </p:cNvCxnSpPr>
           <p:nvPr/>
         </p:nvCxnSpPr>
         <p:spPr>
           <a:xfrm flipH="1">
-            <a:off x="3917482" y="2471472"/>
-            <a:ext cx="2887580" cy="0"/>
+            <a:off x="5130264" y="1928044"/>
+            <a:ext cx="2270772" cy="10030"/>
           </a:xfrm>
           <a:prstGeom prst="straightConnector1">
             <a:avLst/>
@@ -10751,10 +11366,10 @@
       </p:cxnSp>
       <p:sp>
         <p:nvSpPr>
-          <p:cNvPr id="8" name="TextBox 7">
-            <a:extLst>
-              <a:ext uri="{FF2B5EF4-FFF2-40B4-BE49-F238E27FC236}">
-                <a16:creationId xmlns:a16="http://schemas.microsoft.com/office/drawing/2014/main" id="{7F5AA352-8CED-7C6E-711E-167913572B41}"/>
+          <p:cNvPr id="19" name="TextBox 18">
+            <a:extLst>
+              <a:ext uri="{FF2B5EF4-FFF2-40B4-BE49-F238E27FC236}">
+                <a16:creationId xmlns:a16="http://schemas.microsoft.com/office/drawing/2014/main" id="{4C832677-7EC5-3136-0E0C-50148C42EBAD}"/>
               </a:ext>
             </a:extLst>
           </p:cNvPr>
@@ -10763,8 +11378,8 @@
         </p:nvSpPr>
         <p:spPr>
           <a:xfrm>
-            <a:off x="6805062" y="3073079"/>
-            <a:ext cx="2743200" cy="307777"/>
+            <a:off x="7478839" y="3028340"/>
+            <a:ext cx="2002858" cy="307777"/>
           </a:xfrm>
           <a:prstGeom prst="rect">
             <a:avLst/>
@@ -10784,17 +11399,57 @@
             <a:pPr algn="ctr"/>
             <a:r>
               <a:rPr lang="en-US" sz="1400" i="1" dirty="0"/>
-              <a:t>Results of one module from one job</a:t>
-            </a:r>
-          </a:p>
-        </p:txBody>
-      </p:sp>
-      <p:sp>
-        <p:nvSpPr>
-          <p:cNvPr id="9" name="Right Brace 8">
-            <a:extLst>
-              <a:ext uri="{FF2B5EF4-FFF2-40B4-BE49-F238E27FC236}">
-                <a16:creationId xmlns:a16="http://schemas.microsoft.com/office/drawing/2014/main" id="{D227474F-E0A1-0F87-B952-C7544D2CC121}"/>
+              <a:t>Static, map-specific data</a:t>
+            </a:r>
+          </a:p>
+        </p:txBody>
+      </p:sp>
+      <p:sp>
+        <p:nvSpPr>
+          <p:cNvPr id="27" name="TextBox 26">
+            <a:extLst>
+              <a:ext uri="{FF2B5EF4-FFF2-40B4-BE49-F238E27FC236}">
+                <a16:creationId xmlns:a16="http://schemas.microsoft.com/office/drawing/2014/main" id="{B8FFE121-97EE-9DBC-8F47-CE816CAF9A46}"/>
+              </a:ext>
+            </a:extLst>
+          </p:cNvPr>
+          <p:cNvSpPr txBox="1"/>
+          <p:nvPr/>
+        </p:nvSpPr>
+        <p:spPr>
+          <a:xfrm>
+            <a:off x="7478839" y="4767001"/>
+            <a:ext cx="2193758" cy="307777"/>
+          </a:xfrm>
+          <a:prstGeom prst="rect">
+            <a:avLst/>
+          </a:prstGeom>
+          <a:solidFill>
+            <a:schemeClr val="bg1">
+              <a:lumMod val="95000"/>
+            </a:schemeClr>
+          </a:solidFill>
+        </p:spPr>
+        <p:txBody>
+          <a:bodyPr wrap="square" rtlCol="0">
+            <a:spAutoFit/>
+          </a:bodyPr>
+          <a:lstStyle/>
+          <a:p>
+            <a:pPr algn="ctr"/>
+            <a:r>
+              <a:rPr lang="en-US" sz="1400" i="1" dirty="0"/>
+              <a:t>Static, module-specific data</a:t>
+            </a:r>
+          </a:p>
+        </p:txBody>
+      </p:sp>
+      <p:sp>
+        <p:nvSpPr>
+          <p:cNvPr id="30" name="Right Brace 29">
+            <a:extLst>
+              <a:ext uri="{FF2B5EF4-FFF2-40B4-BE49-F238E27FC236}">
+                <a16:creationId xmlns:a16="http://schemas.microsoft.com/office/drawing/2014/main" id="{BA728648-EAFF-0614-C01A-CEBDB51DEFCD}"/>
               </a:ext>
             </a:extLst>
           </p:cNvPr>
@@ -10803,8 +11458,8 @@
         </p:nvSpPr>
         <p:spPr>
           <a:xfrm>
-            <a:off x="6497053" y="2625360"/>
-            <a:ext cx="308009" cy="1118861"/>
+            <a:off x="7170830" y="2791108"/>
+            <a:ext cx="308009" cy="782242"/>
           </a:xfrm>
           <a:prstGeom prst="rightBrace">
             <a:avLst>
@@ -10847,226 +11502,10 @@
       </p:sp>
       <p:sp>
         <p:nvSpPr>
-          <p:cNvPr id="12" name="TextBox 11">
-            <a:extLst>
-              <a:ext uri="{FF2B5EF4-FFF2-40B4-BE49-F238E27FC236}">
-                <a16:creationId xmlns:a16="http://schemas.microsoft.com/office/drawing/2014/main" id="{FC3F102D-288E-9A26-A0D8-9DC691256D1D}"/>
-              </a:ext>
-            </a:extLst>
-          </p:cNvPr>
-          <p:cNvSpPr txBox="1"/>
-          <p:nvPr/>
-        </p:nvSpPr>
-        <p:spPr>
-          <a:xfrm>
-            <a:off x="6932998" y="4036626"/>
-            <a:ext cx="1970372" cy="307777"/>
-          </a:xfrm>
-          <a:prstGeom prst="rect">
-            <a:avLst/>
-          </a:prstGeom>
-          <a:solidFill>
-            <a:schemeClr val="bg1">
-              <a:lumMod val="95000"/>
-            </a:schemeClr>
-          </a:solidFill>
-        </p:spPr>
-        <p:txBody>
-          <a:bodyPr wrap="square" rtlCol="0">
-            <a:spAutoFit/>
-          </a:bodyPr>
-          <a:lstStyle/>
-          <a:p>
-            <a:pPr algn="ctr"/>
-            <a:r>
-              <a:rPr lang="en-US" sz="1400" i="1" dirty="0"/>
-              <a:t>If present, job succeeded</a:t>
-            </a:r>
-          </a:p>
-        </p:txBody>
-      </p:sp>
-      <p:cxnSp>
-        <p:nvCxnSpPr>
-          <p:cNvPr id="13" name="Curved Connector 8">
-            <a:extLst>
-              <a:ext uri="{FF2B5EF4-FFF2-40B4-BE49-F238E27FC236}">
-                <a16:creationId xmlns:a16="http://schemas.microsoft.com/office/drawing/2014/main" id="{9A949DDC-10DB-578A-8661-CC1661E8A633}"/>
-              </a:ext>
-            </a:extLst>
-          </p:cNvPr>
-          <p:cNvCxnSpPr>
-            <a:cxnSpLocks/>
-            <a:stCxn id="12" idx="1"/>
-          </p:cNvCxnSpPr>
-          <p:nvPr/>
-        </p:nvCxnSpPr>
-        <p:spPr>
-          <a:xfrm flipH="1">
-            <a:off x="5948413" y="4190515"/>
-            <a:ext cx="984585" cy="0"/>
-          </a:xfrm>
-          <a:prstGeom prst="straightConnector1">
-            <a:avLst/>
-          </a:prstGeom>
-          <a:ln w="12700">
-            <a:solidFill>
-              <a:schemeClr val="tx1">
-                <a:lumMod val="50000"/>
-                <a:lumOff val="50000"/>
-              </a:schemeClr>
-            </a:solidFill>
-            <a:tailEnd type="arrow" w="lg" len="lg"/>
-          </a:ln>
-        </p:spPr>
-        <p:style>
-          <a:lnRef idx="1">
-            <a:schemeClr val="accent1"/>
-          </a:lnRef>
-          <a:fillRef idx="0">
-            <a:schemeClr val="accent1"/>
-          </a:fillRef>
-          <a:effectRef idx="0">
-            <a:schemeClr val="accent1"/>
-          </a:effectRef>
-          <a:fontRef idx="minor">
-            <a:schemeClr val="tx1"/>
-          </a:fontRef>
-        </p:style>
-      </p:cxnSp>
-      <p:sp>
-        <p:nvSpPr>
-          <p:cNvPr id="16" name="TextBox 15">
-            <a:extLst>
-              <a:ext uri="{FF2B5EF4-FFF2-40B4-BE49-F238E27FC236}">
-                <a16:creationId xmlns:a16="http://schemas.microsoft.com/office/drawing/2014/main" id="{E5510FB4-993A-D518-CB7A-40E6E1FEB505}"/>
-              </a:ext>
-            </a:extLst>
-          </p:cNvPr>
-          <p:cNvSpPr txBox="1"/>
-          <p:nvPr/>
-        </p:nvSpPr>
-        <p:spPr>
-          <a:xfrm>
-            <a:off x="9076623" y="4325153"/>
-            <a:ext cx="2407919" cy="307777"/>
-          </a:xfrm>
-          <a:prstGeom prst="rect">
-            <a:avLst/>
-          </a:prstGeom>
-          <a:solidFill>
-            <a:schemeClr val="bg1">
-              <a:lumMod val="95000"/>
-            </a:schemeClr>
-          </a:solidFill>
-        </p:spPr>
-        <p:txBody>
-          <a:bodyPr wrap="square" rtlCol="0">
-            <a:spAutoFit/>
-          </a:bodyPr>
-          <a:lstStyle/>
-          <a:p>
-            <a:pPr algn="ctr"/>
-            <a:r>
-              <a:rPr lang="en-US" sz="1400" i="1" dirty="0"/>
-              <a:t>Full stdout/stderr from module</a:t>
-            </a:r>
-          </a:p>
-        </p:txBody>
-      </p:sp>
-      <p:cxnSp>
-        <p:nvCxnSpPr>
-          <p:cNvPr id="17" name="Curved Connector 8">
-            <a:extLst>
-              <a:ext uri="{FF2B5EF4-FFF2-40B4-BE49-F238E27FC236}">
-                <a16:creationId xmlns:a16="http://schemas.microsoft.com/office/drawing/2014/main" id="{28C1CFB9-3657-F874-3E14-DC0E5CDC1179}"/>
-              </a:ext>
-            </a:extLst>
-          </p:cNvPr>
-          <p:cNvCxnSpPr>
-            <a:cxnSpLocks/>
-            <a:stCxn id="16" idx="1"/>
-          </p:cNvCxnSpPr>
-          <p:nvPr/>
-        </p:nvCxnSpPr>
-        <p:spPr>
-          <a:xfrm flipH="1">
-            <a:off x="6160169" y="4479042"/>
-            <a:ext cx="2916454" cy="0"/>
-          </a:xfrm>
-          <a:prstGeom prst="straightConnector1">
-            <a:avLst/>
-          </a:prstGeom>
-          <a:ln w="12700">
-            <a:solidFill>
-              <a:schemeClr val="tx1">
-                <a:lumMod val="50000"/>
-                <a:lumOff val="50000"/>
-              </a:schemeClr>
-            </a:solidFill>
-            <a:tailEnd type="arrow" w="lg" len="lg"/>
-          </a:ln>
-        </p:spPr>
-        <p:style>
-          <a:lnRef idx="1">
-            <a:schemeClr val="accent1"/>
-          </a:lnRef>
-          <a:fillRef idx="0">
-            <a:schemeClr val="accent1"/>
-          </a:fillRef>
-          <a:effectRef idx="0">
-            <a:schemeClr val="accent1"/>
-          </a:effectRef>
-          <a:fontRef idx="minor">
-            <a:schemeClr val="tx1"/>
-          </a:fontRef>
-        </p:style>
-      </p:cxnSp>
-      <p:sp>
-        <p:nvSpPr>
-          <p:cNvPr id="21" name="TextBox 20">
-            <a:extLst>
-              <a:ext uri="{FF2B5EF4-FFF2-40B4-BE49-F238E27FC236}">
-                <a16:creationId xmlns:a16="http://schemas.microsoft.com/office/drawing/2014/main" id="{B305D686-8A98-6118-6D8A-A4302A7D0784}"/>
-              </a:ext>
-            </a:extLst>
-          </p:cNvPr>
-          <p:cNvSpPr txBox="1"/>
-          <p:nvPr/>
-        </p:nvSpPr>
-        <p:spPr>
-          <a:xfrm>
-            <a:off x="6208295" y="4761394"/>
-            <a:ext cx="2002055" cy="307777"/>
-          </a:xfrm>
-          <a:prstGeom prst="rect">
-            <a:avLst/>
-          </a:prstGeom>
-          <a:solidFill>
-            <a:schemeClr val="bg1">
-              <a:lumMod val="95000"/>
-            </a:schemeClr>
-          </a:solidFill>
-        </p:spPr>
-        <p:txBody>
-          <a:bodyPr wrap="square" rtlCol="0">
-            <a:spAutoFit/>
-          </a:bodyPr>
-          <a:lstStyle/>
-          <a:p>
-            <a:pPr algn="ctr"/>
-            <a:r>
-              <a:rPr lang="en-US" sz="1400" i="1" dirty="0"/>
-              <a:t>Output files from module</a:t>
-            </a:r>
-          </a:p>
-        </p:txBody>
-      </p:sp>
-      <p:sp>
-        <p:nvSpPr>
-          <p:cNvPr id="23" name="Right Brace 22">
-            <a:extLst>
-              <a:ext uri="{FF2B5EF4-FFF2-40B4-BE49-F238E27FC236}">
-                <a16:creationId xmlns:a16="http://schemas.microsoft.com/office/drawing/2014/main" id="{8D033D9F-D3D1-3264-7901-2FE9DF49EDD0}"/>
+          <p:cNvPr id="34" name="Right Brace 33">
+            <a:extLst>
+              <a:ext uri="{FF2B5EF4-FFF2-40B4-BE49-F238E27FC236}">
+                <a16:creationId xmlns:a16="http://schemas.microsoft.com/office/drawing/2014/main" id="{BBDB4B4B-E9A7-3F19-926C-270AA2B8E8DC}"/>
               </a:ext>
             </a:extLst>
           </p:cNvPr>
@@ -11075,8 +11514,8 @@
         </p:nvSpPr>
         <p:spPr>
           <a:xfrm>
-            <a:off x="5900286" y="4632929"/>
-            <a:ext cx="308009" cy="564709"/>
+            <a:off x="7170831" y="4426383"/>
+            <a:ext cx="308009" cy="989015"/>
           </a:xfrm>
           <a:prstGeom prst="rightBrace">
             <a:avLst>
@@ -11120,7 +11559,7 @@
     </p:spTree>
     <p:extLst>
       <p:ext uri="{BB962C8B-B14F-4D97-AF65-F5344CB8AC3E}">
-        <p14:creationId xmlns:p14="http://schemas.microsoft.com/office/powerpoint/2010/main" val="1479614906"/>
+        <p14:creationId xmlns:p14="http://schemas.microsoft.com/office/powerpoint/2010/main" val="1680803557"/>
       </p:ext>
     </p:extLst>
   </p:cSld>
@@ -11152,7 +11591,7 @@
           <p:cNvPr id="2" name="Title 1">
             <a:extLst>
               <a:ext uri="{FF2B5EF4-FFF2-40B4-BE49-F238E27FC236}">
-                <a16:creationId xmlns:a16="http://schemas.microsoft.com/office/drawing/2014/main" id="{CD19370A-8BBD-8AA9-5D8D-D36140357302}"/>
+                <a16:creationId xmlns:a16="http://schemas.microsoft.com/office/drawing/2014/main" id="{A62D5101-6377-6A9E-C785-07942533F619}"/>
               </a:ext>
             </a:extLst>
           </p:cNvPr>
@@ -11165,7 +11604,7 @@
         </p:nvSpPr>
         <p:spPr>
           <a:xfrm>
-            <a:off x="838200" y="143741"/>
+            <a:off x="838200" y="134125"/>
             <a:ext cx="10515600" cy="1325563"/>
           </a:xfrm>
         </p:spPr>
@@ -11180,7 +11619,7 @@
             </a:r>
             <a:r>
               <a:rPr lang="en-US" i="1" u="sng" dirty="0"/>
-              <a:t>the config file</a:t>
+              <a:t>outputs directory</a:t>
             </a:r>
           </a:p>
         </p:txBody>
@@ -11190,7 +11629,7 @@
           <p:cNvPr id="3" name="Content Placeholder 2">
             <a:extLst>
               <a:ext uri="{FF2B5EF4-FFF2-40B4-BE49-F238E27FC236}">
-                <a16:creationId xmlns:a16="http://schemas.microsoft.com/office/drawing/2014/main" id="{118A8AE9-B028-07D5-4555-EF8AE74753CD}"/>
+                <a16:creationId xmlns:a16="http://schemas.microsoft.com/office/drawing/2014/main" id="{2B9CC1A1-A4AB-4BCD-88DD-707BD5163199}"/>
               </a:ext>
             </a:extLst>
           </p:cNvPr>
@@ -11203,13 +11642,13 @@
         </p:nvSpPr>
         <p:spPr>
           <a:xfrm>
-            <a:off x="838199" y="1825625"/>
-            <a:ext cx="10750617" cy="4667250"/>
+            <a:off x="1848853" y="1816000"/>
+            <a:ext cx="4648200" cy="4667250"/>
           </a:xfrm>
         </p:spPr>
         <p:txBody>
           <a:bodyPr>
-            <a:noAutofit/>
+            <a:normAutofit fontScale="85000" lnSpcReduction="20000"/>
           </a:bodyPr>
           <a:lstStyle/>
           <a:p>
@@ -11217,354 +11656,193 @@
               <a:buNone/>
             </a:pPr>
             <a:r>
-              <a:rPr lang="en-US" sz="2400" b="1" dirty="0">
+              <a:rPr lang="en-US" b="1" dirty="0">
                 <a:latin typeface="Courier New" panose="02070309020205020404" pitchFamily="49" charset="0"/>
                 <a:cs typeface="Courier New" panose="02070309020205020404" pitchFamily="49" charset="0"/>
               </a:rPr>
-              <a:t>host:</a:t>
-            </a:r>
-            <a:br>
-              <a:rPr lang="en-US" sz="2400" dirty="0">
+              <a:t>outputs/</a:t>
+            </a:r>
+          </a:p>
+          <a:p>
+            <a:pPr lvl="2"/>
+            <a:endParaRPr lang="en-US" dirty="0">
+              <a:latin typeface="Courier New" panose="02070309020205020404" pitchFamily="49" charset="0"/>
+              <a:cs typeface="Courier New" panose="02070309020205020404" pitchFamily="49" charset="0"/>
+            </a:endParaRPr>
+          </a:p>
+          <a:p>
+            <a:pPr marL="457200" lvl="1" indent="0">
+              <a:buNone/>
+            </a:pPr>
+            <a:r>
+              <a:rPr lang="en-US" b="1" dirty="0">
                 <a:latin typeface="Courier New" panose="02070309020205020404" pitchFamily="49" charset="0"/>
                 <a:cs typeface="Courier New" panose="02070309020205020404" pitchFamily="49" charset="0"/>
               </a:rPr>
-            </a:br>
-            <a:r>
-              <a:rPr lang="en-US" sz="2000" dirty="0">
+              <a:t>job_17a/</a:t>
+            </a:r>
+          </a:p>
+          <a:p>
+            <a:pPr marL="914400" lvl="2" indent="0">
+              <a:buNone/>
+            </a:pPr>
+            <a:r>
+              <a:rPr lang="en-US" dirty="0">
                 <a:latin typeface="Courier New" panose="02070309020205020404" pitchFamily="49" charset="0"/>
                 <a:cs typeface="Courier New" panose="02070309020205020404" pitchFamily="49" charset="0"/>
               </a:rPr>
-              <a:t>    </a:t>
-            </a:r>
-            <a:r>
-              <a:rPr lang="en-US" sz="2000" b="1" dirty="0">
+              <a:t>line_extract.task.txt</a:t>
+            </a:r>
+          </a:p>
+          <a:p>
+            <a:pPr marL="914400" lvl="2" indent="0">
+              <a:buNone/>
+            </a:pPr>
+            <a:r>
+              <a:rPr lang="en-US" dirty="0">
                 <a:latin typeface="Courier New" panose="02070309020205020404" pitchFamily="49" charset="0"/>
                 <a:cs typeface="Courier New" panose="02070309020205020404" pitchFamily="49" charset="0"/>
               </a:rPr>
-              <a:t>input_dir:   </a:t>
-            </a:r>
-            <a:r>
-              <a:rPr lang="en-US" sz="2000" dirty="0">
+              <a:t>line_extract.docker.log</a:t>
+            </a:r>
+          </a:p>
+          <a:p>
+            <a:pPr marL="914400" lvl="2" indent="0">
+              <a:buNone/>
+            </a:pPr>
+            <a:r>
+              <a:rPr lang="en-US" b="1" dirty="0">
                 <a:latin typeface="Courier New" panose="02070309020205020404" pitchFamily="49" charset="0"/>
                 <a:cs typeface="Courier New" panose="02070309020205020404" pitchFamily="49" charset="0"/>
               </a:rPr>
-              <a:t>/home/mpg/dev/ta1_integration_inputs</a:t>
-            </a:r>
-            <a:br>
-              <a:rPr lang="en-US" sz="2000" dirty="0">
+              <a:t>line_extract/</a:t>
+            </a:r>
+          </a:p>
+          <a:p>
+            <a:pPr marL="1371600" lvl="3" indent="0">
+              <a:buNone/>
+            </a:pPr>
+            <a:r>
+              <a:rPr lang="en-US" dirty="0">
                 <a:latin typeface="Courier New" panose="02070309020205020404" pitchFamily="49" charset="0"/>
                 <a:cs typeface="Courier New" panose="02070309020205020404" pitchFamily="49" charset="0"/>
               </a:rPr>
-            </a:br>
-            <a:r>
-              <a:rPr lang="en-US" sz="2000" dirty="0">
-                <a:latin typeface="Courier New" panose="02070309020205020404" pitchFamily="49" charset="0"/>
-                <a:cs typeface="Courier New" panose="02070309020205020404" pitchFamily="49" charset="0"/>
-              </a:rPr>
-              <a:t>    </a:t>
-            </a:r>
-            <a:r>
-              <a:rPr lang="en-US" sz="2000" b="1" dirty="0">
-                <a:latin typeface="Courier New" panose="02070309020205020404" pitchFamily="49" charset="0"/>
-                <a:cs typeface="Courier New" panose="02070309020205020404" pitchFamily="49" charset="0"/>
-              </a:rPr>
-              <a:t>output_dir:</a:t>
-            </a:r>
-            <a:r>
-              <a:rPr lang="en-US" sz="2000" dirty="0">
-                <a:latin typeface="Courier New" panose="02070309020205020404" pitchFamily="49" charset="0"/>
-                <a:cs typeface="Courier New" panose="02070309020205020404" pitchFamily="49" charset="0"/>
-              </a:rPr>
-              <a:t>  /home/mpg/dev/ta1-output</a:t>
-            </a:r>
-            <a:br>
-              <a:rPr lang="en-US" sz="2000" dirty="0">
-                <a:latin typeface="Courier New" panose="02070309020205020404" pitchFamily="49" charset="0"/>
-                <a:cs typeface="Courier New" panose="02070309020205020404" pitchFamily="49" charset="0"/>
-              </a:rPr>
-            </a:br>
-            <a:br>
-              <a:rPr lang="en-US" sz="1400" dirty="0">
-                <a:latin typeface="Courier New" panose="02070309020205020404" pitchFamily="49" charset="0"/>
-                <a:cs typeface="Courier New" panose="02070309020205020404" pitchFamily="49" charset="0"/>
-              </a:rPr>
-            </a:br>
-            <a:r>
-              <a:rPr lang="en-US" sz="2400" b="1" dirty="0">
-                <a:latin typeface="Courier New" panose="02070309020205020404" pitchFamily="49" charset="0"/>
-                <a:cs typeface="Courier New" panose="02070309020205020404" pitchFamily="49" charset="0"/>
-              </a:rPr>
-              <a:t>container:</a:t>
-            </a:r>
-            <a:br>
-              <a:rPr lang="en-US" sz="2400" dirty="0">
-                <a:latin typeface="Courier New" panose="02070309020205020404" pitchFamily="49" charset="0"/>
-                <a:cs typeface="Courier New" panose="02070309020205020404" pitchFamily="49" charset="0"/>
-              </a:rPr>
-            </a:br>
-            <a:r>
-              <a:rPr lang="en-US" sz="2000" dirty="0">
-                <a:latin typeface="Courier New" panose="02070309020205020404" pitchFamily="49" charset="0"/>
-                <a:cs typeface="Courier New" panose="02070309020205020404" pitchFamily="49" charset="0"/>
-              </a:rPr>
-              <a:t>    </a:t>
-            </a:r>
-            <a:r>
-              <a:rPr lang="en-US" sz="2000" b="1" dirty="0">
-                <a:latin typeface="Courier New" panose="02070309020205020404" pitchFamily="49" charset="0"/>
-                <a:cs typeface="Courier New" panose="02070309020205020404" pitchFamily="49" charset="0"/>
-              </a:rPr>
-              <a:t>input_dir:   </a:t>
-            </a:r>
-            <a:r>
-              <a:rPr lang="en-US" sz="2000" dirty="0">
-                <a:latin typeface="Courier New" panose="02070309020205020404" pitchFamily="49" charset="0"/>
-                <a:cs typeface="Courier New" panose="02070309020205020404" pitchFamily="49" charset="0"/>
-              </a:rPr>
-              <a:t>/ta1/input</a:t>
-            </a:r>
-            <a:br>
-              <a:rPr lang="en-US" sz="2000" dirty="0">
-                <a:latin typeface="Courier New" panose="02070309020205020404" pitchFamily="49" charset="0"/>
-                <a:cs typeface="Courier New" panose="02070309020205020404" pitchFamily="49" charset="0"/>
-              </a:rPr>
-            </a:br>
-            <a:r>
-              <a:rPr lang="en-US" sz="2000" dirty="0">
-                <a:latin typeface="Courier New" panose="02070309020205020404" pitchFamily="49" charset="0"/>
-                <a:cs typeface="Courier New" panose="02070309020205020404" pitchFamily="49" charset="0"/>
-              </a:rPr>
-              <a:t>    </a:t>
-            </a:r>
-            <a:r>
-              <a:rPr lang="en-US" sz="2000" b="1" dirty="0">
-                <a:latin typeface="Courier New" panose="02070309020205020404" pitchFamily="49" charset="0"/>
-                <a:cs typeface="Courier New" panose="02070309020205020404" pitchFamily="49" charset="0"/>
-              </a:rPr>
-              <a:t>output_dir:</a:t>
-            </a:r>
-            <a:r>
-              <a:rPr lang="en-US" sz="2000" dirty="0">
-                <a:latin typeface="Courier New" panose="02070309020205020404" pitchFamily="49" charset="0"/>
-                <a:cs typeface="Courier New" panose="02070309020205020404" pitchFamily="49" charset="0"/>
-              </a:rPr>
-              <a:t>  /ta1/output</a:t>
-            </a:r>
-            <a:br>
-              <a:rPr lang="en-US" sz="2000" dirty="0">
-                <a:latin typeface="Courier New" panose="02070309020205020404" pitchFamily="49" charset="0"/>
-                <a:cs typeface="Courier New" panose="02070309020205020404" pitchFamily="49" charset="0"/>
-              </a:rPr>
-            </a:br>
-            <a:endParaRPr lang="en-US" sz="1400" dirty="0">
-              <a:latin typeface="Courier New" panose="02070309020205020404" pitchFamily="49" charset="0"/>
-              <a:cs typeface="Courier New" panose="02070309020205020404" pitchFamily="49" charset="0"/>
-            </a:endParaRPr>
-          </a:p>
-          <a:p>
-            <a:pPr marL="0" indent="0">
+              <a:t>AK_Dillingham.geojson</a:t>
+            </a:r>
+          </a:p>
+          <a:p>
+            <a:pPr marL="1371600" lvl="3" indent="0">
               <a:buNone/>
             </a:pPr>
             <a:r>
-              <a:rPr lang="en-US" sz="2400" b="1" dirty="0">
-                <a:latin typeface="Courier New" panose="02070309020205020404" pitchFamily="49" charset="0"/>
-                <a:cs typeface="Courier New" panose="02070309020205020404" pitchFamily="49" charset="0"/>
-              </a:rPr>
-              <a:t>modules:</a:t>
-            </a:r>
-            <a:br>
-              <a:rPr lang="en-US" sz="2400" dirty="0">
-                <a:latin typeface="Courier New" panose="02070309020205020404" pitchFamily="49" charset="0"/>
-                <a:cs typeface="Courier New" panose="02070309020205020404" pitchFamily="49" charset="0"/>
-              </a:rPr>
-            </a:br>
-            <a:r>
-              <a:rPr lang="en-US" sz="2000" dirty="0">
-                <a:latin typeface="Courier New" panose="02070309020205020404" pitchFamily="49" charset="0"/>
-                <a:cs typeface="Courier New" panose="02070309020205020404" pitchFamily="49" charset="0"/>
-              </a:rPr>
-              <a:t>    </a:t>
-            </a:r>
-            <a:r>
-              <a:rPr lang="en-US" sz="2000" b="1" dirty="0">
-                <a:latin typeface="Courier New" panose="02070309020205020404" pitchFamily="49" charset="0"/>
-                <a:cs typeface="Courier New" panose="02070309020205020404" pitchFamily="49" charset="0"/>
-              </a:rPr>
-              <a:t>legend_segment:</a:t>
-            </a:r>
-            <a:br>
-              <a:rPr lang="en-US" sz="2000" dirty="0">
-                <a:latin typeface="Courier New" panose="02070309020205020404" pitchFamily="49" charset="0"/>
-                <a:cs typeface="Courier New" panose="02070309020205020404" pitchFamily="49" charset="0"/>
-              </a:rPr>
-            </a:br>
-            <a:r>
-              <a:rPr lang="en-US" sz="2000" dirty="0">
-                <a:latin typeface="Courier New" panose="02070309020205020404" pitchFamily="49" charset="0"/>
-                <a:cs typeface="Courier New" panose="02070309020205020404" pitchFamily="49" charset="0"/>
-              </a:rPr>
-              <a:t>        </a:t>
-            </a:r>
-            <a:r>
-              <a:rPr lang="en-US" sz="2000" b="1" dirty="0">
-                <a:latin typeface="Courier New" panose="02070309020205020404" pitchFamily="49" charset="0"/>
-                <a:cs typeface="Courier New" panose="02070309020205020404" pitchFamily="49" charset="0"/>
-              </a:rPr>
-              <a:t>input:      </a:t>
-            </a:r>
-            <a:r>
-              <a:rPr lang="en-US" sz="2000" b="1" dirty="0">
-                <a:solidFill>
-                  <a:srgbClr val="7030A0"/>
-                </a:solidFill>
-                <a:latin typeface="Courier New" panose="02070309020205020404" pitchFamily="49" charset="0"/>
-                <a:cs typeface="Courier New" panose="02070309020205020404" pitchFamily="49" charset="0"/>
-              </a:rPr>
-              <a:t>$INPUT_DIR</a:t>
-            </a:r>
-            <a:r>
-              <a:rPr lang="en-US" sz="2000" dirty="0">
-                <a:latin typeface="Courier New" panose="02070309020205020404" pitchFamily="49" charset="0"/>
-                <a:cs typeface="Courier New" panose="02070309020205020404" pitchFamily="49" charset="0"/>
-              </a:rPr>
-              <a:t>/maps/</a:t>
-            </a:r>
-            <a:r>
-              <a:rPr lang="en-US" sz="2000" b="1" dirty="0">
-                <a:solidFill>
-                  <a:srgbClr val="7030A0"/>
-                </a:solidFill>
-                <a:latin typeface="Courier New" panose="02070309020205020404" pitchFamily="49" charset="0"/>
-                <a:cs typeface="Courier New" panose="02070309020205020404" pitchFamily="49" charset="0"/>
-              </a:rPr>
-              <a:t>$MAP_NAME</a:t>
-            </a:r>
-            <a:br>
-              <a:rPr lang="en-US" sz="2000" dirty="0">
-                <a:latin typeface="Courier New" panose="02070309020205020404" pitchFamily="49" charset="0"/>
-                <a:cs typeface="Courier New" panose="02070309020205020404" pitchFamily="49" charset="0"/>
-              </a:rPr>
-            </a:br>
-            <a:r>
-              <a:rPr lang="en-US" sz="2000" dirty="0">
-                <a:latin typeface="Courier New" panose="02070309020205020404" pitchFamily="49" charset="0"/>
-                <a:cs typeface="Courier New" panose="02070309020205020404" pitchFamily="49" charset="0"/>
-              </a:rPr>
-              <a:t>        </a:t>
-            </a:r>
-            <a:r>
-              <a:rPr lang="en-US" sz="2000" b="1" dirty="0">
-                <a:latin typeface="Courier New" panose="02070309020205020404" pitchFamily="49" charset="0"/>
-                <a:cs typeface="Courier New" panose="02070309020205020404" pitchFamily="49" charset="0"/>
-              </a:rPr>
-              <a:t>output:     </a:t>
-            </a:r>
-            <a:r>
-              <a:rPr lang="en-US" sz="2000" b="1" dirty="0">
-                <a:solidFill>
-                  <a:srgbClr val="7030A0"/>
-                </a:solidFill>
-                <a:latin typeface="Courier New" panose="02070309020205020404" pitchFamily="49" charset="0"/>
-                <a:cs typeface="Courier New" panose="02070309020205020404" pitchFamily="49" charset="0"/>
-              </a:rPr>
-              <a:t>$OUTPUT_DIR</a:t>
-            </a:r>
-            <a:r>
-              <a:rPr lang="en-US" sz="2000" dirty="0">
-                <a:latin typeface="Courier New" panose="02070309020205020404" pitchFamily="49" charset="0"/>
-                <a:cs typeface="Courier New" panose="02070309020205020404" pitchFamily="49" charset="0"/>
-              </a:rPr>
-              <a:t>/legend_segment</a:t>
-            </a:r>
-            <a:br>
-              <a:rPr lang="en-US" sz="2000" dirty="0">
-                <a:latin typeface="Courier New" panose="02070309020205020404" pitchFamily="49" charset="0"/>
-                <a:cs typeface="Courier New" panose="02070309020205020404" pitchFamily="49" charset="0"/>
-              </a:rPr>
-            </a:br>
-            <a:r>
-              <a:rPr lang="en-US" sz="2000" dirty="0">
-                <a:latin typeface="Courier New" panose="02070309020205020404" pitchFamily="49" charset="0"/>
-                <a:cs typeface="Courier New" panose="02070309020205020404" pitchFamily="49" charset="0"/>
-              </a:rPr>
-              <a:t>	  </a:t>
-            </a:r>
-            <a:r>
-              <a:rPr lang="en-US" sz="2000" b="1" dirty="0">
-                <a:latin typeface="Courier New" panose="02070309020205020404" pitchFamily="49" charset="0"/>
-                <a:cs typeface="Courier New" panose="02070309020205020404" pitchFamily="49" charset="0"/>
-              </a:rPr>
-              <a:t>model:      </a:t>
-            </a:r>
-            <a:r>
-              <a:rPr lang="en-US" sz="2000" b="1" dirty="0">
-                <a:solidFill>
-                  <a:srgbClr val="7030A0"/>
-                </a:solidFill>
-                <a:latin typeface="Courier New" panose="02070309020205020404" pitchFamily="49" charset="0"/>
-                <a:cs typeface="Courier New" panose="02070309020205020404" pitchFamily="49" charset="0"/>
-              </a:rPr>
-              <a:t>$INPUT_DIR</a:t>
-            </a:r>
-            <a:r>
-              <a:rPr lang="en-US" sz="2000" dirty="0">
-                <a:latin typeface="Courier New" panose="02070309020205020404" pitchFamily="49" charset="0"/>
-                <a:cs typeface="Courier New" panose="02070309020205020404" pitchFamily="49" charset="0"/>
-              </a:rPr>
-              <a:t>/legend_segment/layoutlmv3_20230929</a:t>
-            </a:r>
-            <a:br>
-              <a:rPr lang="en-US" sz="2000" dirty="0">
-                <a:latin typeface="Courier New" panose="02070309020205020404" pitchFamily="49" charset="0"/>
-                <a:cs typeface="Courier New" panose="02070309020205020404" pitchFamily="49" charset="0"/>
-              </a:rPr>
-            </a:br>
-            <a:r>
-              <a:rPr lang="en-US" sz="2000" dirty="0">
-                <a:latin typeface="Courier New" panose="02070309020205020404" pitchFamily="49" charset="0"/>
-                <a:cs typeface="Courier New" panose="02070309020205020404" pitchFamily="49" charset="0"/>
-              </a:rPr>
-              <a:t>        </a:t>
-            </a:r>
-            <a:r>
-              <a:rPr lang="en-US" sz="2000" b="1" dirty="0">
-                <a:latin typeface="Courier New" panose="02070309020205020404" pitchFamily="49" charset="0"/>
-                <a:cs typeface="Courier New" panose="02070309020205020404" pitchFamily="49" charset="0"/>
-              </a:rPr>
-              <a:t>threshold:  </a:t>
-            </a:r>
-            <a:r>
-              <a:rPr lang="en-US" sz="2000" dirty="0">
-                <a:latin typeface="Courier New" panose="02070309020205020404" pitchFamily="49" charset="0"/>
-                <a:cs typeface="Courier New" panose="02070309020205020404" pitchFamily="49" charset="0"/>
-              </a:rPr>
-              <a:t>3.14</a:t>
-            </a:r>
-            <a:br>
-              <a:rPr lang="en-US" sz="2000" dirty="0">
-                <a:latin typeface="Courier New" panose="02070309020205020404" pitchFamily="49" charset="0"/>
-                <a:cs typeface="Courier New" panose="02070309020205020404" pitchFamily="49" charset="0"/>
-              </a:rPr>
-            </a:br>
-            <a:r>
-              <a:rPr lang="en-US" sz="2000" dirty="0">
-                <a:latin typeface="Courier New" panose="02070309020205020404" pitchFamily="49" charset="0"/>
-                <a:cs typeface="Courier New" panose="02070309020205020404" pitchFamily="49" charset="0"/>
-              </a:rPr>
-              <a:t>    </a:t>
-            </a:r>
-            <a:r>
-              <a:rPr lang="en-US" sz="2000" b="1" dirty="0">
+              <a:rPr lang="en-US" dirty="0">
                 <a:latin typeface="Courier New" panose="02070309020205020404" pitchFamily="49" charset="0"/>
                 <a:cs typeface="Courier New" panose="02070309020205020404" pitchFamily="49" charset="0"/>
               </a:rPr>
               <a:t>…</a:t>
             </a:r>
-            <a:endParaRPr lang="en-US" sz="2000" dirty="0">
+          </a:p>
+          <a:p>
+            <a:pPr lvl="3"/>
+            <a:endParaRPr lang="en-US" dirty="0">
               <a:latin typeface="Courier New" panose="02070309020205020404" pitchFamily="49" charset="0"/>
               <a:cs typeface="Courier New" panose="02070309020205020404" pitchFamily="49" charset="0"/>
             </a:endParaRPr>
           </a:p>
+          <a:p>
+            <a:pPr marL="914400" lvl="2" indent="0">
+              <a:buNone/>
+            </a:pPr>
+            <a:r>
+              <a:rPr lang="en-US" dirty="0">
+                <a:latin typeface="Courier New" panose="02070309020205020404" pitchFamily="49" charset="0"/>
+                <a:cs typeface="Courier New" panose="02070309020205020404" pitchFamily="49" charset="0"/>
+              </a:rPr>
+              <a:t>georeference.task.txt</a:t>
+            </a:r>
+          </a:p>
+          <a:p>
+            <a:pPr marL="914400" lvl="2" indent="0">
+              <a:buNone/>
+            </a:pPr>
+            <a:r>
+              <a:rPr lang="en-US" dirty="0">
+                <a:latin typeface="Courier New" panose="02070309020205020404" pitchFamily="49" charset="0"/>
+                <a:cs typeface="Courier New" panose="02070309020205020404" pitchFamily="49" charset="0"/>
+              </a:rPr>
+              <a:t>georeference.docker.log</a:t>
+            </a:r>
+          </a:p>
+          <a:p>
+            <a:pPr marL="914400" lvl="2" indent="0">
+              <a:buNone/>
+            </a:pPr>
+            <a:r>
+              <a:rPr lang="en-US" b="1" dirty="0">
+                <a:latin typeface="Courier New" panose="02070309020205020404" pitchFamily="49" charset="0"/>
+                <a:cs typeface="Courier New" panose="02070309020205020404" pitchFamily="49" charset="0"/>
+              </a:rPr>
+              <a:t>georeference/</a:t>
+            </a:r>
+          </a:p>
+          <a:p>
+            <a:pPr lvl="3"/>
+            <a:r>
+              <a:rPr lang="en-US" dirty="0">
+                <a:latin typeface="Courier New" panose="02070309020205020404" pitchFamily="49" charset="0"/>
+                <a:cs typeface="Courier New" panose="02070309020205020404" pitchFamily="49" charset="0"/>
+              </a:rPr>
+              <a:t>AK_Dillingham.txt</a:t>
+            </a:r>
+          </a:p>
+          <a:p>
+            <a:pPr lvl="3"/>
+            <a:r>
+              <a:rPr lang="en-US" dirty="0">
+                <a:latin typeface="Courier New" panose="02070309020205020404" pitchFamily="49" charset="0"/>
+                <a:cs typeface="Courier New" panose="02070309020205020404" pitchFamily="49" charset="0"/>
+              </a:rPr>
+              <a:t>…</a:t>
+            </a:r>
+          </a:p>
+          <a:p>
+            <a:pPr lvl="2"/>
+            <a:endParaRPr lang="en-US" dirty="0">
+              <a:latin typeface="Courier New" panose="02070309020205020404" pitchFamily="49" charset="0"/>
+              <a:cs typeface="Courier New" panose="02070309020205020404" pitchFamily="49" charset="0"/>
+            </a:endParaRPr>
+          </a:p>
+          <a:p>
+            <a:pPr marL="457200" lvl="1" indent="0">
+              <a:buNone/>
+            </a:pPr>
+            <a:r>
+              <a:rPr lang="en-US" b="1" dirty="0">
+                <a:latin typeface="Courier New" panose="02070309020205020404" pitchFamily="49" charset="0"/>
+                <a:cs typeface="Courier New" panose="02070309020205020404" pitchFamily="49" charset="0"/>
+              </a:rPr>
+              <a:t>job_27f/</a:t>
+            </a:r>
+          </a:p>
+          <a:p>
+            <a:pPr marL="914400" lvl="2" indent="0">
+              <a:buNone/>
+            </a:pPr>
+            <a:r>
+              <a:rPr lang="en-US" dirty="0">
+                <a:latin typeface="Courier New" panose="02070309020205020404" pitchFamily="49" charset="0"/>
+                <a:cs typeface="Courier New" panose="02070309020205020404" pitchFamily="49" charset="0"/>
+              </a:rPr>
+              <a:t>…</a:t>
+            </a:r>
+          </a:p>
+          <a:p>
+            <a:pPr lvl="1"/>
+            <a:endParaRPr lang="en-US" dirty="0">
+              <a:latin typeface="Courier New" panose="02070309020205020404" pitchFamily="49" charset="0"/>
+              <a:cs typeface="Courier New" panose="02070309020205020404" pitchFamily="49" charset="0"/>
+            </a:endParaRPr>
+          </a:p>
         </p:txBody>
       </p:sp>
       <p:sp>
@@ -11572,7 +11850,7 @@
           <p:cNvPr id="4" name="Slide Number Placeholder 3">
             <a:extLst>
               <a:ext uri="{FF2B5EF4-FFF2-40B4-BE49-F238E27FC236}">
-                <a16:creationId xmlns:a16="http://schemas.microsoft.com/office/drawing/2014/main" id="{DF1B2F41-2F01-9227-F0C3-94698CBE58B4}"/>
+                <a16:creationId xmlns:a16="http://schemas.microsoft.com/office/drawing/2014/main" id="{BC61B19F-98EA-D5F0-8038-B5E5272BF1AE}"/>
               </a:ext>
             </a:extLst>
           </p:cNvPr>
@@ -11596,10 +11874,466 @@
           </a:p>
         </p:txBody>
       </p:sp>
+      <p:sp>
+        <p:nvSpPr>
+          <p:cNvPr id="5" name="TextBox 4">
+            <a:extLst>
+              <a:ext uri="{FF2B5EF4-FFF2-40B4-BE49-F238E27FC236}">
+                <a16:creationId xmlns:a16="http://schemas.microsoft.com/office/drawing/2014/main" id="{AE188AFA-0ADA-072C-CAD0-0316C9F08222}"/>
+              </a:ext>
+            </a:extLst>
+          </p:cNvPr>
+          <p:cNvSpPr txBox="1"/>
+          <p:nvPr/>
+        </p:nvSpPr>
+        <p:spPr>
+          <a:xfrm>
+            <a:off x="6805062" y="2317583"/>
+            <a:ext cx="2271561" cy="307777"/>
+          </a:xfrm>
+          <a:prstGeom prst="rect">
+            <a:avLst/>
+          </a:prstGeom>
+          <a:solidFill>
+            <a:schemeClr val="bg1">
+              <a:lumMod val="95000"/>
+            </a:schemeClr>
+          </a:solidFill>
+        </p:spPr>
+        <p:txBody>
+          <a:bodyPr wrap="square" rtlCol="0">
+            <a:spAutoFit/>
+          </a:bodyPr>
+          <a:lstStyle/>
+          <a:p>
+            <a:pPr algn="ctr"/>
+            <a:r>
+              <a:rPr lang="en-US" sz="1400" i="1" dirty="0"/>
+              <a:t>Mounted to docker container</a:t>
+            </a:r>
+          </a:p>
+        </p:txBody>
+      </p:sp>
+      <p:cxnSp>
+        <p:nvCxnSpPr>
+          <p:cNvPr id="6" name="Curved Connector 8">
+            <a:extLst>
+              <a:ext uri="{FF2B5EF4-FFF2-40B4-BE49-F238E27FC236}">
+                <a16:creationId xmlns:a16="http://schemas.microsoft.com/office/drawing/2014/main" id="{D1A16DFA-C15D-D685-DF58-B3144B30E453}"/>
+              </a:ext>
+            </a:extLst>
+          </p:cNvPr>
+          <p:cNvCxnSpPr>
+            <a:cxnSpLocks/>
+            <a:stCxn id="5" idx="1"/>
+          </p:cNvCxnSpPr>
+          <p:nvPr/>
+        </p:nvCxnSpPr>
+        <p:spPr>
+          <a:xfrm flipH="1">
+            <a:off x="3917482" y="2471472"/>
+            <a:ext cx="2887580" cy="0"/>
+          </a:xfrm>
+          <a:prstGeom prst="straightConnector1">
+            <a:avLst/>
+          </a:prstGeom>
+          <a:ln w="12700">
+            <a:solidFill>
+              <a:schemeClr val="tx1">
+                <a:lumMod val="50000"/>
+                <a:lumOff val="50000"/>
+              </a:schemeClr>
+            </a:solidFill>
+            <a:tailEnd type="arrow" w="lg" len="lg"/>
+          </a:ln>
+        </p:spPr>
+        <p:style>
+          <a:lnRef idx="1">
+            <a:schemeClr val="accent1"/>
+          </a:lnRef>
+          <a:fillRef idx="0">
+            <a:schemeClr val="accent1"/>
+          </a:fillRef>
+          <a:effectRef idx="0">
+            <a:schemeClr val="accent1"/>
+          </a:effectRef>
+          <a:fontRef idx="minor">
+            <a:schemeClr val="tx1"/>
+          </a:fontRef>
+        </p:style>
+      </p:cxnSp>
+      <p:sp>
+        <p:nvSpPr>
+          <p:cNvPr id="8" name="TextBox 7">
+            <a:extLst>
+              <a:ext uri="{FF2B5EF4-FFF2-40B4-BE49-F238E27FC236}">
+                <a16:creationId xmlns:a16="http://schemas.microsoft.com/office/drawing/2014/main" id="{7F5AA352-8CED-7C6E-711E-167913572B41}"/>
+              </a:ext>
+            </a:extLst>
+          </p:cNvPr>
+          <p:cNvSpPr txBox="1"/>
+          <p:nvPr/>
+        </p:nvSpPr>
+        <p:spPr>
+          <a:xfrm>
+            <a:off x="6805062" y="3073079"/>
+            <a:ext cx="2743200" cy="307777"/>
+          </a:xfrm>
+          <a:prstGeom prst="rect">
+            <a:avLst/>
+          </a:prstGeom>
+          <a:solidFill>
+            <a:schemeClr val="bg1">
+              <a:lumMod val="95000"/>
+            </a:schemeClr>
+          </a:solidFill>
+        </p:spPr>
+        <p:txBody>
+          <a:bodyPr wrap="square" rtlCol="0">
+            <a:spAutoFit/>
+          </a:bodyPr>
+          <a:lstStyle/>
+          <a:p>
+            <a:pPr algn="ctr"/>
+            <a:r>
+              <a:rPr lang="en-US" sz="1400" i="1" dirty="0"/>
+              <a:t>Results of one module from one job</a:t>
+            </a:r>
+          </a:p>
+        </p:txBody>
+      </p:sp>
+      <p:sp>
+        <p:nvSpPr>
+          <p:cNvPr id="9" name="Right Brace 8">
+            <a:extLst>
+              <a:ext uri="{FF2B5EF4-FFF2-40B4-BE49-F238E27FC236}">
+                <a16:creationId xmlns:a16="http://schemas.microsoft.com/office/drawing/2014/main" id="{D227474F-E0A1-0F87-B952-C7544D2CC121}"/>
+              </a:ext>
+            </a:extLst>
+          </p:cNvPr>
+          <p:cNvSpPr/>
+          <p:nvPr/>
+        </p:nvSpPr>
+        <p:spPr>
+          <a:xfrm>
+            <a:off x="6497053" y="2625360"/>
+            <a:ext cx="308009" cy="1118861"/>
+          </a:xfrm>
+          <a:prstGeom prst="rightBrace">
+            <a:avLst>
+              <a:gd name="adj1" fmla="val 8333"/>
+              <a:gd name="adj2" fmla="val 50973"/>
+            </a:avLst>
+          </a:prstGeom>
+          <a:noFill/>
+          <a:ln w="12700">
+            <a:solidFill>
+              <a:schemeClr val="tx1">
+                <a:lumMod val="50000"/>
+                <a:lumOff val="50000"/>
+              </a:schemeClr>
+            </a:solidFill>
+          </a:ln>
+        </p:spPr>
+        <p:style>
+          <a:lnRef idx="1">
+            <a:schemeClr val="accent1"/>
+          </a:lnRef>
+          <a:fillRef idx="0">
+            <a:schemeClr val="accent1"/>
+          </a:fillRef>
+          <a:effectRef idx="0">
+            <a:schemeClr val="accent1"/>
+          </a:effectRef>
+          <a:fontRef idx="minor">
+            <a:schemeClr val="tx1"/>
+          </a:fontRef>
+        </p:style>
+        <p:txBody>
+          <a:bodyPr rtlCol="0" anchor="ctr"/>
+          <a:lstStyle/>
+          <a:p>
+            <a:pPr algn="ctr"/>
+            <a:endParaRPr lang="en-US" dirty="0"/>
+          </a:p>
+        </p:txBody>
+      </p:sp>
+      <p:sp>
+        <p:nvSpPr>
+          <p:cNvPr id="12" name="TextBox 11">
+            <a:extLst>
+              <a:ext uri="{FF2B5EF4-FFF2-40B4-BE49-F238E27FC236}">
+                <a16:creationId xmlns:a16="http://schemas.microsoft.com/office/drawing/2014/main" id="{FC3F102D-288E-9A26-A0D8-9DC691256D1D}"/>
+              </a:ext>
+            </a:extLst>
+          </p:cNvPr>
+          <p:cNvSpPr txBox="1"/>
+          <p:nvPr/>
+        </p:nvSpPr>
+        <p:spPr>
+          <a:xfrm>
+            <a:off x="6932998" y="4036626"/>
+            <a:ext cx="1970372" cy="307777"/>
+          </a:xfrm>
+          <a:prstGeom prst="rect">
+            <a:avLst/>
+          </a:prstGeom>
+          <a:solidFill>
+            <a:schemeClr val="bg1">
+              <a:lumMod val="95000"/>
+            </a:schemeClr>
+          </a:solidFill>
+        </p:spPr>
+        <p:txBody>
+          <a:bodyPr wrap="square" rtlCol="0">
+            <a:spAutoFit/>
+          </a:bodyPr>
+          <a:lstStyle/>
+          <a:p>
+            <a:pPr algn="ctr"/>
+            <a:r>
+              <a:rPr lang="en-US" sz="1400" i="1" dirty="0"/>
+              <a:t>If present, job succeeded</a:t>
+            </a:r>
+          </a:p>
+        </p:txBody>
+      </p:sp>
+      <p:cxnSp>
+        <p:nvCxnSpPr>
+          <p:cNvPr id="13" name="Curved Connector 8">
+            <a:extLst>
+              <a:ext uri="{FF2B5EF4-FFF2-40B4-BE49-F238E27FC236}">
+                <a16:creationId xmlns:a16="http://schemas.microsoft.com/office/drawing/2014/main" id="{9A949DDC-10DB-578A-8661-CC1661E8A633}"/>
+              </a:ext>
+            </a:extLst>
+          </p:cNvPr>
+          <p:cNvCxnSpPr>
+            <a:cxnSpLocks/>
+            <a:stCxn id="12" idx="1"/>
+          </p:cNvCxnSpPr>
+          <p:nvPr/>
+        </p:nvCxnSpPr>
+        <p:spPr>
+          <a:xfrm flipH="1">
+            <a:off x="5948413" y="4190515"/>
+            <a:ext cx="984585" cy="0"/>
+          </a:xfrm>
+          <a:prstGeom prst="straightConnector1">
+            <a:avLst/>
+          </a:prstGeom>
+          <a:ln w="12700">
+            <a:solidFill>
+              <a:schemeClr val="tx1">
+                <a:lumMod val="50000"/>
+                <a:lumOff val="50000"/>
+              </a:schemeClr>
+            </a:solidFill>
+            <a:tailEnd type="arrow" w="lg" len="lg"/>
+          </a:ln>
+        </p:spPr>
+        <p:style>
+          <a:lnRef idx="1">
+            <a:schemeClr val="accent1"/>
+          </a:lnRef>
+          <a:fillRef idx="0">
+            <a:schemeClr val="accent1"/>
+          </a:fillRef>
+          <a:effectRef idx="0">
+            <a:schemeClr val="accent1"/>
+          </a:effectRef>
+          <a:fontRef idx="minor">
+            <a:schemeClr val="tx1"/>
+          </a:fontRef>
+        </p:style>
+      </p:cxnSp>
+      <p:sp>
+        <p:nvSpPr>
+          <p:cNvPr id="16" name="TextBox 15">
+            <a:extLst>
+              <a:ext uri="{FF2B5EF4-FFF2-40B4-BE49-F238E27FC236}">
+                <a16:creationId xmlns:a16="http://schemas.microsoft.com/office/drawing/2014/main" id="{E5510FB4-993A-D518-CB7A-40E6E1FEB505}"/>
+              </a:ext>
+            </a:extLst>
+          </p:cNvPr>
+          <p:cNvSpPr txBox="1"/>
+          <p:nvPr/>
+        </p:nvSpPr>
+        <p:spPr>
+          <a:xfrm>
+            <a:off x="9076623" y="4325153"/>
+            <a:ext cx="2407919" cy="307777"/>
+          </a:xfrm>
+          <a:prstGeom prst="rect">
+            <a:avLst/>
+          </a:prstGeom>
+          <a:solidFill>
+            <a:schemeClr val="bg1">
+              <a:lumMod val="95000"/>
+            </a:schemeClr>
+          </a:solidFill>
+        </p:spPr>
+        <p:txBody>
+          <a:bodyPr wrap="square" rtlCol="0">
+            <a:spAutoFit/>
+          </a:bodyPr>
+          <a:lstStyle/>
+          <a:p>
+            <a:pPr algn="ctr"/>
+            <a:r>
+              <a:rPr lang="en-US" sz="1400" i="1" dirty="0"/>
+              <a:t>Full stdout/stderr from module</a:t>
+            </a:r>
+          </a:p>
+        </p:txBody>
+      </p:sp>
+      <p:cxnSp>
+        <p:nvCxnSpPr>
+          <p:cNvPr id="17" name="Curved Connector 8">
+            <a:extLst>
+              <a:ext uri="{FF2B5EF4-FFF2-40B4-BE49-F238E27FC236}">
+                <a16:creationId xmlns:a16="http://schemas.microsoft.com/office/drawing/2014/main" id="{28C1CFB9-3657-F874-3E14-DC0E5CDC1179}"/>
+              </a:ext>
+            </a:extLst>
+          </p:cNvPr>
+          <p:cNvCxnSpPr>
+            <a:cxnSpLocks/>
+            <a:stCxn id="16" idx="1"/>
+          </p:cNvCxnSpPr>
+          <p:nvPr/>
+        </p:nvCxnSpPr>
+        <p:spPr>
+          <a:xfrm flipH="1">
+            <a:off x="6160169" y="4479042"/>
+            <a:ext cx="2916454" cy="0"/>
+          </a:xfrm>
+          <a:prstGeom prst="straightConnector1">
+            <a:avLst/>
+          </a:prstGeom>
+          <a:ln w="12700">
+            <a:solidFill>
+              <a:schemeClr val="tx1">
+                <a:lumMod val="50000"/>
+                <a:lumOff val="50000"/>
+              </a:schemeClr>
+            </a:solidFill>
+            <a:tailEnd type="arrow" w="lg" len="lg"/>
+          </a:ln>
+        </p:spPr>
+        <p:style>
+          <a:lnRef idx="1">
+            <a:schemeClr val="accent1"/>
+          </a:lnRef>
+          <a:fillRef idx="0">
+            <a:schemeClr val="accent1"/>
+          </a:fillRef>
+          <a:effectRef idx="0">
+            <a:schemeClr val="accent1"/>
+          </a:effectRef>
+          <a:fontRef idx="minor">
+            <a:schemeClr val="tx1"/>
+          </a:fontRef>
+        </p:style>
+      </p:cxnSp>
+      <p:sp>
+        <p:nvSpPr>
+          <p:cNvPr id="21" name="TextBox 20">
+            <a:extLst>
+              <a:ext uri="{FF2B5EF4-FFF2-40B4-BE49-F238E27FC236}">
+                <a16:creationId xmlns:a16="http://schemas.microsoft.com/office/drawing/2014/main" id="{B305D686-8A98-6118-6D8A-A4302A7D0784}"/>
+              </a:ext>
+            </a:extLst>
+          </p:cNvPr>
+          <p:cNvSpPr txBox="1"/>
+          <p:nvPr/>
+        </p:nvSpPr>
+        <p:spPr>
+          <a:xfrm>
+            <a:off x="6208295" y="4761394"/>
+            <a:ext cx="2002055" cy="307777"/>
+          </a:xfrm>
+          <a:prstGeom prst="rect">
+            <a:avLst/>
+          </a:prstGeom>
+          <a:solidFill>
+            <a:schemeClr val="bg1">
+              <a:lumMod val="95000"/>
+            </a:schemeClr>
+          </a:solidFill>
+        </p:spPr>
+        <p:txBody>
+          <a:bodyPr wrap="square" rtlCol="0">
+            <a:spAutoFit/>
+          </a:bodyPr>
+          <a:lstStyle/>
+          <a:p>
+            <a:pPr algn="ctr"/>
+            <a:r>
+              <a:rPr lang="en-US" sz="1400" i="1" dirty="0"/>
+              <a:t>Output files from module</a:t>
+            </a:r>
+          </a:p>
+        </p:txBody>
+      </p:sp>
+      <p:sp>
+        <p:nvSpPr>
+          <p:cNvPr id="23" name="Right Brace 22">
+            <a:extLst>
+              <a:ext uri="{FF2B5EF4-FFF2-40B4-BE49-F238E27FC236}">
+                <a16:creationId xmlns:a16="http://schemas.microsoft.com/office/drawing/2014/main" id="{8D033D9F-D3D1-3264-7901-2FE9DF49EDD0}"/>
+              </a:ext>
+            </a:extLst>
+          </p:cNvPr>
+          <p:cNvSpPr/>
+          <p:nvPr/>
+        </p:nvSpPr>
+        <p:spPr>
+          <a:xfrm>
+            <a:off x="5900286" y="4632929"/>
+            <a:ext cx="308009" cy="564709"/>
+          </a:xfrm>
+          <a:prstGeom prst="rightBrace">
+            <a:avLst>
+              <a:gd name="adj1" fmla="val 8333"/>
+              <a:gd name="adj2" fmla="val 50973"/>
+            </a:avLst>
+          </a:prstGeom>
+          <a:noFill/>
+          <a:ln w="12700">
+            <a:solidFill>
+              <a:schemeClr val="tx1">
+                <a:lumMod val="50000"/>
+                <a:lumOff val="50000"/>
+              </a:schemeClr>
+            </a:solidFill>
+          </a:ln>
+        </p:spPr>
+        <p:style>
+          <a:lnRef idx="1">
+            <a:schemeClr val="accent1"/>
+          </a:lnRef>
+          <a:fillRef idx="0">
+            <a:schemeClr val="accent1"/>
+          </a:fillRef>
+          <a:effectRef idx="0">
+            <a:schemeClr val="accent1"/>
+          </a:effectRef>
+          <a:fontRef idx="minor">
+            <a:schemeClr val="tx1"/>
+          </a:fontRef>
+        </p:style>
+        <p:txBody>
+          <a:bodyPr rtlCol="0" anchor="ctr"/>
+          <a:lstStyle/>
+          <a:p>
+            <a:pPr algn="ctr"/>
+            <a:endParaRPr lang="en-US" dirty="0"/>
+          </a:p>
+        </p:txBody>
+      </p:sp>
     </p:spTree>
     <p:extLst>
       <p:ext uri="{BB962C8B-B14F-4D97-AF65-F5344CB8AC3E}">
-        <p14:creationId xmlns:p14="http://schemas.microsoft.com/office/powerpoint/2010/main" val="3228780085"/>
+        <p14:creationId xmlns:p14="http://schemas.microsoft.com/office/powerpoint/2010/main" val="1479614906"/>
       </p:ext>
     </p:extLst>
   </p:cSld>

</xml_diff>